<commit_message>
fix: correcoes das setas no diagrama de sequencia e adicao da conclusao no power point de apresentacao
</commit_message>
<xml_diff>
--- a/docs/Eventify_PowerPoint.pptx
+++ b/docs/Eventify_PowerPoint.pptx
@@ -26,6 +26,7 @@
     <p:sldId id="274" r:id="rId21"/>
     <p:sldId id="275" r:id="rId22"/>
     <p:sldId id="276" r:id="rId23"/>
+    <p:sldId id="277" r:id="rId24"/>
   </p:sldIdLst>
   <p:sldSz cx="24384000" cy="13716000"/>
   <p:notesSz cx="7559675" cy="10691813"/>
@@ -63,7 +64,7 @@
         <p:txBody>
           <a:bodyPr/>
           <a:p>
-            <a:fld id="{C3AC0FE7-4EDD-471A-81D1-EF01E99BD5DC}" type="slidenum">
+            <a:fld id="{F49BACE1-FC79-4F5C-9786-E83AC01FA087}" type="slidenum">
               <a:t>&lt;#&gt;</a:t>
             </a:fld>
           </a:p>
@@ -231,7 +232,7 @@
         <p:txBody>
           <a:bodyPr/>
           <a:p>
-            <a:fld id="{06315D59-4E87-4D9B-ACC4-45FB46B77C0F}" type="slidenum">
+            <a:fld id="{64CB6DE8-D937-458D-9AF4-A7E765466A11}" type="slidenum">
               <a:t>&lt;#&gt;</a:t>
             </a:fld>
           </a:p>
@@ -485,7 +486,7 @@
         <p:txBody>
           <a:bodyPr/>
           <a:p>
-            <a:fld id="{BD766025-6692-42F9-A19C-4256637095B1}" type="slidenum">
+            <a:fld id="{8838F33A-0134-42E7-BE4E-105D1E2ECD56}" type="slidenum">
               <a:t>&lt;#&gt;</a:t>
             </a:fld>
           </a:p>
@@ -825,7 +826,7 @@
         <p:txBody>
           <a:bodyPr/>
           <a:p>
-            <a:fld id="{28DD721A-F8A7-4C97-B3DC-0782C371E6D7}" type="slidenum">
+            <a:fld id="{69EDFCFB-701B-4CCD-8CE9-E2648793E0D7}" type="slidenum">
               <a:t>&lt;#&gt;</a:t>
             </a:fld>
           </a:p>
@@ -947,7 +948,7 @@
         <p:txBody>
           <a:bodyPr/>
           <a:p>
-            <a:fld id="{885B093D-7A1C-4D1D-A86B-2AFA6FB35131}" type="slidenum">
+            <a:fld id="{C1F95AAE-99DE-4119-8CA5-B5C533210AD8}" type="slidenum">
               <a:t>&lt;#&gt;</a:t>
             </a:fld>
           </a:p>
@@ -1072,7 +1073,7 @@
         <p:txBody>
           <a:bodyPr/>
           <a:p>
-            <a:fld id="{963F7C21-F496-465E-9332-602943C328FE}" type="slidenum">
+            <a:fld id="{A2F0F60A-4A5B-499F-925D-EB9B41C6729B}" type="slidenum">
               <a:t>&lt;#&gt;</a:t>
             </a:fld>
           </a:p>
@@ -1240,7 +1241,7 @@
         <p:txBody>
           <a:bodyPr/>
           <a:p>
-            <a:fld id="{592A1544-8AA3-48A4-8F00-B9C638D327FF}" type="slidenum">
+            <a:fld id="{81605DDF-C1FD-435F-B8A9-F0812BA4D14B}" type="slidenum">
               <a:t>&lt;#&gt;</a:t>
             </a:fld>
           </a:p>
@@ -1322,7 +1323,7 @@
         <p:txBody>
           <a:bodyPr/>
           <a:p>
-            <a:fld id="{A1E9A8F4-B9EC-4BFF-98CD-C14A07D8D6D3}" type="slidenum">
+            <a:fld id="{8C634B4B-B3B1-4173-A905-B920FE452E5D}" type="slidenum">
               <a:t>&lt;#&gt;</a:t>
             </a:fld>
           </a:p>
@@ -1402,7 +1403,7 @@
         <p:txBody>
           <a:bodyPr/>
           <a:p>
-            <a:fld id="{895BDD3E-A034-4B22-AA9C-F586DA5E260F}" type="slidenum">
+            <a:fld id="{CD9D3B1A-71E2-438B-8E4A-7981632E3392}" type="slidenum">
               <a:t>&lt;#&gt;</a:t>
             </a:fld>
           </a:p>
@@ -1613,7 +1614,7 @@
         <p:txBody>
           <a:bodyPr/>
           <a:p>
-            <a:fld id="{1DCF4D4C-BFCA-459A-9C2D-F726F13B9B47}" type="slidenum">
+            <a:fld id="{EC3B1751-B738-4805-9D08-7D0581F7A0A4}" type="slidenum">
               <a:t>&lt;#&gt;</a:t>
             </a:fld>
           </a:p>
@@ -1824,7 +1825,7 @@
         <p:txBody>
           <a:bodyPr/>
           <a:p>
-            <a:fld id="{E65B536A-0724-405D-9996-AD8269DE0F6B}" type="slidenum">
+            <a:fld id="{AAFE5C47-7D5B-43A2-90E4-496174582FB7}" type="slidenum">
               <a:t>&lt;#&gt;</a:t>
             </a:fld>
           </a:p>
@@ -2035,7 +2036,7 @@
         <p:txBody>
           <a:bodyPr/>
           <a:p>
-            <a:fld id="{330A0589-F85D-4CD9-ADA1-614754F7CE21}" type="slidenum">
+            <a:fld id="{34E818D1-0982-4486-9D7A-38BB137C2E38}" type="slidenum">
               <a:t>&lt;#&gt;</a:t>
             </a:fld>
           </a:p>
@@ -2083,7 +2084,7 @@
         <p:spPr>
           <a:xfrm>
             <a:off x="-12600" y="-136080"/>
-            <a:ext cx="24865560" cy="13986000"/>
+            <a:ext cx="24864840" cy="13985280"/>
           </a:xfrm>
           <a:prstGeom prst="rect">
             <a:avLst/>
@@ -2830,7 +2831,7 @@
         <p:spPr>
           <a:xfrm>
             <a:off x="12029760" y="11507040"/>
-            <a:ext cx="313200" cy="297360"/>
+            <a:ext cx="312480" cy="296640"/>
           </a:xfrm>
           <a:prstGeom prst="rect">
             <a:avLst/>
@@ -2878,7 +2879,7 @@
                 <a:tab algn="l" pos="0"/>
               </a:tabLst>
             </a:pPr>
-            <a:fld id="{9C80E204-611C-485C-8697-FC9748CBD2F3}" type="slidenum">
+            <a:fld id="{1C63CE34-E7AC-4FBD-9B5A-6A9F45CB566F}" type="slidenum">
               <a:rPr b="0" lang="pt-BR" sz="4600" spc="-1" strike="noStrike">
                 <a:solidFill>
                   <a:srgbClr val="000000"/>
@@ -2947,7 +2948,7 @@
         <p:spPr>
           <a:xfrm>
             <a:off x="0" y="0"/>
-            <a:ext cx="24382080" cy="13714200"/>
+            <a:ext cx="24381360" cy="13713480"/>
           </a:xfrm>
           <a:prstGeom prst="rect">
             <a:avLst/>
@@ -2969,8 +2970,8 @@
         </p:nvSpPr>
         <p:spPr>
           <a:xfrm>
-            <a:off x="1637640" y="10838160"/>
-            <a:ext cx="8803080" cy="1528920"/>
+            <a:off x="1637640" y="10440000"/>
+            <a:ext cx="8802360" cy="2340000"/>
           </a:xfrm>
           <a:prstGeom prst="rect">
             <a:avLst/>
@@ -2986,12 +2987,91 @@
           </a:bodyPr>
           <a:p>
             <a:pPr indent="0">
-              <a:spcBef>
-                <a:spcPts val="1417"/>
-              </a:spcBef>
+              <a:lnSpc>
+                <a:spcPct val="100000"/>
+              </a:lnSpc>
               <a:buNone/>
             </a:pPr>
-            <a:endParaRPr b="0" lang="pt-BR" sz="1800" spc="-1" strike="noStrike">
+            <a:r>
+              <a:rPr b="1" lang="pt-BR" sz="3200" spc="-1" strike="noStrike">
+                <a:solidFill>
+                  <a:srgbClr val="000000"/>
+                </a:solidFill>
+                <a:latin typeface="Arial"/>
+                <a:ea typeface="Helvetica Neue"/>
+              </a:rPr>
+              <a:t>Grupo: </a:t>
+            </a:r>
+            <a:endParaRPr b="0" lang="pt-BR" sz="3200" spc="-1" strike="noStrike">
+              <a:solidFill>
+                <a:srgbClr val="000000"/>
+              </a:solidFill>
+              <a:latin typeface="Arial"/>
+            </a:endParaRPr>
+          </a:p>
+          <a:p>
+            <a:pPr indent="0">
+              <a:lnSpc>
+                <a:spcPct val="100000"/>
+              </a:lnSpc>
+            </a:pPr>
+            <a:r>
+              <a:rPr b="0" lang="pt-BR" sz="3200" spc="-1" strike="noStrike">
+                <a:solidFill>
+                  <a:srgbClr val="000000"/>
+                </a:solidFill>
+                <a:latin typeface="Arial"/>
+                <a:ea typeface="Helvetica Neue"/>
+              </a:rPr>
+              <a:t>Alan Francisco </a:t>
+            </a:r>
+            <a:endParaRPr b="0" lang="pt-BR" sz="3200" spc="-1" strike="noStrike">
+              <a:solidFill>
+                <a:srgbClr val="000000"/>
+              </a:solidFill>
+              <a:latin typeface="Arial"/>
+            </a:endParaRPr>
+          </a:p>
+          <a:p>
+            <a:pPr indent="0">
+              <a:lnSpc>
+                <a:spcPct val="100000"/>
+              </a:lnSpc>
+            </a:pPr>
+            <a:r>
+              <a:rPr b="0" lang="pt-BR" sz="3200" spc="-1" strike="noStrike">
+                <a:solidFill>
+                  <a:srgbClr val="000000"/>
+                </a:solidFill>
+                <a:latin typeface="Arial"/>
+                <a:ea typeface="Helvetica Neue"/>
+              </a:rPr>
+              <a:t>Carlos Eduardo de Almeida</a:t>
+            </a:r>
+            <a:endParaRPr b="0" lang="pt-BR" sz="3200" spc="-1" strike="noStrike">
+              <a:solidFill>
+                <a:srgbClr val="000000"/>
+              </a:solidFill>
+              <a:latin typeface="Arial"/>
+            </a:endParaRPr>
+          </a:p>
+          <a:p>
+            <a:pPr indent="0">
+              <a:lnSpc>
+                <a:spcPct val="100000"/>
+              </a:lnSpc>
+            </a:pPr>
+            <a:r>
+              <a:rPr b="0" lang="pt-BR" sz="3200" spc="-1" strike="noStrike">
+                <a:solidFill>
+                  <a:srgbClr val="000000"/>
+                </a:solidFill>
+                <a:latin typeface="Arial"/>
+                <a:ea typeface="Helvetica Neue"/>
+              </a:rPr>
+              <a:t>Leandro Augusto</a:t>
+            </a:r>
+            <a:endParaRPr b="0" lang="pt-BR" sz="3200" spc="-1" strike="noStrike">
               <a:solidFill>
                 <a:srgbClr val="000000"/>
               </a:solidFill>
@@ -3032,14 +3112,14 @@
       </p:grpSpPr>
       <p:sp>
         <p:nvSpPr>
-          <p:cNvPr id="56" name=""/>
+          <p:cNvPr id="57" name=""/>
           <p:cNvSpPr/>
           <p:nvPr/>
         </p:nvSpPr>
         <p:spPr>
           <a:xfrm>
             <a:off x="720000" y="3960000"/>
-            <a:ext cx="21778560" cy="1451520"/>
+            <a:ext cx="21777840" cy="1450800"/>
           </a:xfrm>
           <a:prstGeom prst="rect">
             <a:avLst/>
@@ -3096,14 +3176,14 @@
       </p:sp>
       <p:sp>
         <p:nvSpPr>
-          <p:cNvPr id="57" name=""/>
+          <p:cNvPr id="58" name=""/>
           <p:cNvSpPr/>
           <p:nvPr/>
         </p:nvSpPr>
         <p:spPr>
           <a:xfrm>
             <a:off x="900000" y="5940000"/>
-            <a:ext cx="22138560" cy="5623560"/>
+            <a:ext cx="22137840" cy="5622840"/>
           </a:xfrm>
           <a:prstGeom prst="rect">
             <a:avLst/>
@@ -3295,14 +3375,14 @@
       </p:grpSpPr>
       <p:sp>
         <p:nvSpPr>
-          <p:cNvPr id="58" name=""/>
+          <p:cNvPr id="59" name=""/>
           <p:cNvSpPr/>
           <p:nvPr/>
         </p:nvSpPr>
         <p:spPr>
           <a:xfrm>
             <a:off x="720000" y="3960000"/>
-            <a:ext cx="21778560" cy="1451520"/>
+            <a:ext cx="21777840" cy="1450800"/>
           </a:xfrm>
           <a:prstGeom prst="rect">
             <a:avLst/>
@@ -3359,14 +3439,14 @@
       </p:sp>
       <p:sp>
         <p:nvSpPr>
-          <p:cNvPr id="59" name=""/>
+          <p:cNvPr id="60" name=""/>
           <p:cNvSpPr/>
           <p:nvPr/>
         </p:nvSpPr>
         <p:spPr>
           <a:xfrm>
             <a:off x="900000" y="5940000"/>
-            <a:ext cx="22138560" cy="5623560"/>
+            <a:ext cx="22137840" cy="5622840"/>
           </a:xfrm>
           <a:prstGeom prst="rect">
             <a:avLst/>
@@ -3434,14 +3514,14 @@
       </p:grpSpPr>
       <p:sp>
         <p:nvSpPr>
-          <p:cNvPr id="60" name=""/>
+          <p:cNvPr id="61" name=""/>
           <p:cNvSpPr/>
           <p:nvPr/>
         </p:nvSpPr>
         <p:spPr>
           <a:xfrm>
             <a:off x="720000" y="3960000"/>
-            <a:ext cx="21778560" cy="1451520"/>
+            <a:ext cx="21777840" cy="1450800"/>
           </a:xfrm>
           <a:prstGeom prst="rect">
             <a:avLst/>
@@ -3479,14 +3559,14 @@
       </p:sp>
       <p:sp>
         <p:nvSpPr>
-          <p:cNvPr id="61" name=""/>
+          <p:cNvPr id="62" name=""/>
           <p:cNvSpPr/>
           <p:nvPr/>
         </p:nvSpPr>
         <p:spPr>
           <a:xfrm>
             <a:off x="900000" y="5940000"/>
-            <a:ext cx="22138560" cy="5623560"/>
+            <a:ext cx="22137840" cy="5622840"/>
           </a:xfrm>
           <a:prstGeom prst="rect">
             <a:avLst/>
@@ -3524,7 +3604,7 @@
       </p:sp>
       <p:pic>
         <p:nvPicPr>
-          <p:cNvPr id="62" name="" descr=""/>
+          <p:cNvPr id="63" name="" descr=""/>
           <p:cNvPicPr/>
           <p:nvPr/>
         </p:nvPicPr>
@@ -3535,7 +3615,7 @@
         <p:spPr>
           <a:xfrm>
             <a:off x="6480" y="0"/>
-            <a:ext cx="24376680" cy="13715280"/>
+            <a:ext cx="24375960" cy="13714560"/>
           </a:xfrm>
           <a:prstGeom prst="rect">
             <a:avLst/>
@@ -3577,14 +3657,14 @@
       </p:grpSpPr>
       <p:sp>
         <p:nvSpPr>
-          <p:cNvPr id="63" name=""/>
+          <p:cNvPr id="64" name=""/>
           <p:cNvSpPr/>
           <p:nvPr/>
         </p:nvSpPr>
         <p:spPr>
           <a:xfrm>
             <a:off x="720000" y="3960000"/>
-            <a:ext cx="21778560" cy="1451520"/>
+            <a:ext cx="21777840" cy="1450800"/>
           </a:xfrm>
           <a:prstGeom prst="rect">
             <a:avLst/>
@@ -3641,14 +3721,14 @@
       </p:sp>
       <p:sp>
         <p:nvSpPr>
-          <p:cNvPr id="64" name=""/>
+          <p:cNvPr id="65" name=""/>
           <p:cNvSpPr/>
           <p:nvPr/>
         </p:nvSpPr>
         <p:spPr>
           <a:xfrm>
             <a:off x="900000" y="5940000"/>
-            <a:ext cx="22138560" cy="5623560"/>
+            <a:ext cx="22137840" cy="5622840"/>
           </a:xfrm>
           <a:prstGeom prst="rect">
             <a:avLst/>
@@ -3716,14 +3796,14 @@
       </p:grpSpPr>
       <p:sp>
         <p:nvSpPr>
-          <p:cNvPr id="65" name=""/>
+          <p:cNvPr id="66" name=""/>
           <p:cNvSpPr/>
           <p:nvPr/>
         </p:nvSpPr>
         <p:spPr>
           <a:xfrm>
             <a:off x="720000" y="3960000"/>
-            <a:ext cx="21778560" cy="1451520"/>
+            <a:ext cx="21777840" cy="1450800"/>
           </a:xfrm>
           <a:prstGeom prst="rect">
             <a:avLst/>
@@ -3761,14 +3841,14 @@
       </p:sp>
       <p:sp>
         <p:nvSpPr>
-          <p:cNvPr id="66" name=""/>
+          <p:cNvPr id="67" name=""/>
           <p:cNvSpPr/>
           <p:nvPr/>
         </p:nvSpPr>
         <p:spPr>
           <a:xfrm>
             <a:off x="900000" y="5940000"/>
-            <a:ext cx="22138560" cy="5623560"/>
+            <a:ext cx="22137840" cy="5622840"/>
           </a:xfrm>
           <a:prstGeom prst="rect">
             <a:avLst/>
@@ -3806,7 +3886,7 @@
       </p:sp>
       <p:pic>
         <p:nvPicPr>
-          <p:cNvPr id="67" name="" descr=""/>
+          <p:cNvPr id="68" name="" descr=""/>
           <p:cNvPicPr/>
           <p:nvPr/>
         </p:nvPicPr>
@@ -3817,7 +3897,7 @@
         <p:spPr>
           <a:xfrm>
             <a:off x="0" y="-23040"/>
-            <a:ext cx="24383160" cy="13760640"/>
+            <a:ext cx="24382440" cy="13759920"/>
           </a:xfrm>
           <a:prstGeom prst="rect">
             <a:avLst/>
@@ -3859,14 +3939,14 @@
       </p:grpSpPr>
       <p:sp>
         <p:nvSpPr>
-          <p:cNvPr id="68" name=""/>
+          <p:cNvPr id="69" name=""/>
           <p:cNvSpPr/>
           <p:nvPr/>
         </p:nvSpPr>
         <p:spPr>
           <a:xfrm>
             <a:off x="720000" y="3960000"/>
-            <a:ext cx="21778560" cy="1451520"/>
+            <a:ext cx="21777840" cy="1450800"/>
           </a:xfrm>
           <a:prstGeom prst="rect">
             <a:avLst/>
@@ -3923,14 +4003,14 @@
       </p:sp>
       <p:sp>
         <p:nvSpPr>
-          <p:cNvPr id="69" name=""/>
+          <p:cNvPr id="70" name=""/>
           <p:cNvSpPr/>
           <p:nvPr/>
         </p:nvSpPr>
         <p:spPr>
           <a:xfrm>
             <a:off x="900000" y="5940000"/>
-            <a:ext cx="22138560" cy="5623560"/>
+            <a:ext cx="22137840" cy="5622840"/>
           </a:xfrm>
           <a:prstGeom prst="rect">
             <a:avLst/>
@@ -3998,14 +4078,14 @@
       </p:grpSpPr>
       <p:sp>
         <p:nvSpPr>
-          <p:cNvPr id="70" name=""/>
+          <p:cNvPr id="71" name=""/>
           <p:cNvSpPr/>
           <p:nvPr/>
         </p:nvSpPr>
         <p:spPr>
           <a:xfrm>
             <a:off x="720000" y="3960000"/>
-            <a:ext cx="21778560" cy="1451520"/>
+            <a:ext cx="21777840" cy="1450800"/>
           </a:xfrm>
           <a:prstGeom prst="rect">
             <a:avLst/>
@@ -4043,14 +4123,14 @@
       </p:sp>
       <p:sp>
         <p:nvSpPr>
-          <p:cNvPr id="71" name=""/>
+          <p:cNvPr id="72" name=""/>
           <p:cNvSpPr/>
           <p:nvPr/>
         </p:nvSpPr>
         <p:spPr>
           <a:xfrm>
             <a:off x="900000" y="5940000"/>
-            <a:ext cx="22138560" cy="5623560"/>
+            <a:ext cx="22137840" cy="5622840"/>
           </a:xfrm>
           <a:prstGeom prst="rect">
             <a:avLst/>
@@ -4088,7 +4168,7 @@
       </p:sp>
       <p:pic>
         <p:nvPicPr>
-          <p:cNvPr id="72" name="" descr=""/>
+          <p:cNvPr id="73" name="" descr=""/>
           <p:cNvPicPr/>
           <p:nvPr/>
         </p:nvPicPr>
@@ -4099,7 +4179,7 @@
         <p:spPr>
           <a:xfrm>
             <a:off x="0" y="45000"/>
-            <a:ext cx="24383160" cy="13670280"/>
+            <a:ext cx="24382440" cy="13669560"/>
           </a:xfrm>
           <a:prstGeom prst="rect">
             <a:avLst/>
@@ -4141,14 +4221,14 @@
       </p:grpSpPr>
       <p:sp>
         <p:nvSpPr>
-          <p:cNvPr id="73" name=""/>
+          <p:cNvPr id="74" name=""/>
           <p:cNvSpPr/>
           <p:nvPr/>
         </p:nvSpPr>
         <p:spPr>
           <a:xfrm>
             <a:off x="720000" y="3960000"/>
-            <a:ext cx="21778560" cy="1451520"/>
+            <a:ext cx="21777840" cy="1450800"/>
           </a:xfrm>
           <a:prstGeom prst="rect">
             <a:avLst/>
@@ -4205,14 +4285,14 @@
       </p:sp>
       <p:sp>
         <p:nvSpPr>
-          <p:cNvPr id="74" name=""/>
+          <p:cNvPr id="75" name=""/>
           <p:cNvSpPr/>
           <p:nvPr/>
         </p:nvSpPr>
         <p:spPr>
           <a:xfrm>
             <a:off x="900000" y="5940000"/>
-            <a:ext cx="22138560" cy="5623560"/>
+            <a:ext cx="22137840" cy="5622840"/>
           </a:xfrm>
           <a:prstGeom prst="rect">
             <a:avLst/>
@@ -4280,14 +4360,14 @@
       </p:grpSpPr>
       <p:sp>
         <p:nvSpPr>
-          <p:cNvPr id="75" name=""/>
+          <p:cNvPr id="76" name=""/>
           <p:cNvSpPr/>
           <p:nvPr/>
         </p:nvSpPr>
         <p:spPr>
           <a:xfrm>
             <a:off x="720000" y="3960000"/>
-            <a:ext cx="21778560" cy="1451520"/>
+            <a:ext cx="21777840" cy="1450800"/>
           </a:xfrm>
           <a:prstGeom prst="rect">
             <a:avLst/>
@@ -4325,14 +4405,14 @@
       </p:sp>
       <p:sp>
         <p:nvSpPr>
-          <p:cNvPr id="76" name=""/>
+          <p:cNvPr id="77" name=""/>
           <p:cNvSpPr/>
           <p:nvPr/>
         </p:nvSpPr>
         <p:spPr>
           <a:xfrm>
             <a:off x="900000" y="5940000"/>
-            <a:ext cx="22138560" cy="5623560"/>
+            <a:ext cx="22137840" cy="5622840"/>
           </a:xfrm>
           <a:prstGeom prst="rect">
             <a:avLst/>
@@ -4370,7 +4450,7 @@
       </p:sp>
       <p:pic>
         <p:nvPicPr>
-          <p:cNvPr id="77" name="" descr=""/>
+          <p:cNvPr id="78" name="" descr=""/>
           <p:cNvPicPr/>
           <p:nvPr/>
         </p:nvPicPr>
@@ -4381,7 +4461,7 @@
         <p:spPr>
           <a:xfrm>
             <a:off x="0" y="0"/>
-            <a:ext cx="24392880" cy="13715640"/>
+            <a:ext cx="24392160" cy="13714920"/>
           </a:xfrm>
           <a:prstGeom prst="rect">
             <a:avLst/>
@@ -4423,14 +4503,14 @@
       </p:grpSpPr>
       <p:sp>
         <p:nvSpPr>
-          <p:cNvPr id="78" name=""/>
+          <p:cNvPr id="79" name=""/>
           <p:cNvSpPr/>
           <p:nvPr/>
         </p:nvSpPr>
         <p:spPr>
           <a:xfrm>
             <a:off x="720000" y="3960000"/>
-            <a:ext cx="21778560" cy="1451520"/>
+            <a:ext cx="21777840" cy="1450800"/>
           </a:xfrm>
           <a:prstGeom prst="rect">
             <a:avLst/>
@@ -4474,7 +4554,7 @@
                 <a:latin typeface="Arial"/>
                 <a:ea typeface="Helvetica Neue"/>
               </a:rPr>
-              <a:t>Diagrama de sequencia</a:t>
+              <a:t>Diagrama de sequência</a:t>
             </a:r>
             <a:endParaRPr b="0" lang="pt-BR" sz="9600" spc="-1" strike="noStrike">
               <a:solidFill>
@@ -4487,14 +4567,14 @@
       </p:sp>
       <p:sp>
         <p:nvSpPr>
-          <p:cNvPr id="79" name=""/>
+          <p:cNvPr id="80" name=""/>
           <p:cNvSpPr/>
           <p:nvPr/>
         </p:nvSpPr>
         <p:spPr>
           <a:xfrm>
             <a:off x="900000" y="5940000"/>
-            <a:ext cx="22138560" cy="5623560"/>
+            <a:ext cx="22137840" cy="5622840"/>
           </a:xfrm>
           <a:prstGeom prst="rect">
             <a:avLst/>
@@ -4569,7 +4649,7 @@
         <p:spPr>
           <a:xfrm>
             <a:off x="720000" y="3960000"/>
-            <a:ext cx="21778560" cy="4138560"/>
+            <a:ext cx="21777840" cy="4137840"/>
           </a:xfrm>
           <a:prstGeom prst="rect">
             <a:avLst/>
@@ -4606,6 +4686,50 @@
               <a:t>Eventify - Gestão de Eventos Colaborativos</a:t>
             </a:r>
             <a:endParaRPr b="0" lang="pt-BR" sz="8800" spc="-1" strike="noStrike">
+              <a:solidFill>
+                <a:srgbClr val="000000"/>
+              </a:solidFill>
+              <a:latin typeface="Arial"/>
+            </a:endParaRPr>
+          </a:p>
+        </p:txBody>
+      </p:sp>
+      <p:sp>
+        <p:nvSpPr>
+          <p:cNvPr id="45" name=""/>
+          <p:cNvSpPr/>
+          <p:nvPr/>
+        </p:nvSpPr>
+        <p:spPr>
+          <a:xfrm>
+            <a:off x="1513440" y="7740000"/>
+            <a:ext cx="21807360" cy="4139640"/>
+          </a:xfrm>
+          <a:prstGeom prst="rect">
+            <a:avLst/>
+          </a:prstGeom>
+          <a:noFill/>
+          <a:ln w="0">
+            <a:noFill/>
+          </a:ln>
+        </p:spPr>
+        <p:style>
+          <a:lnRef idx="0"/>
+          <a:fillRef idx="0"/>
+          <a:effectRef idx="0"/>
+          <a:fontRef idx="minor"/>
+        </p:style>
+        <p:txBody>
+          <a:bodyPr lIns="90000" rIns="90000" tIns="45000" bIns="45000" anchor="t">
+            <a:noAutofit/>
+          </a:bodyPr>
+          <a:p>
+            <a:pPr>
+              <a:lnSpc>
+                <a:spcPct val="100000"/>
+              </a:lnSpc>
+            </a:pPr>
+            <a:endParaRPr b="0" lang="pt-BR" sz="1800" spc="-1" strike="noStrike">
               <a:solidFill>
                 <a:srgbClr val="000000"/>
               </a:solidFill>
@@ -4646,14 +4770,14 @@
       </p:grpSpPr>
       <p:sp>
         <p:nvSpPr>
-          <p:cNvPr id="80" name=""/>
+          <p:cNvPr id="81" name=""/>
           <p:cNvSpPr/>
           <p:nvPr/>
         </p:nvSpPr>
         <p:spPr>
           <a:xfrm>
             <a:off x="720000" y="3960000"/>
-            <a:ext cx="21778560" cy="1451520"/>
+            <a:ext cx="21777840" cy="1450800"/>
           </a:xfrm>
           <a:prstGeom prst="rect">
             <a:avLst/>
@@ -4674,11 +4798,6 @@
             <a:noAutofit/>
           </a:bodyPr>
           <a:p>
-            <a:pPr>
-              <a:lnSpc>
-                <a:spcPct val="100000"/>
-              </a:lnSpc>
-            </a:pPr>
             <a:endParaRPr b="0" lang="pt-BR" sz="1800" spc="-1" strike="noStrike">
               <a:solidFill>
                 <a:srgbClr val="000000"/>
@@ -4691,14 +4810,14 @@
       </p:sp>
       <p:sp>
         <p:nvSpPr>
-          <p:cNvPr id="81" name=""/>
+          <p:cNvPr id="82" name=""/>
           <p:cNvSpPr/>
           <p:nvPr/>
         </p:nvSpPr>
         <p:spPr>
           <a:xfrm>
             <a:off x="900000" y="5940000"/>
-            <a:ext cx="22138560" cy="5623560"/>
+            <a:ext cx="22137840" cy="5622840"/>
           </a:xfrm>
           <a:prstGeom prst="rect">
             <a:avLst/>
@@ -4719,11 +4838,6 @@
             <a:noAutofit/>
           </a:bodyPr>
           <a:p>
-            <a:pPr>
-              <a:lnSpc>
-                <a:spcPct val="100000"/>
-              </a:lnSpc>
-            </a:pPr>
             <a:endParaRPr b="0" lang="pt-BR" sz="1800" spc="-1" strike="noStrike">
               <a:solidFill>
                 <a:srgbClr val="000000"/>
@@ -4736,7 +4850,7 @@
       </p:sp>
       <p:pic>
         <p:nvPicPr>
-          <p:cNvPr id="82" name="" descr=""/>
+          <p:cNvPr id="83" name="" descr=""/>
           <p:cNvPicPr/>
           <p:nvPr/>
         </p:nvPicPr>
@@ -4746,8 +4860,8 @@
         </p:blipFill>
         <p:spPr>
           <a:xfrm>
-            <a:off x="0" y="0"/>
-            <a:ext cx="24383880" cy="13716000"/>
+            <a:off x="0" y="71280"/>
+            <a:ext cx="24383880" cy="13644720"/>
           </a:xfrm>
           <a:prstGeom prst="rect">
             <a:avLst/>
@@ -4789,14 +4903,148 @@
       </p:grpSpPr>
       <p:sp>
         <p:nvSpPr>
-          <p:cNvPr id="83" name=""/>
+          <p:cNvPr id="84" name=""/>
           <p:cNvSpPr/>
           <p:nvPr/>
         </p:nvSpPr>
         <p:spPr>
           <a:xfrm>
+            <a:off x="720000" y="3960000"/>
+            <a:ext cx="21777840" cy="1450800"/>
+          </a:xfrm>
+          <a:prstGeom prst="rect">
+            <a:avLst/>
+          </a:prstGeom>
+          <a:noFill/>
+          <a:ln w="0">
+            <a:noFill/>
+          </a:ln>
+        </p:spPr>
+        <p:style>
+          <a:lnRef idx="0"/>
+          <a:fillRef idx="0"/>
+          <a:effectRef idx="0"/>
+          <a:fontRef idx="minor"/>
+        </p:style>
+        <p:txBody>
+          <a:bodyPr lIns="90000" rIns="90000" tIns="45000" bIns="45000" anchor="t">
+            <a:noAutofit/>
+          </a:bodyPr>
+          <a:p>
+            <a:pPr>
+              <a:lnSpc>
+                <a:spcPct val="100000"/>
+              </a:lnSpc>
+            </a:pPr>
+            <a:r>
+              <a:rPr b="1" lang="pt-BR" sz="9600" spc="-1" strike="noStrike" baseline="33000">
+                <a:solidFill>
+                  <a:srgbClr val="000000"/>
+                </a:solidFill>
+                <a:latin typeface="Arial"/>
+                <a:ea typeface="Helvetica Neue"/>
+              </a:rPr>
+              <a:t>• </a:t>
+            </a:r>
+            <a:r>
+              <a:rPr b="1" lang="pt-BR" sz="9600" spc="-1" strike="noStrike" baseline="33000">
+                <a:solidFill>
+                  <a:srgbClr val="000000"/>
+                </a:solidFill>
+                <a:latin typeface="Arial"/>
+                <a:ea typeface="Helvetica Neue"/>
+              </a:rPr>
+              <a:t>Conclusão</a:t>
+            </a:r>
+            <a:endParaRPr b="0" lang="pt-BR" sz="9600" spc="-1" strike="noStrike">
+              <a:solidFill>
+                <a:srgbClr val="000000"/>
+              </a:solidFill>
+              <a:latin typeface="Arial"/>
+            </a:endParaRPr>
+          </a:p>
+        </p:txBody>
+      </p:sp>
+      <p:sp>
+        <p:nvSpPr>
+          <p:cNvPr id="85" name=""/>
+          <p:cNvSpPr/>
+          <p:nvPr/>
+        </p:nvSpPr>
+        <p:spPr>
+          <a:xfrm>
+            <a:off x="900000" y="5940000"/>
+            <a:ext cx="22137840" cy="5622840"/>
+          </a:xfrm>
+          <a:prstGeom prst="rect">
+            <a:avLst/>
+          </a:prstGeom>
+          <a:noFill/>
+          <a:ln w="0">
+            <a:noFill/>
+          </a:ln>
+        </p:spPr>
+        <p:style>
+          <a:lnRef idx="0"/>
+          <a:fillRef idx="0"/>
+          <a:effectRef idx="0"/>
+          <a:fontRef idx="minor"/>
+        </p:style>
+        <p:txBody>
+          <a:bodyPr lIns="0" rIns="0" tIns="0" bIns="0" anchor="t">
+            <a:noAutofit/>
+          </a:bodyPr>
+          <a:p>
+            <a:endParaRPr b="0" lang="pt-BR" sz="1800" spc="-1" strike="noStrike">
+              <a:solidFill>
+                <a:srgbClr val="000000"/>
+              </a:solidFill>
+              <a:latin typeface="Arial"/>
+              <a:ea typeface="Helvetica Neue"/>
+            </a:endParaRPr>
+          </a:p>
+        </p:txBody>
+      </p:sp>
+    </p:spTree>
+  </p:cSld>
+  <mc:AlternateContent>
+    <mc:Choice Requires="p14">
+      <p:transition spd="slow" p14:dur="2000"/>
+    </mc:Choice>
+    <mc:Fallback>
+      <p:transition spd="slow"/>
+    </mc:Fallback>
+  </mc:AlternateContent>
+</p:sld>
+</file>
+
+<file path=ppt/slides/slide22.xml><?xml version="1.0" encoding="utf-8"?>
+<p:sld xmlns:a="http://schemas.openxmlformats.org/drawingml/2006/main" xmlns:p="http://schemas.openxmlformats.org/presentationml/2006/main" xmlns:r="http://schemas.openxmlformats.org/officeDocument/2006/relationships" xmlns:p14="http://schemas.microsoft.com/office/powerpoint/2010/main" xmlns:p15="http://schemas.microsoft.com/office/powerpoint/2012/main" xmlns:mc="http://schemas.openxmlformats.org/markup-compatibility/2006">
+  <p:cSld>
+    <p:spTree>
+      <p:nvGrpSpPr>
+        <p:cNvPr id="1" name=""/>
+        <p:cNvGrpSpPr/>
+        <p:nvPr/>
+      </p:nvGrpSpPr>
+      <p:grpSpPr>
+        <a:xfrm>
+          <a:off x="0" y="0"/>
+          <a:ext cx="0" cy="0"/>
+          <a:chOff x="0" y="0"/>
+          <a:chExt cx="0" cy="0"/>
+        </a:xfrm>
+      </p:grpSpPr>
+      <p:sp>
+        <p:nvSpPr>
+          <p:cNvPr id="86" name=""/>
+          <p:cNvSpPr/>
+          <p:nvPr/>
+        </p:nvSpPr>
+        <p:spPr>
+          <a:xfrm>
             <a:off x="900000" y="3420000"/>
-            <a:ext cx="22138560" cy="7198560"/>
+            <a:ext cx="22137840" cy="7197840"/>
           </a:xfrm>
           <a:prstGeom prst="rect">
             <a:avLst/>
@@ -4873,14 +5121,14 @@
       </p:grpSpPr>
       <p:sp>
         <p:nvSpPr>
-          <p:cNvPr id="45" name=""/>
+          <p:cNvPr id="46" name=""/>
           <p:cNvSpPr/>
           <p:nvPr/>
         </p:nvSpPr>
         <p:spPr>
           <a:xfrm>
             <a:off x="720000" y="3960000"/>
-            <a:ext cx="21778560" cy="1451520"/>
+            <a:ext cx="21777840" cy="1450800"/>
           </a:xfrm>
           <a:prstGeom prst="rect">
             <a:avLst/>
@@ -4937,14 +5185,14 @@
       </p:sp>
       <p:sp>
         <p:nvSpPr>
-          <p:cNvPr id="46" name=""/>
+          <p:cNvPr id="47" name=""/>
           <p:cNvSpPr/>
           <p:nvPr/>
         </p:nvSpPr>
         <p:spPr>
           <a:xfrm>
             <a:off x="900000" y="5940000"/>
-            <a:ext cx="22138560" cy="6838560"/>
+            <a:ext cx="22137840" cy="6837840"/>
           </a:xfrm>
           <a:prstGeom prst="rect">
             <a:avLst/>
@@ -5021,14 +5269,14 @@
       </p:grpSpPr>
       <p:sp>
         <p:nvSpPr>
-          <p:cNvPr id="47" name=""/>
+          <p:cNvPr id="48" name=""/>
           <p:cNvSpPr/>
           <p:nvPr/>
         </p:nvSpPr>
         <p:spPr>
           <a:xfrm>
             <a:off x="720000" y="3960000"/>
-            <a:ext cx="21778560" cy="1451520"/>
+            <a:ext cx="21777840" cy="1450800"/>
           </a:xfrm>
           <a:prstGeom prst="rect">
             <a:avLst/>
@@ -5085,14 +5333,14 @@
       </p:sp>
       <p:sp>
         <p:nvSpPr>
-          <p:cNvPr id="48" name=""/>
+          <p:cNvPr id="49" name=""/>
           <p:cNvSpPr/>
           <p:nvPr/>
         </p:nvSpPr>
         <p:spPr>
           <a:xfrm>
             <a:off x="900000" y="5940000"/>
-            <a:ext cx="22138560" cy="6838560"/>
+            <a:ext cx="22137840" cy="6837840"/>
           </a:xfrm>
           <a:prstGeom prst="rect">
             <a:avLst/>
@@ -5238,14 +5486,14 @@
       </p:grpSpPr>
       <p:sp>
         <p:nvSpPr>
-          <p:cNvPr id="49" name=""/>
+          <p:cNvPr id="50" name=""/>
           <p:cNvSpPr/>
           <p:nvPr/>
         </p:nvSpPr>
         <p:spPr>
           <a:xfrm>
             <a:off x="720000" y="3960000"/>
-            <a:ext cx="21778560" cy="1451520"/>
+            <a:ext cx="21777840" cy="1450800"/>
           </a:xfrm>
           <a:prstGeom prst="rect">
             <a:avLst/>
@@ -5302,14 +5550,14 @@
       </p:sp>
       <p:sp>
         <p:nvSpPr>
-          <p:cNvPr id="50" name=""/>
+          <p:cNvPr id="51" name=""/>
           <p:cNvSpPr/>
           <p:nvPr/>
         </p:nvSpPr>
         <p:spPr>
           <a:xfrm>
             <a:off x="900000" y="5940000"/>
-            <a:ext cx="22138560" cy="6838560"/>
+            <a:ext cx="22137840" cy="6837840"/>
           </a:xfrm>
           <a:prstGeom prst="rect">
             <a:avLst/>
@@ -5409,14 +5657,14 @@
       </p:grpSpPr>
       <p:sp>
         <p:nvSpPr>
-          <p:cNvPr id="51" name=""/>
+          <p:cNvPr id="52" name=""/>
           <p:cNvSpPr/>
           <p:nvPr/>
         </p:nvSpPr>
         <p:spPr>
           <a:xfrm>
             <a:off x="720000" y="3960000"/>
-            <a:ext cx="21778560" cy="1451520"/>
+            <a:ext cx="21777840" cy="1450800"/>
           </a:xfrm>
           <a:prstGeom prst="rect">
             <a:avLst/>
@@ -5473,14 +5721,14 @@
       </p:sp>
       <p:sp>
         <p:nvSpPr>
-          <p:cNvPr id="52" name=""/>
+          <p:cNvPr id="53" name=""/>
           <p:cNvSpPr/>
           <p:nvPr/>
         </p:nvSpPr>
         <p:spPr>
           <a:xfrm>
             <a:off x="900000" y="5940000"/>
-            <a:ext cx="22138560" cy="1873800"/>
+            <a:ext cx="22137840" cy="1873080"/>
           </a:xfrm>
           <a:prstGeom prst="rect">
             <a:avLst/>
@@ -5580,7 +5828,7 @@
       </p:grpSpPr>
       <p:pic>
         <p:nvPicPr>
-          <p:cNvPr id="53" name="" descr=""/>
+          <p:cNvPr id="54" name="" descr=""/>
           <p:cNvPicPr/>
           <p:nvPr/>
         </p:nvPicPr>
@@ -5590,8 +5838,8 @@
         </p:blipFill>
         <p:spPr>
           <a:xfrm>
-            <a:off x="180000" y="3240000"/>
-            <a:ext cx="22678560" cy="9245160"/>
+            <a:off x="309960" y="3240000"/>
+            <a:ext cx="23630040" cy="10260000"/>
           </a:xfrm>
           <a:prstGeom prst="rect">
             <a:avLst/>
@@ -5633,7 +5881,7 @@
       </p:grpSpPr>
       <p:pic>
         <p:nvPicPr>
-          <p:cNvPr id="54" name="" descr=""/>
+          <p:cNvPr id="55" name="" descr=""/>
           <p:cNvPicPr/>
           <p:nvPr/>
         </p:nvPicPr>
@@ -5643,8 +5891,8 @@
         </p:blipFill>
         <p:spPr>
           <a:xfrm>
-            <a:off x="540000" y="3402720"/>
-            <a:ext cx="22498560" cy="9558720"/>
+            <a:off x="900000" y="3240000"/>
+            <a:ext cx="22800240" cy="10080000"/>
           </a:xfrm>
           <a:prstGeom prst="rect">
             <a:avLst/>
@@ -5686,7 +5934,7 @@
       </p:grpSpPr>
       <p:pic>
         <p:nvPicPr>
-          <p:cNvPr id="55" name="" descr=""/>
+          <p:cNvPr id="56" name="" descr=""/>
           <p:cNvPicPr/>
           <p:nvPr/>
         </p:nvPicPr>
@@ -5696,8 +5944,8 @@
         </p:blipFill>
         <p:spPr>
           <a:xfrm>
-            <a:off x="540000" y="3420000"/>
-            <a:ext cx="22498560" cy="9178560"/>
+            <a:off x="360000" y="3240000"/>
+            <a:ext cx="23332320" cy="10122480"/>
           </a:xfrm>
           <a:prstGeom prst="rect">
             <a:avLst/>

</xml_diff>

<commit_message>
feat: adicoes de classes no diagrama de classes e adicao de caso de uso na apresentacao
</commit_message>
<xml_diff>
--- a/docs/Eventify_PowerPoint.pptx
+++ b/docs/Eventify_PowerPoint.pptx
@@ -27,6 +27,10 @@
     <p:sldId id="275" r:id="rId22"/>
     <p:sldId id="276" r:id="rId23"/>
     <p:sldId id="277" r:id="rId24"/>
+    <p:sldId id="278" r:id="rId25"/>
+    <p:sldId id="279" r:id="rId26"/>
+    <p:sldId id="280" r:id="rId27"/>
+    <p:sldId id="281" r:id="rId28"/>
   </p:sldIdLst>
   <p:sldSz cx="24384000" cy="13716000"/>
   <p:notesSz cx="7559675" cy="10691813"/>
@@ -64,7 +68,7 @@
         <p:txBody>
           <a:bodyPr/>
           <a:p>
-            <a:fld id="{F49BACE1-FC79-4F5C-9786-E83AC01FA087}" type="slidenum">
+            <a:fld id="{D119D90F-BA47-41DB-9ACB-9AC8F79142D6}" type="slidenum">
               <a:t>&lt;#&gt;</a:t>
             </a:fld>
           </a:p>
@@ -232,7 +236,7 @@
         <p:txBody>
           <a:bodyPr/>
           <a:p>
-            <a:fld id="{64CB6DE8-D937-458D-9AF4-A7E765466A11}" type="slidenum">
+            <a:fld id="{77AB2E7D-5B73-4143-87E5-DC9E5F0AECD5}" type="slidenum">
               <a:t>&lt;#&gt;</a:t>
             </a:fld>
           </a:p>
@@ -486,7 +490,7 @@
         <p:txBody>
           <a:bodyPr/>
           <a:p>
-            <a:fld id="{8838F33A-0134-42E7-BE4E-105D1E2ECD56}" type="slidenum">
+            <a:fld id="{4FFCF0AE-728E-42A7-950B-70B2DA1634C0}" type="slidenum">
               <a:t>&lt;#&gt;</a:t>
             </a:fld>
           </a:p>
@@ -826,7 +830,7 @@
         <p:txBody>
           <a:bodyPr/>
           <a:p>
-            <a:fld id="{69EDFCFB-701B-4CCD-8CE9-E2648793E0D7}" type="slidenum">
+            <a:fld id="{4E1153E9-4C59-4FD4-92EA-A2B8A68787A8}" type="slidenum">
               <a:t>&lt;#&gt;</a:t>
             </a:fld>
           </a:p>
@@ -948,7 +952,7 @@
         <p:txBody>
           <a:bodyPr/>
           <a:p>
-            <a:fld id="{C1F95AAE-99DE-4119-8CA5-B5C533210AD8}" type="slidenum">
+            <a:fld id="{EF604653-758B-485B-B32F-53C34494DC53}" type="slidenum">
               <a:t>&lt;#&gt;</a:t>
             </a:fld>
           </a:p>
@@ -1073,7 +1077,7 @@
         <p:txBody>
           <a:bodyPr/>
           <a:p>
-            <a:fld id="{A2F0F60A-4A5B-499F-925D-EB9B41C6729B}" type="slidenum">
+            <a:fld id="{37C01F8D-09AE-4424-BA0F-71732CD78250}" type="slidenum">
               <a:t>&lt;#&gt;</a:t>
             </a:fld>
           </a:p>
@@ -1241,7 +1245,7 @@
         <p:txBody>
           <a:bodyPr/>
           <a:p>
-            <a:fld id="{81605DDF-C1FD-435F-B8A9-F0812BA4D14B}" type="slidenum">
+            <a:fld id="{EBFC3F28-97C5-4DD9-B85A-D811FA05D663}" type="slidenum">
               <a:t>&lt;#&gt;</a:t>
             </a:fld>
           </a:p>
@@ -1323,7 +1327,7 @@
         <p:txBody>
           <a:bodyPr/>
           <a:p>
-            <a:fld id="{8C634B4B-B3B1-4173-A905-B920FE452E5D}" type="slidenum">
+            <a:fld id="{72DB1013-6156-4C7F-8376-BD62CD85B9EF}" type="slidenum">
               <a:t>&lt;#&gt;</a:t>
             </a:fld>
           </a:p>
@@ -1403,7 +1407,7 @@
         <p:txBody>
           <a:bodyPr/>
           <a:p>
-            <a:fld id="{CD9D3B1A-71E2-438B-8E4A-7981632E3392}" type="slidenum">
+            <a:fld id="{79ADD669-CFF3-4FB3-8B31-787114A3AF07}" type="slidenum">
               <a:t>&lt;#&gt;</a:t>
             </a:fld>
           </a:p>
@@ -1614,7 +1618,7 @@
         <p:txBody>
           <a:bodyPr/>
           <a:p>
-            <a:fld id="{EC3B1751-B738-4805-9D08-7D0581F7A0A4}" type="slidenum">
+            <a:fld id="{70D4D739-2A4A-4D64-9D2D-43810C405DB4}" type="slidenum">
               <a:t>&lt;#&gt;</a:t>
             </a:fld>
           </a:p>
@@ -1825,7 +1829,7 @@
         <p:txBody>
           <a:bodyPr/>
           <a:p>
-            <a:fld id="{AAFE5C47-7D5B-43A2-90E4-496174582FB7}" type="slidenum">
+            <a:fld id="{5D7C8B52-98A6-41F3-A4D6-19337AF4702A}" type="slidenum">
               <a:t>&lt;#&gt;</a:t>
             </a:fld>
           </a:p>
@@ -2036,7 +2040,7 @@
         <p:txBody>
           <a:bodyPr/>
           <a:p>
-            <a:fld id="{34E818D1-0982-4486-9D7A-38BB137C2E38}" type="slidenum">
+            <a:fld id="{40D11B61-BF6A-4A16-A543-7FF15B86DBCB}" type="slidenum">
               <a:t>&lt;#&gt;</a:t>
             </a:fld>
           </a:p>
@@ -2084,7 +2088,7 @@
         <p:spPr>
           <a:xfrm>
             <a:off x="-12600" y="-136080"/>
-            <a:ext cx="24864840" cy="13985280"/>
+            <a:ext cx="24864480" cy="13984920"/>
           </a:xfrm>
           <a:prstGeom prst="rect">
             <a:avLst/>
@@ -2831,7 +2835,7 @@
         <p:spPr>
           <a:xfrm>
             <a:off x="12029760" y="11507040"/>
-            <a:ext cx="312480" cy="296640"/>
+            <a:ext cx="312120" cy="296280"/>
           </a:xfrm>
           <a:prstGeom prst="rect">
             <a:avLst/>
@@ -2879,7 +2883,7 @@
                 <a:tab algn="l" pos="0"/>
               </a:tabLst>
             </a:pPr>
-            <a:fld id="{1C63CE34-E7AC-4FBD-9B5A-6A9F45CB566F}" type="slidenum">
+            <a:fld id="{2AC39B9A-7B21-4C16-B1BD-144DB18C1163}" type="slidenum">
               <a:rPr b="0" lang="pt-BR" sz="4600" spc="-1" strike="noStrike">
                 <a:solidFill>
                   <a:srgbClr val="000000"/>
@@ -2948,7 +2952,7 @@
         <p:spPr>
           <a:xfrm>
             <a:off x="0" y="0"/>
-            <a:ext cx="24381360" cy="13713480"/>
+            <a:ext cx="24381000" cy="13713120"/>
           </a:xfrm>
           <a:prstGeom prst="rect">
             <a:avLst/>
@@ -2971,7 +2975,7 @@
         <p:spPr>
           <a:xfrm>
             <a:off x="1637640" y="10440000"/>
-            <a:ext cx="8802360" cy="2340000"/>
+            <a:ext cx="8802000" cy="2339640"/>
           </a:xfrm>
           <a:prstGeom prst="rect">
             <a:avLst/>
@@ -2991,6 +2995,9 @@
                 <a:spcPct val="100000"/>
               </a:lnSpc>
               <a:buNone/>
+              <a:tabLst>
+                <a:tab algn="l" pos="0"/>
+              </a:tabLst>
             </a:pPr>
             <a:r>
               <a:rPr b="1" lang="pt-BR" sz="3200" spc="-1" strike="noStrike">
@@ -3014,6 +3021,10 @@
               <a:lnSpc>
                 <a:spcPct val="100000"/>
               </a:lnSpc>
+              <a:buNone/>
+              <a:tabLst>
+                <a:tab algn="l" pos="0"/>
+              </a:tabLst>
             </a:pPr>
             <a:r>
               <a:rPr b="0" lang="pt-BR" sz="3200" spc="-1" strike="noStrike">
@@ -3037,6 +3048,10 @@
               <a:lnSpc>
                 <a:spcPct val="100000"/>
               </a:lnSpc>
+              <a:buNone/>
+              <a:tabLst>
+                <a:tab algn="l" pos="0"/>
+              </a:tabLst>
             </a:pPr>
             <a:r>
               <a:rPr b="0" lang="pt-BR" sz="3200" spc="-1" strike="noStrike">
@@ -3060,6 +3075,10 @@
               <a:lnSpc>
                 <a:spcPct val="100000"/>
               </a:lnSpc>
+              <a:buNone/>
+              <a:tabLst>
+                <a:tab algn="l" pos="0"/>
+              </a:tabLst>
             </a:pPr>
             <a:r>
               <a:rPr b="0" lang="pt-BR" sz="3200" spc="-1" strike="noStrike">
@@ -3119,7 +3138,7 @@
         <p:spPr>
           <a:xfrm>
             <a:off x="720000" y="3960000"/>
-            <a:ext cx="21777840" cy="1450800"/>
+            <a:ext cx="21777480" cy="1450440"/>
           </a:xfrm>
           <a:prstGeom prst="rect">
             <a:avLst/>
@@ -3183,7 +3202,7 @@
         <p:spPr>
           <a:xfrm>
             <a:off x="900000" y="5940000"/>
-            <a:ext cx="22137840" cy="5622840"/>
+            <a:ext cx="22137480" cy="5622480"/>
           </a:xfrm>
           <a:prstGeom prst="rect">
             <a:avLst/>
@@ -3382,7 +3401,7 @@
         <p:spPr>
           <a:xfrm>
             <a:off x="720000" y="3960000"/>
-            <a:ext cx="21777840" cy="1450800"/>
+            <a:ext cx="21777480" cy="1450440"/>
           </a:xfrm>
           <a:prstGeom prst="rect">
             <a:avLst/>
@@ -3446,7 +3465,7 @@
         <p:spPr>
           <a:xfrm>
             <a:off x="900000" y="5940000"/>
-            <a:ext cx="22137840" cy="5622840"/>
+            <a:ext cx="22137480" cy="5622480"/>
           </a:xfrm>
           <a:prstGeom prst="rect">
             <a:avLst/>
@@ -3521,7 +3540,7 @@
         <p:spPr>
           <a:xfrm>
             <a:off x="720000" y="3960000"/>
-            <a:ext cx="21777840" cy="1450800"/>
+            <a:ext cx="21777480" cy="1450440"/>
           </a:xfrm>
           <a:prstGeom prst="rect">
             <a:avLst/>
@@ -3566,7 +3585,7 @@
         <p:spPr>
           <a:xfrm>
             <a:off x="900000" y="5940000"/>
-            <a:ext cx="22137840" cy="5622840"/>
+            <a:ext cx="22137480" cy="5622480"/>
           </a:xfrm>
           <a:prstGeom prst="rect">
             <a:avLst/>
@@ -3615,7 +3634,7 @@
         <p:spPr>
           <a:xfrm>
             <a:off x="6480" y="0"/>
-            <a:ext cx="24375960" cy="13714560"/>
+            <a:ext cx="24375600" cy="13714200"/>
           </a:xfrm>
           <a:prstGeom prst="rect">
             <a:avLst/>
@@ -3664,7 +3683,7 @@
         <p:spPr>
           <a:xfrm>
             <a:off x="720000" y="3960000"/>
-            <a:ext cx="21777840" cy="1450800"/>
+            <a:ext cx="21777480" cy="1450440"/>
           </a:xfrm>
           <a:prstGeom prst="rect">
             <a:avLst/>
@@ -3728,7 +3747,7 @@
         <p:spPr>
           <a:xfrm>
             <a:off x="900000" y="5940000"/>
-            <a:ext cx="22137840" cy="5622840"/>
+            <a:ext cx="22137480" cy="5622480"/>
           </a:xfrm>
           <a:prstGeom prst="rect">
             <a:avLst/>
@@ -3803,7 +3822,7 @@
         <p:spPr>
           <a:xfrm>
             <a:off x="720000" y="3960000"/>
-            <a:ext cx="21777840" cy="1450800"/>
+            <a:ext cx="21777480" cy="1450440"/>
           </a:xfrm>
           <a:prstGeom prst="rect">
             <a:avLst/>
@@ -3848,7 +3867,7 @@
         <p:spPr>
           <a:xfrm>
             <a:off x="900000" y="5940000"/>
-            <a:ext cx="22137840" cy="5622840"/>
+            <a:ext cx="22137480" cy="5622480"/>
           </a:xfrm>
           <a:prstGeom prst="rect">
             <a:avLst/>
@@ -3897,7 +3916,7 @@
         <p:spPr>
           <a:xfrm>
             <a:off x="0" y="-23040"/>
-            <a:ext cx="24382440" cy="13759920"/>
+            <a:ext cx="24382080" cy="13759560"/>
           </a:xfrm>
           <a:prstGeom prst="rect">
             <a:avLst/>
@@ -3946,7 +3965,7 @@
         <p:spPr>
           <a:xfrm>
             <a:off x="720000" y="3960000"/>
-            <a:ext cx="21777840" cy="1450800"/>
+            <a:ext cx="21777480" cy="1450440"/>
           </a:xfrm>
           <a:prstGeom prst="rect">
             <a:avLst/>
@@ -4010,7 +4029,7 @@
         <p:spPr>
           <a:xfrm>
             <a:off x="900000" y="5940000"/>
-            <a:ext cx="22137840" cy="5622840"/>
+            <a:ext cx="22137480" cy="5622480"/>
           </a:xfrm>
           <a:prstGeom prst="rect">
             <a:avLst/>
@@ -4085,7 +4104,7 @@
         <p:spPr>
           <a:xfrm>
             <a:off x="720000" y="3960000"/>
-            <a:ext cx="21777840" cy="1450800"/>
+            <a:ext cx="21777480" cy="1450440"/>
           </a:xfrm>
           <a:prstGeom prst="rect">
             <a:avLst/>
@@ -4130,7 +4149,7 @@
         <p:spPr>
           <a:xfrm>
             <a:off x="900000" y="5940000"/>
-            <a:ext cx="22137840" cy="5622840"/>
+            <a:ext cx="22137480" cy="5622480"/>
           </a:xfrm>
           <a:prstGeom prst="rect">
             <a:avLst/>
@@ -4179,7 +4198,7 @@
         <p:spPr>
           <a:xfrm>
             <a:off x="0" y="45000"/>
-            <a:ext cx="24382440" cy="13669560"/>
+            <a:ext cx="24382080" cy="13669200"/>
           </a:xfrm>
           <a:prstGeom prst="rect">
             <a:avLst/>
@@ -4228,7 +4247,7 @@
         <p:spPr>
           <a:xfrm>
             <a:off x="720000" y="3960000"/>
-            <a:ext cx="21777840" cy="1450800"/>
+            <a:ext cx="21777480" cy="1450440"/>
           </a:xfrm>
           <a:prstGeom prst="rect">
             <a:avLst/>
@@ -4292,7 +4311,7 @@
         <p:spPr>
           <a:xfrm>
             <a:off x="900000" y="5940000"/>
-            <a:ext cx="22137840" cy="5622840"/>
+            <a:ext cx="22137480" cy="5622480"/>
           </a:xfrm>
           <a:prstGeom prst="rect">
             <a:avLst/>
@@ -4367,7 +4386,7 @@
         <p:spPr>
           <a:xfrm>
             <a:off x="720000" y="3960000"/>
-            <a:ext cx="21777840" cy="1450800"/>
+            <a:ext cx="21777480" cy="1450440"/>
           </a:xfrm>
           <a:prstGeom prst="rect">
             <a:avLst/>
@@ -4412,7 +4431,7 @@
         <p:spPr>
           <a:xfrm>
             <a:off x="900000" y="5940000"/>
-            <a:ext cx="22137840" cy="5622840"/>
+            <a:ext cx="22137480" cy="5622480"/>
           </a:xfrm>
           <a:prstGeom prst="rect">
             <a:avLst/>
@@ -4461,7 +4480,7 @@
         <p:spPr>
           <a:xfrm>
             <a:off x="0" y="0"/>
-            <a:ext cx="24392160" cy="13714920"/>
+            <a:ext cx="24391800" cy="13714560"/>
           </a:xfrm>
           <a:prstGeom prst="rect">
             <a:avLst/>
@@ -4510,7 +4529,7 @@
         <p:spPr>
           <a:xfrm>
             <a:off x="720000" y="3960000"/>
-            <a:ext cx="21777840" cy="1450800"/>
+            <a:ext cx="21777480" cy="1450440"/>
           </a:xfrm>
           <a:prstGeom prst="rect">
             <a:avLst/>
@@ -4574,7 +4593,7 @@
         <p:spPr>
           <a:xfrm>
             <a:off x="900000" y="5940000"/>
-            <a:ext cx="22137840" cy="5622840"/>
+            <a:ext cx="22137480" cy="5622480"/>
           </a:xfrm>
           <a:prstGeom prst="rect">
             <a:avLst/>
@@ -4649,7 +4668,7 @@
         <p:spPr>
           <a:xfrm>
             <a:off x="720000" y="3960000"/>
-            <a:ext cx="21777840" cy="4137840"/>
+            <a:ext cx="21777480" cy="4137480"/>
           </a:xfrm>
           <a:prstGeom prst="rect">
             <a:avLst/>
@@ -4703,7 +4722,7 @@
         <p:spPr>
           <a:xfrm>
             <a:off x="1513440" y="7740000"/>
-            <a:ext cx="21807360" cy="4139640"/>
+            <a:ext cx="21807000" cy="4139280"/>
           </a:xfrm>
           <a:prstGeom prst="rect">
             <a:avLst/>
@@ -4734,6 +4753,7 @@
                 <a:srgbClr val="000000"/>
               </a:solidFill>
               <a:latin typeface="Arial"/>
+              <a:ea typeface="Helvetica Neue"/>
             </a:endParaRPr>
           </a:p>
         </p:txBody>
@@ -4777,7 +4797,7 @@
         <p:spPr>
           <a:xfrm>
             <a:off x="720000" y="3960000"/>
-            <a:ext cx="21777840" cy="1450800"/>
+            <a:ext cx="21777480" cy="1450440"/>
           </a:xfrm>
           <a:prstGeom prst="rect">
             <a:avLst/>
@@ -4798,12 +4818,36 @@
             <a:noAutofit/>
           </a:bodyPr>
           <a:p>
-            <a:endParaRPr b="0" lang="pt-BR" sz="1800" spc="-1" strike="noStrike">
-              <a:solidFill>
-                <a:srgbClr val="000000"/>
-              </a:solidFill>
-              <a:latin typeface="Arial"/>
-              <a:ea typeface="Helvetica Neue"/>
+            <a:pPr>
+              <a:lnSpc>
+                <a:spcPct val="100000"/>
+              </a:lnSpc>
+            </a:pPr>
+            <a:r>
+              <a:rPr b="1" lang="pt-BR" sz="9600" spc="-1" strike="noStrike" baseline="33000">
+                <a:solidFill>
+                  <a:srgbClr val="000000"/>
+                </a:solidFill>
+                <a:latin typeface="Arial"/>
+                <a:ea typeface="Helvetica Neue"/>
+              </a:rPr>
+              <a:t>• </a:t>
+            </a:r>
+            <a:r>
+              <a:rPr b="1" lang="pt-BR" sz="9600" spc="-1" strike="noStrike" baseline="33000">
+                <a:solidFill>
+                  <a:srgbClr val="000000"/>
+                </a:solidFill>
+                <a:latin typeface="Arial"/>
+                <a:ea typeface="Helvetica Neue"/>
+              </a:rPr>
+              <a:t>Diagrama de sequência</a:t>
+            </a:r>
+            <a:endParaRPr b="0" lang="pt-BR" sz="9600" spc="-1" strike="noStrike">
+              <a:solidFill>
+                <a:srgbClr val="000000"/>
+              </a:solidFill>
+              <a:latin typeface="Arial"/>
             </a:endParaRPr>
           </a:p>
         </p:txBody>
@@ -4817,7 +4861,7 @@
         <p:spPr>
           <a:xfrm>
             <a:off x="900000" y="5940000"/>
-            <a:ext cx="22137840" cy="5622840"/>
+            <a:ext cx="22137480" cy="5622480"/>
           </a:xfrm>
           <a:prstGeom prst="rect">
             <a:avLst/>
@@ -4848,29 +4892,6 @@
           </a:p>
         </p:txBody>
       </p:sp>
-      <p:pic>
-        <p:nvPicPr>
-          <p:cNvPr id="83" name="" descr=""/>
-          <p:cNvPicPr/>
-          <p:nvPr/>
-        </p:nvPicPr>
-        <p:blipFill>
-          <a:blip r:embed="rId1"/>
-          <a:stretch/>
-        </p:blipFill>
-        <p:spPr>
-          <a:xfrm>
-            <a:off x="0" y="71280"/>
-            <a:ext cx="24383880" cy="13644720"/>
-          </a:xfrm>
-          <a:prstGeom prst="rect">
-            <a:avLst/>
-          </a:prstGeom>
-          <a:ln w="0">
-            <a:noFill/>
-          </a:ln>
-        </p:spPr>
-      </p:pic>
     </p:spTree>
   </p:cSld>
   <mc:AlternateContent>
@@ -4903,14 +4924,14 @@
       </p:grpSpPr>
       <p:sp>
         <p:nvSpPr>
-          <p:cNvPr id="84" name=""/>
+          <p:cNvPr id="83" name=""/>
           <p:cNvSpPr/>
           <p:nvPr/>
         </p:nvSpPr>
         <p:spPr>
           <a:xfrm>
             <a:off x="720000" y="3960000"/>
-            <a:ext cx="21777840" cy="1450800"/>
+            <a:ext cx="21777480" cy="1450440"/>
           </a:xfrm>
           <a:prstGeom prst="rect">
             <a:avLst/>
@@ -4936,45 +4957,26 @@
                 <a:spcPct val="100000"/>
               </a:lnSpc>
             </a:pPr>
-            <a:r>
-              <a:rPr b="1" lang="pt-BR" sz="9600" spc="-1" strike="noStrike" baseline="33000">
-                <a:solidFill>
-                  <a:srgbClr val="000000"/>
-                </a:solidFill>
-                <a:latin typeface="Arial"/>
-                <a:ea typeface="Helvetica Neue"/>
-              </a:rPr>
-              <a:t>• </a:t>
-            </a:r>
-            <a:r>
-              <a:rPr b="1" lang="pt-BR" sz="9600" spc="-1" strike="noStrike" baseline="33000">
-                <a:solidFill>
-                  <a:srgbClr val="000000"/>
-                </a:solidFill>
-                <a:latin typeface="Arial"/>
-                <a:ea typeface="Helvetica Neue"/>
-              </a:rPr>
-              <a:t>Conclusão</a:t>
-            </a:r>
-            <a:endParaRPr b="0" lang="pt-BR" sz="9600" spc="-1" strike="noStrike">
-              <a:solidFill>
-                <a:srgbClr val="000000"/>
-              </a:solidFill>
-              <a:latin typeface="Arial"/>
-            </a:endParaRPr>
-          </a:p>
-        </p:txBody>
-      </p:sp>
-      <p:sp>
-        <p:nvSpPr>
-          <p:cNvPr id="85" name=""/>
+            <a:endParaRPr b="0" lang="pt-BR" sz="1800" spc="-1" strike="noStrike">
+              <a:solidFill>
+                <a:srgbClr val="000000"/>
+              </a:solidFill>
+              <a:latin typeface="Arial"/>
+              <a:ea typeface="Helvetica Neue"/>
+            </a:endParaRPr>
+          </a:p>
+        </p:txBody>
+      </p:sp>
+      <p:sp>
+        <p:nvSpPr>
+          <p:cNvPr id="84" name=""/>
           <p:cNvSpPr/>
           <p:nvPr/>
         </p:nvSpPr>
         <p:spPr>
           <a:xfrm>
             <a:off x="900000" y="5940000"/>
-            <a:ext cx="22137840" cy="5622840"/>
+            <a:ext cx="22137480" cy="5622480"/>
           </a:xfrm>
           <a:prstGeom prst="rect">
             <a:avLst/>
@@ -4995,6 +4997,11 @@
             <a:noAutofit/>
           </a:bodyPr>
           <a:p>
+            <a:pPr>
+              <a:lnSpc>
+                <a:spcPct val="100000"/>
+              </a:lnSpc>
+            </a:pPr>
             <a:endParaRPr b="0" lang="pt-BR" sz="1800" spc="-1" strike="noStrike">
               <a:solidFill>
                 <a:srgbClr val="000000"/>
@@ -5005,6 +5012,29 @@
           </a:p>
         </p:txBody>
       </p:sp>
+      <p:pic>
+        <p:nvPicPr>
+          <p:cNvPr id="85" name="" descr=""/>
+          <p:cNvPicPr/>
+          <p:nvPr/>
+        </p:nvPicPr>
+        <p:blipFill>
+          <a:blip r:embed="rId1"/>
+          <a:stretch/>
+        </p:blipFill>
+        <p:spPr>
+          <a:xfrm>
+            <a:off x="0" y="71280"/>
+            <a:ext cx="24383520" cy="13644360"/>
+          </a:xfrm>
+          <a:prstGeom prst="rect">
+            <a:avLst/>
+          </a:prstGeom>
+          <a:ln w="0">
+            <a:noFill/>
+          </a:ln>
+        </p:spPr>
+      </p:pic>
     </p:spTree>
   </p:cSld>
   <mc:AlternateContent>
@@ -5043,8 +5073,2282 @@
         </p:nvSpPr>
         <p:spPr>
           <a:xfrm>
+            <a:off x="720000" y="3960000"/>
+            <a:ext cx="21777480" cy="1450440"/>
+          </a:xfrm>
+          <a:prstGeom prst="rect">
+            <a:avLst/>
+          </a:prstGeom>
+          <a:noFill/>
+          <a:ln w="0">
+            <a:noFill/>
+          </a:ln>
+        </p:spPr>
+        <p:style>
+          <a:lnRef idx="0"/>
+          <a:fillRef idx="0"/>
+          <a:effectRef idx="0"/>
+          <a:fontRef idx="minor"/>
+        </p:style>
+        <p:txBody>
+          <a:bodyPr lIns="90000" rIns="90000" tIns="45000" bIns="45000" anchor="t">
+            <a:noAutofit/>
+          </a:bodyPr>
+          <a:p>
+            <a:pPr>
+              <a:lnSpc>
+                <a:spcPct val="100000"/>
+              </a:lnSpc>
+            </a:pPr>
+            <a:r>
+              <a:rPr b="1" lang="pt-BR" sz="9600" spc="-1" strike="noStrike" baseline="33000">
+                <a:solidFill>
+                  <a:srgbClr val="000000"/>
+                </a:solidFill>
+                <a:latin typeface="Arial"/>
+                <a:ea typeface="Helvetica Neue"/>
+              </a:rPr>
+              <a:t>• </a:t>
+            </a:r>
+            <a:r>
+              <a:rPr b="1" lang="pt-BR" sz="9600" spc="-1" strike="noStrike" baseline="33000">
+                <a:solidFill>
+                  <a:srgbClr val="000000"/>
+                </a:solidFill>
+                <a:latin typeface="Arial"/>
+                <a:ea typeface="Helvetica Neue"/>
+              </a:rPr>
+              <a:t>Caso de uso criar evento</a:t>
+            </a:r>
+            <a:endParaRPr b="0" lang="pt-BR" sz="9600" spc="-1" strike="noStrike">
+              <a:solidFill>
+                <a:srgbClr val="000000"/>
+              </a:solidFill>
+              <a:latin typeface="Arial"/>
+            </a:endParaRPr>
+          </a:p>
+        </p:txBody>
+      </p:sp>
+      <p:sp>
+        <p:nvSpPr>
+          <p:cNvPr id="87" name=""/>
+          <p:cNvSpPr/>
+          <p:nvPr/>
+        </p:nvSpPr>
+        <p:spPr>
+          <a:xfrm>
+            <a:off x="900000" y="5940000"/>
+            <a:ext cx="22137480" cy="5622480"/>
+          </a:xfrm>
+          <a:prstGeom prst="rect">
+            <a:avLst/>
+          </a:prstGeom>
+          <a:noFill/>
+          <a:ln w="0">
+            <a:noFill/>
+          </a:ln>
+        </p:spPr>
+        <p:style>
+          <a:lnRef idx="0"/>
+          <a:fillRef idx="0"/>
+          <a:effectRef idx="0"/>
+          <a:fontRef idx="minor"/>
+        </p:style>
+        <p:txBody>
+          <a:bodyPr lIns="0" rIns="0" tIns="0" bIns="0" anchor="t">
+            <a:noAutofit/>
+          </a:bodyPr>
+          <a:p>
+            <a:endParaRPr b="0" lang="pt-BR" sz="1800" spc="-1" strike="noStrike">
+              <a:solidFill>
+                <a:srgbClr val="000000"/>
+              </a:solidFill>
+              <a:latin typeface="Arial"/>
+              <a:ea typeface="Helvetica Neue"/>
+            </a:endParaRPr>
+          </a:p>
+        </p:txBody>
+      </p:sp>
+    </p:spTree>
+  </p:cSld>
+  <mc:AlternateContent>
+    <mc:Choice Requires="p14">
+      <p:transition spd="slow" p14:dur="2000"/>
+    </mc:Choice>
+    <mc:Fallback>
+      <p:transition spd="slow"/>
+    </mc:Fallback>
+  </mc:AlternateContent>
+</p:sld>
+</file>
+
+<file path=ppt/slides/slide23.xml><?xml version="1.0" encoding="utf-8"?>
+<p:sld xmlns:a="http://schemas.openxmlformats.org/drawingml/2006/main" xmlns:p="http://schemas.openxmlformats.org/presentationml/2006/main" xmlns:r="http://schemas.openxmlformats.org/officeDocument/2006/relationships" xmlns:p14="http://schemas.microsoft.com/office/powerpoint/2010/main" xmlns:p15="http://schemas.microsoft.com/office/powerpoint/2012/main" xmlns:mc="http://schemas.openxmlformats.org/markup-compatibility/2006">
+  <p:cSld>
+    <p:spTree>
+      <p:nvGrpSpPr>
+        <p:cNvPr id="1" name=""/>
+        <p:cNvGrpSpPr/>
+        <p:nvPr/>
+      </p:nvGrpSpPr>
+      <p:grpSpPr>
+        <a:xfrm>
+          <a:off x="0" y="0"/>
+          <a:ext cx="0" cy="0"/>
+          <a:chOff x="0" y="0"/>
+          <a:chExt cx="0" cy="0"/>
+        </a:xfrm>
+      </p:grpSpPr>
+      <p:sp>
+        <p:nvSpPr>
+          <p:cNvPr id="88" name=""/>
+          <p:cNvSpPr/>
+          <p:nvPr/>
+        </p:nvSpPr>
+        <p:spPr>
+          <a:xfrm>
+            <a:off x="720000" y="3960000"/>
+            <a:ext cx="21777480" cy="1450440"/>
+          </a:xfrm>
+          <a:prstGeom prst="rect">
+            <a:avLst/>
+          </a:prstGeom>
+          <a:noFill/>
+          <a:ln w="0">
+            <a:noFill/>
+          </a:ln>
+        </p:spPr>
+        <p:style>
+          <a:lnRef idx="0"/>
+          <a:fillRef idx="0"/>
+          <a:effectRef idx="0"/>
+          <a:fontRef idx="minor"/>
+        </p:style>
+        <p:txBody>
+          <a:bodyPr lIns="90000" rIns="90000" tIns="45000" bIns="45000" anchor="t">
+            <a:noAutofit/>
+          </a:bodyPr>
+          <a:p>
+            <a:pPr>
+              <a:lnSpc>
+                <a:spcPct val="100000"/>
+              </a:lnSpc>
+            </a:pPr>
+            <a:endParaRPr b="0" lang="pt-BR" sz="1800" spc="-1" strike="noStrike">
+              <a:solidFill>
+                <a:srgbClr val="000000"/>
+              </a:solidFill>
+              <a:latin typeface="Arial"/>
+            </a:endParaRPr>
+          </a:p>
+        </p:txBody>
+      </p:sp>
+      <p:sp>
+        <p:nvSpPr>
+          <p:cNvPr id="89" name=""/>
+          <p:cNvSpPr/>
+          <p:nvPr/>
+        </p:nvSpPr>
+        <p:spPr>
+          <a:xfrm>
+            <a:off x="900000" y="5940000"/>
+            <a:ext cx="22137480" cy="5622480"/>
+          </a:xfrm>
+          <a:prstGeom prst="rect">
+            <a:avLst/>
+          </a:prstGeom>
+          <a:noFill/>
+          <a:ln w="0">
+            <a:noFill/>
+          </a:ln>
+        </p:spPr>
+        <p:style>
+          <a:lnRef idx="0"/>
+          <a:fillRef idx="0"/>
+          <a:effectRef idx="0"/>
+          <a:fontRef idx="minor"/>
+        </p:style>
+        <p:txBody>
+          <a:bodyPr lIns="0" rIns="0" tIns="0" bIns="0" anchor="t">
+            <a:noAutofit/>
+          </a:bodyPr>
+          <a:p>
+            <a:endParaRPr b="0" lang="pt-BR" sz="1800" spc="-1" strike="noStrike">
+              <a:solidFill>
+                <a:srgbClr val="000000"/>
+              </a:solidFill>
+              <a:latin typeface="Arial"/>
+              <a:ea typeface="Helvetica Neue"/>
+            </a:endParaRPr>
+          </a:p>
+        </p:txBody>
+      </p:sp>
+      <p:graphicFrame>
+        <p:nvGraphicFramePr>
+          <p:cNvPr id="90" name=""/>
+          <p:cNvGraphicFramePr/>
+          <p:nvPr/>
+        </p:nvGraphicFramePr>
+        <p:xfrm>
+          <a:off x="7380000" y="2520000"/>
+          <a:ext cx="9720000" cy="10080000"/>
+        </p:xfrm>
+        <a:graphic>
+          <a:graphicData uri="http://schemas.openxmlformats.org/drawingml/2006/table">
+            <a:tbl>
+              <a:tblPr/>
+              <a:tblGrid>
+                <a:gridCol w="5352840"/>
+                <a:gridCol w="4367160"/>
+              </a:tblGrid>
+              <a:tr h="1249920">
+                <a:tc>
+                  <a:txBody>
+                    <a:bodyPr lIns="36000" rIns="36000" tIns="36000" bIns="36000" anchor="t">
+                      <a:noAutofit/>
+                    </a:bodyPr>
+                    <a:p>
+                      <a:pPr algn="just">
+                        <a:lnSpc>
+                          <a:spcPct val="150000"/>
+                        </a:lnSpc>
+                      </a:pPr>
+                      <a:r>
+                        <a:rPr b="0" lang="pt-BR" sz="2400" spc="-1" strike="noStrike">
+                          <a:solidFill>
+                            <a:srgbClr val="000000"/>
+                          </a:solidFill>
+                          <a:latin typeface="Arial"/>
+                        </a:rPr>
+                        <a:t>Nome do Caso de Uso</a:t>
+                      </a:r>
+                      <a:endParaRPr b="0" lang="pt-BR" sz="2400" spc="-1" strike="noStrike">
+                        <a:solidFill>
+                          <a:srgbClr val="000000"/>
+                        </a:solidFill>
+                        <a:latin typeface="Arial"/>
+                      </a:endParaRPr>
+                    </a:p>
+                  </a:txBody>
+                  <a:tcPr anchor="t" marL="36000" marR="36000">
+                    <a:lnL w="7200">
+                      <a:solidFill>
+                        <a:srgbClr val="000000"/>
+                      </a:solidFill>
+                      <a:prstDash val="solid"/>
+                    </a:lnL>
+                    <a:lnR w="7200">
+                      <a:solidFill>
+                        <a:srgbClr val="000000"/>
+                      </a:solidFill>
+                      <a:prstDash val="solid"/>
+                    </a:lnR>
+                    <a:lnT w="7200">
+                      <a:solidFill>
+                        <a:srgbClr val="000000"/>
+                      </a:solidFill>
+                      <a:prstDash val="solid"/>
+                    </a:lnT>
+                    <a:lnB w="7200">
+                      <a:solidFill>
+                        <a:srgbClr val="000000"/>
+                      </a:solidFill>
+                      <a:prstDash val="solid"/>
+                    </a:lnB>
+                    <a:noFill/>
+                  </a:tcPr>
+                </a:tc>
+                <a:tc>
+                  <a:txBody>
+                    <a:bodyPr lIns="36000" rIns="36000" tIns="36000" bIns="36000" anchor="t">
+                      <a:noAutofit/>
+                    </a:bodyPr>
+                    <a:p>
+                      <a:pPr algn="just">
+                        <a:lnSpc>
+                          <a:spcPct val="150000"/>
+                        </a:lnSpc>
+                      </a:pPr>
+                      <a:r>
+                        <a:rPr b="0" i="1" lang="pt-BR" sz="2400" spc="-1" strike="noStrike">
+                          <a:solidFill>
+                            <a:srgbClr val="5b9bd5"/>
+                          </a:solidFill>
+                          <a:latin typeface="Arial"/>
+                        </a:rPr>
+                        <a:t>Criar evento</a:t>
+                      </a:r>
+                      <a:endParaRPr b="0" i="1" lang="pt-BR" sz="2400" spc="-1" strike="noStrike">
+                        <a:solidFill>
+                          <a:srgbClr val="5b9bd5"/>
+                        </a:solidFill>
+                        <a:latin typeface="Arial"/>
+                      </a:endParaRPr>
+                    </a:p>
+                  </a:txBody>
+                  <a:tcPr anchor="t" marL="36000" marR="36000">
+                    <a:lnL w="7200">
+                      <a:solidFill>
+                        <a:srgbClr val="000000"/>
+                      </a:solidFill>
+                      <a:prstDash val="solid"/>
+                    </a:lnL>
+                    <a:lnR w="7200">
+                      <a:solidFill>
+                        <a:srgbClr val="000000"/>
+                      </a:solidFill>
+                      <a:prstDash val="solid"/>
+                    </a:lnR>
+                    <a:lnT w="7200">
+                      <a:solidFill>
+                        <a:srgbClr val="000000"/>
+                      </a:solidFill>
+                      <a:prstDash val="solid"/>
+                    </a:lnT>
+                    <a:lnB w="7200">
+                      <a:solidFill>
+                        <a:srgbClr val="000000"/>
+                      </a:solidFill>
+                      <a:prstDash val="solid"/>
+                    </a:lnB>
+                    <a:noFill/>
+                  </a:tcPr>
+                </a:tc>
+              </a:tr>
+              <a:tr h="1103400">
+                <a:tc>
+                  <a:txBody>
+                    <a:bodyPr lIns="36000" rIns="36000" tIns="36000" bIns="36000" anchor="t">
+                      <a:noAutofit/>
+                    </a:bodyPr>
+                    <a:p>
+                      <a:pPr algn="just">
+                        <a:lnSpc>
+                          <a:spcPct val="150000"/>
+                        </a:lnSpc>
+                      </a:pPr>
+                      <a:r>
+                        <a:rPr b="0" lang="pt-BR" sz="2400" spc="-1" strike="noStrike">
+                          <a:solidFill>
+                            <a:srgbClr val="000000"/>
+                          </a:solidFill>
+                          <a:latin typeface="Arial"/>
+                        </a:rPr>
+                        <a:t>Nome do Cenário</a:t>
+                      </a:r>
+                      <a:endParaRPr b="0" lang="pt-BR" sz="2400" spc="-1" strike="noStrike">
+                        <a:solidFill>
+                          <a:srgbClr val="000000"/>
+                        </a:solidFill>
+                        <a:latin typeface="Arial"/>
+                      </a:endParaRPr>
+                    </a:p>
+                  </a:txBody>
+                  <a:tcPr anchor="t" marL="36000" marR="36000">
+                    <a:lnL w="7200">
+                      <a:solidFill>
+                        <a:srgbClr val="000000"/>
+                      </a:solidFill>
+                      <a:prstDash val="solid"/>
+                    </a:lnL>
+                    <a:lnR w="7200">
+                      <a:solidFill>
+                        <a:srgbClr val="000000"/>
+                      </a:solidFill>
+                      <a:prstDash val="solid"/>
+                    </a:lnR>
+                    <a:lnT w="7200">
+                      <a:solidFill>
+                        <a:srgbClr val="000000"/>
+                      </a:solidFill>
+                      <a:prstDash val="solid"/>
+                    </a:lnT>
+                    <a:lnB w="7200">
+                      <a:solidFill>
+                        <a:srgbClr val="000000"/>
+                      </a:solidFill>
+                      <a:prstDash val="solid"/>
+                    </a:lnB>
+                    <a:noFill/>
+                  </a:tcPr>
+                </a:tc>
+                <a:tc>
+                  <a:txBody>
+                    <a:bodyPr lIns="36000" rIns="36000" tIns="36000" bIns="36000" anchor="t">
+                      <a:noAutofit/>
+                    </a:bodyPr>
+                    <a:p>
+                      <a:pPr algn="just">
+                        <a:lnSpc>
+                          <a:spcPct val="150000"/>
+                        </a:lnSpc>
+                      </a:pPr>
+                      <a:r>
+                        <a:rPr b="0" i="1" lang="pt-BR" sz="2400" spc="-1" strike="noStrike">
+                          <a:solidFill>
+                            <a:srgbClr val="5b9bd5"/>
+                          </a:solidFill>
+                          <a:latin typeface="Arial"/>
+                        </a:rPr>
+                        <a:t>Evento criado com sucesso</a:t>
+                      </a:r>
+                      <a:endParaRPr b="0" i="1" lang="pt-BR" sz="2400" spc="-1" strike="noStrike">
+                        <a:solidFill>
+                          <a:srgbClr val="5b9bd5"/>
+                        </a:solidFill>
+                        <a:latin typeface="Arial"/>
+                      </a:endParaRPr>
+                    </a:p>
+                  </a:txBody>
+                  <a:tcPr anchor="t" marL="36000" marR="36000">
+                    <a:lnL w="7200">
+                      <a:solidFill>
+                        <a:srgbClr val="000000"/>
+                      </a:solidFill>
+                      <a:prstDash val="solid"/>
+                    </a:lnL>
+                    <a:lnR w="7200">
+                      <a:solidFill>
+                        <a:srgbClr val="000000"/>
+                      </a:solidFill>
+                      <a:prstDash val="solid"/>
+                    </a:lnR>
+                    <a:lnT w="7200">
+                      <a:solidFill>
+                        <a:srgbClr val="000000"/>
+                      </a:solidFill>
+                      <a:prstDash val="solid"/>
+                    </a:lnT>
+                    <a:lnB w="7200">
+                      <a:solidFill>
+                        <a:srgbClr val="000000"/>
+                      </a:solidFill>
+                      <a:prstDash val="solid"/>
+                    </a:lnB>
+                    <a:noFill/>
+                  </a:tcPr>
+                </a:tc>
+              </a:tr>
+              <a:tr h="1103400">
+                <a:tc>
+                  <a:txBody>
+                    <a:bodyPr lIns="36000" rIns="36000" tIns="36000" bIns="36000" anchor="t">
+                      <a:noAutofit/>
+                    </a:bodyPr>
+                    <a:p>
+                      <a:pPr algn="just">
+                        <a:lnSpc>
+                          <a:spcPct val="150000"/>
+                        </a:lnSpc>
+                      </a:pPr>
+                      <a:r>
+                        <a:rPr b="0" lang="pt-BR" sz="2400" spc="-1" strike="noStrike">
+                          <a:solidFill>
+                            <a:srgbClr val="000000"/>
+                          </a:solidFill>
+                          <a:latin typeface="Arial"/>
+                        </a:rPr>
+                        <a:t>Atores Envolvidos</a:t>
+                      </a:r>
+                      <a:endParaRPr b="0" lang="pt-BR" sz="2400" spc="-1" strike="noStrike">
+                        <a:solidFill>
+                          <a:srgbClr val="000000"/>
+                        </a:solidFill>
+                        <a:latin typeface="Arial"/>
+                      </a:endParaRPr>
+                    </a:p>
+                  </a:txBody>
+                  <a:tcPr anchor="t" marL="36000" marR="36000">
+                    <a:lnL w="7200">
+                      <a:solidFill>
+                        <a:srgbClr val="000000"/>
+                      </a:solidFill>
+                      <a:prstDash val="solid"/>
+                    </a:lnL>
+                    <a:lnR w="7200">
+                      <a:solidFill>
+                        <a:srgbClr val="000000"/>
+                      </a:solidFill>
+                      <a:prstDash val="solid"/>
+                    </a:lnR>
+                    <a:lnT w="7200">
+                      <a:solidFill>
+                        <a:srgbClr val="000000"/>
+                      </a:solidFill>
+                      <a:prstDash val="solid"/>
+                    </a:lnT>
+                    <a:lnB w="7200">
+                      <a:solidFill>
+                        <a:srgbClr val="000000"/>
+                      </a:solidFill>
+                      <a:prstDash val="solid"/>
+                    </a:lnB>
+                    <a:noFill/>
+                  </a:tcPr>
+                </a:tc>
+                <a:tc>
+                  <a:txBody>
+                    <a:bodyPr lIns="36000" rIns="36000" tIns="36000" bIns="36000" anchor="t">
+                      <a:noAutofit/>
+                    </a:bodyPr>
+                    <a:p>
+                      <a:pPr algn="just">
+                        <a:lnSpc>
+                          <a:spcPct val="150000"/>
+                        </a:lnSpc>
+                      </a:pPr>
+                      <a:r>
+                        <a:rPr b="0" i="1" lang="pt-BR" sz="2400" spc="-1" strike="noStrike">
+                          <a:solidFill>
+                            <a:srgbClr val="5b9bd5"/>
+                          </a:solidFill>
+                          <a:latin typeface="Arial"/>
+                        </a:rPr>
+                        <a:t>Usuário</a:t>
+                      </a:r>
+                      <a:endParaRPr b="0" i="1" lang="pt-BR" sz="2400" spc="-1" strike="noStrike">
+                        <a:solidFill>
+                          <a:srgbClr val="5b9bd5"/>
+                        </a:solidFill>
+                        <a:latin typeface="Arial"/>
+                      </a:endParaRPr>
+                    </a:p>
+                  </a:txBody>
+                  <a:tcPr anchor="t" marL="36000" marR="36000">
+                    <a:lnL w="7200">
+                      <a:solidFill>
+                        <a:srgbClr val="000000"/>
+                      </a:solidFill>
+                      <a:prstDash val="solid"/>
+                    </a:lnL>
+                    <a:lnR w="7200">
+                      <a:solidFill>
+                        <a:srgbClr val="000000"/>
+                      </a:solidFill>
+                      <a:prstDash val="solid"/>
+                    </a:lnR>
+                    <a:lnT w="7200">
+                      <a:solidFill>
+                        <a:srgbClr val="000000"/>
+                      </a:solidFill>
+                      <a:prstDash val="solid"/>
+                    </a:lnT>
+                    <a:lnB w="7200">
+                      <a:solidFill>
+                        <a:srgbClr val="000000"/>
+                      </a:solidFill>
+                      <a:prstDash val="solid"/>
+                    </a:lnB>
+                    <a:noFill/>
+                  </a:tcPr>
+                </a:tc>
+              </a:tr>
+              <a:tr h="1103400">
+                <a:tc>
+                  <a:txBody>
+                    <a:bodyPr lIns="36000" rIns="36000" tIns="36000" bIns="36000" anchor="t">
+                      <a:noAutofit/>
+                    </a:bodyPr>
+                    <a:p>
+                      <a:pPr algn="just">
+                        <a:lnSpc>
+                          <a:spcPct val="150000"/>
+                        </a:lnSpc>
+                      </a:pPr>
+                      <a:r>
+                        <a:rPr b="0" lang="pt-BR" sz="2400" spc="-1" strike="noStrike">
+                          <a:solidFill>
+                            <a:srgbClr val="000000"/>
+                          </a:solidFill>
+                          <a:latin typeface="Arial"/>
+                        </a:rPr>
+                        <a:t>Pré-condição</a:t>
+                      </a:r>
+                      <a:endParaRPr b="0" lang="pt-BR" sz="2400" spc="-1" strike="noStrike">
+                        <a:solidFill>
+                          <a:srgbClr val="000000"/>
+                        </a:solidFill>
+                        <a:latin typeface="Arial"/>
+                      </a:endParaRPr>
+                    </a:p>
+                  </a:txBody>
+                  <a:tcPr anchor="t" marL="36000" marR="36000">
+                    <a:lnL w="7200">
+                      <a:solidFill>
+                        <a:srgbClr val="000000"/>
+                      </a:solidFill>
+                      <a:prstDash val="solid"/>
+                    </a:lnL>
+                    <a:lnR w="7200">
+                      <a:solidFill>
+                        <a:srgbClr val="000000"/>
+                      </a:solidFill>
+                      <a:prstDash val="solid"/>
+                    </a:lnR>
+                    <a:lnT w="7200">
+                      <a:solidFill>
+                        <a:srgbClr val="000000"/>
+                      </a:solidFill>
+                      <a:prstDash val="solid"/>
+                    </a:lnT>
+                    <a:lnB w="7200">
+                      <a:solidFill>
+                        <a:srgbClr val="000000"/>
+                      </a:solidFill>
+                      <a:prstDash val="solid"/>
+                    </a:lnB>
+                    <a:noFill/>
+                  </a:tcPr>
+                </a:tc>
+                <a:tc>
+                  <a:txBody>
+                    <a:bodyPr lIns="36000" rIns="36000" tIns="36000" bIns="36000" anchor="t">
+                      <a:noAutofit/>
+                    </a:bodyPr>
+                    <a:p>
+                      <a:pPr algn="just">
+                        <a:lnSpc>
+                          <a:spcPct val="150000"/>
+                        </a:lnSpc>
+                      </a:pPr>
+                      <a:r>
+                        <a:rPr b="0" i="1" lang="pt-BR" sz="2400" spc="-1" strike="noStrike">
+                          <a:solidFill>
+                            <a:srgbClr val="5b9bd5"/>
+                          </a:solidFill>
+                          <a:latin typeface="Arial"/>
+                        </a:rPr>
+                        <a:t>Usuário estar logado no sistema</a:t>
+                      </a:r>
+                      <a:endParaRPr b="0" i="1" lang="pt-BR" sz="2400" spc="-1" strike="noStrike">
+                        <a:solidFill>
+                          <a:srgbClr val="5b9bd5"/>
+                        </a:solidFill>
+                        <a:latin typeface="Arial"/>
+                      </a:endParaRPr>
+                    </a:p>
+                  </a:txBody>
+                  <a:tcPr anchor="t" marL="36000" marR="36000">
+                    <a:lnL w="7200">
+                      <a:solidFill>
+                        <a:srgbClr val="000000"/>
+                      </a:solidFill>
+                      <a:prstDash val="solid"/>
+                    </a:lnL>
+                    <a:lnR w="7200">
+                      <a:solidFill>
+                        <a:srgbClr val="000000"/>
+                      </a:solidFill>
+                      <a:prstDash val="solid"/>
+                    </a:lnR>
+                    <a:lnT w="7200">
+                      <a:solidFill>
+                        <a:srgbClr val="000000"/>
+                      </a:solidFill>
+                      <a:prstDash val="solid"/>
+                    </a:lnT>
+                    <a:lnB w="7200">
+                      <a:solidFill>
+                        <a:srgbClr val="000000"/>
+                      </a:solidFill>
+                      <a:prstDash val="solid"/>
+                    </a:lnB>
+                    <a:noFill/>
+                  </a:tcPr>
+                </a:tc>
+              </a:tr>
+              <a:tr h="1103400">
+                <a:tc>
+                  <a:txBody>
+                    <a:bodyPr lIns="36000" rIns="36000" tIns="36000" bIns="36000" anchor="t">
+                      <a:noAutofit/>
+                    </a:bodyPr>
+                    <a:p>
+                      <a:pPr algn="just">
+                        <a:lnSpc>
+                          <a:spcPct val="150000"/>
+                        </a:lnSpc>
+                      </a:pPr>
+                      <a:r>
+                        <a:rPr b="0" lang="pt-BR" sz="2400" spc="-1" strike="noStrike">
+                          <a:solidFill>
+                            <a:srgbClr val="000000"/>
+                          </a:solidFill>
+                          <a:latin typeface="Arial"/>
+                        </a:rPr>
+                        <a:t>Pós-condição</a:t>
+                      </a:r>
+                      <a:endParaRPr b="0" lang="pt-BR" sz="2400" spc="-1" strike="noStrike">
+                        <a:solidFill>
+                          <a:srgbClr val="000000"/>
+                        </a:solidFill>
+                        <a:latin typeface="Arial"/>
+                      </a:endParaRPr>
+                    </a:p>
+                  </a:txBody>
+                  <a:tcPr anchor="t" marL="36000" marR="36000">
+                    <a:lnL w="7200">
+                      <a:solidFill>
+                        <a:srgbClr val="000000"/>
+                      </a:solidFill>
+                      <a:prstDash val="solid"/>
+                    </a:lnL>
+                    <a:lnR w="7200">
+                      <a:solidFill>
+                        <a:srgbClr val="000000"/>
+                      </a:solidFill>
+                      <a:prstDash val="solid"/>
+                    </a:lnR>
+                    <a:lnT w="7200">
+                      <a:solidFill>
+                        <a:srgbClr val="000000"/>
+                      </a:solidFill>
+                      <a:prstDash val="solid"/>
+                    </a:lnT>
+                    <a:lnB w="7200">
+                      <a:solidFill>
+                        <a:srgbClr val="000000"/>
+                      </a:solidFill>
+                      <a:prstDash val="solid"/>
+                    </a:lnB>
+                    <a:noFill/>
+                  </a:tcPr>
+                </a:tc>
+                <a:tc>
+                  <a:txBody>
+                    <a:bodyPr lIns="36000" rIns="36000" tIns="36000" bIns="36000" anchor="t">
+                      <a:noAutofit/>
+                    </a:bodyPr>
+                    <a:p>
+                      <a:pPr algn="just">
+                        <a:lnSpc>
+                          <a:spcPct val="150000"/>
+                        </a:lnSpc>
+                      </a:pPr>
+                      <a:r>
+                        <a:rPr b="0" i="1" lang="pt-BR" sz="2400" spc="-1" strike="noStrike">
+                          <a:solidFill>
+                            <a:srgbClr val="5b9bd5"/>
+                          </a:solidFill>
+                          <a:latin typeface="Arial"/>
+                        </a:rPr>
+                        <a:t>Ter o evento criado em sua conta</a:t>
+                      </a:r>
+                      <a:endParaRPr b="0" i="1" lang="pt-BR" sz="2400" spc="-1" strike="noStrike">
+                        <a:solidFill>
+                          <a:srgbClr val="5b9bd5"/>
+                        </a:solidFill>
+                        <a:latin typeface="Arial"/>
+                      </a:endParaRPr>
+                    </a:p>
+                  </a:txBody>
+                  <a:tcPr anchor="t" marL="36000" marR="36000">
+                    <a:lnL w="7200">
+                      <a:solidFill>
+                        <a:srgbClr val="000000"/>
+                      </a:solidFill>
+                      <a:prstDash val="solid"/>
+                    </a:lnL>
+                    <a:lnR w="7200">
+                      <a:solidFill>
+                        <a:srgbClr val="000000"/>
+                      </a:solidFill>
+                      <a:prstDash val="solid"/>
+                    </a:lnR>
+                    <a:lnT w="7200">
+                      <a:solidFill>
+                        <a:srgbClr val="000000"/>
+                      </a:solidFill>
+                      <a:prstDash val="solid"/>
+                    </a:lnT>
+                    <a:lnB w="7200">
+                      <a:solidFill>
+                        <a:srgbClr val="000000"/>
+                      </a:solidFill>
+                      <a:prstDash val="solid"/>
+                    </a:lnB>
+                    <a:noFill/>
+                  </a:tcPr>
+                </a:tc>
+              </a:tr>
+              <a:tr h="1103400">
+                <a:tc>
+                  <a:txBody>
+                    <a:bodyPr lIns="36000" rIns="36000" tIns="36000" bIns="36000" anchor="t">
+                      <a:noAutofit/>
+                    </a:bodyPr>
+                    <a:p>
+                      <a:pPr algn="just">
+                        <a:lnSpc>
+                          <a:spcPct val="150000"/>
+                        </a:lnSpc>
+                      </a:pPr>
+                      <a:r>
+                        <a:rPr b="0" lang="pt-BR" sz="2400" spc="-1" strike="noStrike">
+                          <a:solidFill>
+                            <a:srgbClr val="000000"/>
+                          </a:solidFill>
+                          <a:latin typeface="Arial"/>
+                        </a:rPr>
+                        <a:t>Ator</a:t>
+                      </a:r>
+                      <a:endParaRPr b="0" lang="pt-BR" sz="2400" spc="-1" strike="noStrike">
+                        <a:solidFill>
+                          <a:srgbClr val="000000"/>
+                        </a:solidFill>
+                        <a:latin typeface="Arial"/>
+                      </a:endParaRPr>
+                    </a:p>
+                  </a:txBody>
+                  <a:tcPr anchor="t" marL="36000" marR="36000">
+                    <a:lnL w="7200">
+                      <a:solidFill>
+                        <a:srgbClr val="000000"/>
+                      </a:solidFill>
+                      <a:prstDash val="solid"/>
+                    </a:lnL>
+                    <a:lnR w="7200">
+                      <a:solidFill>
+                        <a:srgbClr val="000000"/>
+                      </a:solidFill>
+                      <a:prstDash val="solid"/>
+                    </a:lnR>
+                    <a:lnT w="7200">
+                      <a:solidFill>
+                        <a:srgbClr val="000000"/>
+                      </a:solidFill>
+                      <a:prstDash val="solid"/>
+                    </a:lnT>
+                    <a:lnB w="7200">
+                      <a:solidFill>
+                        <a:srgbClr val="000000"/>
+                      </a:solidFill>
+                      <a:prstDash val="solid"/>
+                    </a:lnB>
+                    <a:noFill/>
+                  </a:tcPr>
+                </a:tc>
+                <a:tc>
+                  <a:txBody>
+                    <a:bodyPr lIns="36000" rIns="36000" tIns="36000" bIns="36000" anchor="t">
+                      <a:noAutofit/>
+                    </a:bodyPr>
+                    <a:p>
+                      <a:pPr algn="just">
+                        <a:lnSpc>
+                          <a:spcPct val="150000"/>
+                        </a:lnSpc>
+                      </a:pPr>
+                      <a:r>
+                        <a:rPr b="0" lang="pt-BR" sz="2400" spc="-1" strike="noStrike">
+                          <a:solidFill>
+                            <a:srgbClr val="000000"/>
+                          </a:solidFill>
+                          <a:latin typeface="Arial"/>
+                        </a:rPr>
+                        <a:t>Sistema</a:t>
+                      </a:r>
+                      <a:endParaRPr b="0" lang="pt-BR" sz="2400" spc="-1" strike="noStrike">
+                        <a:solidFill>
+                          <a:srgbClr val="000000"/>
+                        </a:solidFill>
+                        <a:latin typeface="Arial"/>
+                      </a:endParaRPr>
+                    </a:p>
+                  </a:txBody>
+                  <a:tcPr anchor="t" marL="36000" marR="36000">
+                    <a:lnL w="7200">
+                      <a:solidFill>
+                        <a:srgbClr val="000000"/>
+                      </a:solidFill>
+                      <a:prstDash val="solid"/>
+                    </a:lnL>
+                    <a:lnR w="7200">
+                      <a:solidFill>
+                        <a:srgbClr val="000000"/>
+                      </a:solidFill>
+                      <a:prstDash val="solid"/>
+                    </a:lnR>
+                    <a:lnT w="7200">
+                      <a:solidFill>
+                        <a:srgbClr val="000000"/>
+                      </a:solidFill>
+                      <a:prstDash val="solid"/>
+                    </a:lnT>
+                    <a:lnB w="7200">
+                      <a:solidFill>
+                        <a:srgbClr val="000000"/>
+                      </a:solidFill>
+                      <a:prstDash val="solid"/>
+                    </a:lnB>
+                    <a:noFill/>
+                  </a:tcPr>
+                </a:tc>
+              </a:tr>
+              <a:tr h="1103400">
+                <a:tc>
+                  <a:txBody>
+                    <a:bodyPr lIns="36000" rIns="36000" tIns="36000" bIns="36000" anchor="t">
+                      <a:noAutofit/>
+                    </a:bodyPr>
+                    <a:p>
+                      <a:pPr algn="just">
+                        <a:lnSpc>
+                          <a:spcPct val="150000"/>
+                        </a:lnSpc>
+                      </a:pPr>
+                      <a:r>
+                        <a:rPr b="0" i="1" lang="pt-BR" sz="2400" spc="-1" strike="noStrike">
+                          <a:solidFill>
+                            <a:srgbClr val="5b9bd5"/>
+                          </a:solidFill>
+                          <a:latin typeface="Arial"/>
+                        </a:rPr>
+                        <a:t>1. Informa nome do evento.</a:t>
+                      </a:r>
+                      <a:endParaRPr b="0" i="1" lang="pt-BR" sz="2400" spc="-1" strike="noStrike">
+                        <a:solidFill>
+                          <a:srgbClr val="5b9bd5"/>
+                        </a:solidFill>
+                        <a:latin typeface="Arial"/>
+                      </a:endParaRPr>
+                    </a:p>
+                  </a:txBody>
+                  <a:tcPr anchor="t" marL="36000" marR="36000">
+                    <a:lnL w="7200">
+                      <a:solidFill>
+                        <a:srgbClr val="000000"/>
+                      </a:solidFill>
+                      <a:prstDash val="solid"/>
+                    </a:lnL>
+                    <a:lnR w="7200">
+                      <a:solidFill>
+                        <a:srgbClr val="000000"/>
+                      </a:solidFill>
+                      <a:prstDash val="solid"/>
+                    </a:lnR>
+                    <a:lnT w="7200">
+                      <a:solidFill>
+                        <a:srgbClr val="000000"/>
+                      </a:solidFill>
+                      <a:prstDash val="solid"/>
+                    </a:lnT>
+                    <a:lnB w="7200">
+                      <a:solidFill>
+                        <a:srgbClr val="000000"/>
+                      </a:solidFill>
+                      <a:prstDash val="solid"/>
+                    </a:lnB>
+                    <a:noFill/>
+                  </a:tcPr>
+                </a:tc>
+                <a:tc>
+                  <a:txBody>
+                    <a:bodyPr lIns="36000" rIns="36000" tIns="36000" bIns="36000" anchor="t">
+                      <a:noAutofit/>
+                    </a:bodyPr>
+                    <a:p>
+                      <a:pPr algn="just">
+                        <a:lnSpc>
+                          <a:spcPct val="150000"/>
+                        </a:lnSpc>
+                      </a:pPr>
+                      <a:endParaRPr b="0" lang="pt-BR" sz="2400" spc="-1" strike="noStrike">
+                        <a:solidFill>
+                          <a:srgbClr val="5b9bd5"/>
+                        </a:solidFill>
+                        <a:latin typeface="Arial"/>
+                      </a:endParaRPr>
+                    </a:p>
+                  </a:txBody>
+                  <a:tcPr anchor="t" marL="36000" marR="36000">
+                    <a:lnL w="7200">
+                      <a:solidFill>
+                        <a:srgbClr val="000000"/>
+                      </a:solidFill>
+                      <a:prstDash val="solid"/>
+                    </a:lnL>
+                    <a:lnR w="7200">
+                      <a:solidFill>
+                        <a:srgbClr val="000000"/>
+                      </a:solidFill>
+                      <a:prstDash val="solid"/>
+                    </a:lnR>
+                    <a:lnT w="7200">
+                      <a:solidFill>
+                        <a:srgbClr val="000000"/>
+                      </a:solidFill>
+                      <a:prstDash val="solid"/>
+                    </a:lnT>
+                    <a:lnB w="7200">
+                      <a:solidFill>
+                        <a:srgbClr val="000000"/>
+                      </a:solidFill>
+                      <a:prstDash val="solid"/>
+                    </a:lnB>
+                    <a:noFill/>
+                  </a:tcPr>
+                </a:tc>
+              </a:tr>
+              <a:tr h="1103400">
+                <a:tc>
+                  <a:txBody>
+                    <a:bodyPr lIns="36000" rIns="36000" tIns="36000" bIns="36000" anchor="t">
+                      <a:noAutofit/>
+                    </a:bodyPr>
+                    <a:p>
+                      <a:pPr algn="just">
+                        <a:lnSpc>
+                          <a:spcPct val="150000"/>
+                        </a:lnSpc>
+                      </a:pPr>
+                      <a:r>
+                        <a:rPr b="0" i="1" lang="pt-BR" sz="2400" spc="-1" strike="noStrike">
+                          <a:solidFill>
+                            <a:srgbClr val="5b9bd5"/>
+                          </a:solidFill>
+                          <a:latin typeface="Arial"/>
+                        </a:rPr>
+                        <a:t>2. Informa descrição do evento.</a:t>
+                      </a:r>
+                      <a:endParaRPr b="0" i="1" lang="pt-BR" sz="2400" spc="-1" strike="noStrike">
+                        <a:solidFill>
+                          <a:srgbClr val="5b9bd5"/>
+                        </a:solidFill>
+                        <a:latin typeface="Arial"/>
+                      </a:endParaRPr>
+                    </a:p>
+                  </a:txBody>
+                  <a:tcPr anchor="t" marL="36000" marR="36000">
+                    <a:lnL w="7200">
+                      <a:solidFill>
+                        <a:srgbClr val="000000"/>
+                      </a:solidFill>
+                      <a:prstDash val="solid"/>
+                    </a:lnL>
+                    <a:lnR w="7200">
+                      <a:solidFill>
+                        <a:srgbClr val="000000"/>
+                      </a:solidFill>
+                      <a:prstDash val="solid"/>
+                    </a:lnR>
+                    <a:lnT w="7200">
+                      <a:solidFill>
+                        <a:srgbClr val="000000"/>
+                      </a:solidFill>
+                      <a:prstDash val="solid"/>
+                    </a:lnT>
+                    <a:lnB w="7200">
+                      <a:solidFill>
+                        <a:srgbClr val="000000"/>
+                      </a:solidFill>
+                      <a:prstDash val="solid"/>
+                    </a:lnB>
+                    <a:noFill/>
+                  </a:tcPr>
+                </a:tc>
+                <a:tc>
+                  <a:txBody>
+                    <a:bodyPr lIns="36000" rIns="36000" tIns="36000" bIns="36000" anchor="t">
+                      <a:noAutofit/>
+                    </a:bodyPr>
+                    <a:p>
+                      <a:pPr algn="just">
+                        <a:lnSpc>
+                          <a:spcPct val="150000"/>
+                        </a:lnSpc>
+                      </a:pPr>
+                      <a:endParaRPr b="0" lang="pt-BR" sz="2400" spc="-1" strike="noStrike">
+                        <a:solidFill>
+                          <a:srgbClr val="5b9bd5"/>
+                        </a:solidFill>
+                        <a:latin typeface="Arial"/>
+                      </a:endParaRPr>
+                    </a:p>
+                  </a:txBody>
+                  <a:tcPr anchor="t" marL="36000" marR="36000">
+                    <a:lnL w="7200">
+                      <a:solidFill>
+                        <a:srgbClr val="000000"/>
+                      </a:solidFill>
+                      <a:prstDash val="solid"/>
+                    </a:lnL>
+                    <a:lnR w="7200">
+                      <a:solidFill>
+                        <a:srgbClr val="000000"/>
+                      </a:solidFill>
+                      <a:prstDash val="solid"/>
+                    </a:lnR>
+                    <a:lnT w="7200">
+                      <a:solidFill>
+                        <a:srgbClr val="000000"/>
+                      </a:solidFill>
+                      <a:prstDash val="solid"/>
+                    </a:lnT>
+                    <a:lnB w="7200">
+                      <a:solidFill>
+                        <a:srgbClr val="000000"/>
+                      </a:solidFill>
+                      <a:prstDash val="solid"/>
+                    </a:lnB>
+                    <a:noFill/>
+                  </a:tcPr>
+                </a:tc>
+              </a:tr>
+              <a:tr h="1106280">
+                <a:tc>
+                  <a:txBody>
+                    <a:bodyPr lIns="36000" rIns="36000" tIns="36000" bIns="36000" anchor="t">
+                      <a:noAutofit/>
+                    </a:bodyPr>
+                    <a:p>
+                      <a:pPr algn="just">
+                        <a:lnSpc>
+                          <a:spcPct val="150000"/>
+                        </a:lnSpc>
+                      </a:pPr>
+                      <a:r>
+                        <a:rPr b="0" i="1" lang="pt-BR" sz="2400" spc="-1" strike="noStrike">
+                          <a:solidFill>
+                            <a:srgbClr val="5b9bd5"/>
+                          </a:solidFill>
+                          <a:latin typeface="Arial"/>
+                        </a:rPr>
+                        <a:t>3. Informa data de início.</a:t>
+                      </a:r>
+                      <a:endParaRPr b="0" i="1" lang="pt-BR" sz="2400" spc="-1" strike="noStrike">
+                        <a:solidFill>
+                          <a:srgbClr val="5b9bd5"/>
+                        </a:solidFill>
+                        <a:latin typeface="Arial"/>
+                      </a:endParaRPr>
+                    </a:p>
+                  </a:txBody>
+                  <a:tcPr anchor="t" marL="36000" marR="36000">
+                    <a:lnL w="7200">
+                      <a:solidFill>
+                        <a:srgbClr val="000000"/>
+                      </a:solidFill>
+                      <a:prstDash val="solid"/>
+                    </a:lnL>
+                    <a:lnR w="7200">
+                      <a:solidFill>
+                        <a:srgbClr val="000000"/>
+                      </a:solidFill>
+                      <a:prstDash val="solid"/>
+                    </a:lnR>
+                    <a:lnT w="7200">
+                      <a:solidFill>
+                        <a:srgbClr val="000000"/>
+                      </a:solidFill>
+                      <a:prstDash val="solid"/>
+                    </a:lnT>
+                    <a:lnB w="7200">
+                      <a:solidFill>
+                        <a:srgbClr val="000000"/>
+                      </a:solidFill>
+                      <a:prstDash val="solid"/>
+                    </a:lnB>
+                    <a:noFill/>
+                  </a:tcPr>
+                </a:tc>
+                <a:tc>
+                  <a:txBody>
+                    <a:bodyPr lIns="36000" rIns="36000" tIns="36000" bIns="36000" anchor="t">
+                      <a:noAutofit/>
+                    </a:bodyPr>
+                    <a:p>
+                      <a:pPr algn="just">
+                        <a:lnSpc>
+                          <a:spcPct val="150000"/>
+                        </a:lnSpc>
+                      </a:pPr>
+                      <a:endParaRPr b="0" lang="pt-BR" sz="2400" spc="-1" strike="noStrike">
+                        <a:solidFill>
+                          <a:srgbClr val="5b9bd5"/>
+                        </a:solidFill>
+                        <a:latin typeface="Arial"/>
+                      </a:endParaRPr>
+                    </a:p>
+                  </a:txBody>
+                  <a:tcPr anchor="t" marL="36000" marR="36000">
+                    <a:lnL w="7200">
+                      <a:solidFill>
+                        <a:srgbClr val="000000"/>
+                      </a:solidFill>
+                      <a:prstDash val="solid"/>
+                    </a:lnL>
+                    <a:lnR w="7200">
+                      <a:solidFill>
+                        <a:srgbClr val="000000"/>
+                      </a:solidFill>
+                      <a:prstDash val="solid"/>
+                    </a:lnR>
+                    <a:lnT w="7200">
+                      <a:solidFill>
+                        <a:srgbClr val="000000"/>
+                      </a:solidFill>
+                      <a:prstDash val="solid"/>
+                    </a:lnT>
+                    <a:lnB w="7200">
+                      <a:solidFill>
+                        <a:srgbClr val="000000"/>
+                      </a:solidFill>
+                      <a:prstDash val="solid"/>
+                    </a:lnB>
+                    <a:noFill/>
+                  </a:tcPr>
+                </a:tc>
+              </a:tr>
+            </a:tbl>
+          </a:graphicData>
+        </a:graphic>
+      </p:graphicFrame>
+    </p:spTree>
+  </p:cSld>
+  <mc:AlternateContent>
+    <mc:Choice Requires="p14">
+      <p:transition spd="slow" p14:dur="2000"/>
+    </mc:Choice>
+    <mc:Fallback>
+      <p:transition spd="slow"/>
+    </mc:Fallback>
+  </mc:AlternateContent>
+</p:sld>
+</file>
+
+<file path=ppt/slides/slide24.xml><?xml version="1.0" encoding="utf-8"?>
+<p:sld xmlns:a="http://schemas.openxmlformats.org/drawingml/2006/main" xmlns:p="http://schemas.openxmlformats.org/presentationml/2006/main" xmlns:r="http://schemas.openxmlformats.org/officeDocument/2006/relationships" xmlns:p14="http://schemas.microsoft.com/office/powerpoint/2010/main" xmlns:p15="http://schemas.microsoft.com/office/powerpoint/2012/main" xmlns:mc="http://schemas.openxmlformats.org/markup-compatibility/2006">
+  <p:cSld>
+    <p:spTree>
+      <p:nvGrpSpPr>
+        <p:cNvPr id="1" name=""/>
+        <p:cNvGrpSpPr/>
+        <p:nvPr/>
+      </p:nvGrpSpPr>
+      <p:grpSpPr>
+        <a:xfrm>
+          <a:off x="0" y="0"/>
+          <a:ext cx="0" cy="0"/>
+          <a:chOff x="0" y="0"/>
+          <a:chExt cx="0" cy="0"/>
+        </a:xfrm>
+      </p:grpSpPr>
+      <p:sp>
+        <p:nvSpPr>
+          <p:cNvPr id="91" name=""/>
+          <p:cNvSpPr/>
+          <p:nvPr/>
+        </p:nvSpPr>
+        <p:spPr>
+          <a:xfrm>
+            <a:off x="720000" y="3960000"/>
+            <a:ext cx="21777480" cy="1450440"/>
+          </a:xfrm>
+          <a:prstGeom prst="rect">
+            <a:avLst/>
+          </a:prstGeom>
+          <a:noFill/>
+          <a:ln w="0">
+            <a:noFill/>
+          </a:ln>
+        </p:spPr>
+        <p:style>
+          <a:lnRef idx="0"/>
+          <a:fillRef idx="0"/>
+          <a:effectRef idx="0"/>
+          <a:fontRef idx="minor"/>
+        </p:style>
+        <p:txBody>
+          <a:bodyPr lIns="90000" rIns="90000" tIns="45000" bIns="45000" anchor="t">
+            <a:noAutofit/>
+          </a:bodyPr>
+          <a:p>
+            <a:endParaRPr b="0" lang="pt-BR" sz="1800" spc="-1" strike="noStrike">
+              <a:solidFill>
+                <a:srgbClr val="000000"/>
+              </a:solidFill>
+              <a:latin typeface="Arial"/>
+            </a:endParaRPr>
+          </a:p>
+        </p:txBody>
+      </p:sp>
+      <p:sp>
+        <p:nvSpPr>
+          <p:cNvPr id="92" name=""/>
+          <p:cNvSpPr/>
+          <p:nvPr/>
+        </p:nvSpPr>
+        <p:spPr>
+          <a:xfrm>
+            <a:off x="900000" y="5940000"/>
+            <a:ext cx="22137480" cy="5622480"/>
+          </a:xfrm>
+          <a:prstGeom prst="rect">
+            <a:avLst/>
+          </a:prstGeom>
+          <a:noFill/>
+          <a:ln w="0">
+            <a:noFill/>
+          </a:ln>
+        </p:spPr>
+        <p:style>
+          <a:lnRef idx="0"/>
+          <a:fillRef idx="0"/>
+          <a:effectRef idx="0"/>
+          <a:fontRef idx="minor"/>
+        </p:style>
+        <p:txBody>
+          <a:bodyPr lIns="0" rIns="0" tIns="0" bIns="0" anchor="t">
+            <a:noAutofit/>
+          </a:bodyPr>
+          <a:p>
+            <a:endParaRPr b="0" lang="pt-BR" sz="1800" spc="-1" strike="noStrike">
+              <a:solidFill>
+                <a:srgbClr val="000000"/>
+              </a:solidFill>
+              <a:latin typeface="Arial"/>
+              <a:ea typeface="Helvetica Neue"/>
+            </a:endParaRPr>
+          </a:p>
+        </p:txBody>
+      </p:sp>
+      <p:graphicFrame>
+        <p:nvGraphicFramePr>
+          <p:cNvPr id="93" name=""/>
+          <p:cNvGraphicFramePr/>
+          <p:nvPr/>
+        </p:nvGraphicFramePr>
+        <p:xfrm>
+          <a:off x="7543800" y="2776680"/>
+          <a:ext cx="9540000" cy="9540000"/>
+        </p:xfrm>
+        <a:graphic>
+          <a:graphicData uri="http://schemas.openxmlformats.org/drawingml/2006/table">
+            <a:tbl>
+              <a:tblPr/>
+              <a:tblGrid>
+                <a:gridCol w="5253840"/>
+                <a:gridCol w="4286160"/>
+              </a:tblGrid>
+              <a:tr h="1368360">
+                <a:tc>
+                  <a:txBody>
+                    <a:bodyPr lIns="36000" rIns="36000" tIns="36000" bIns="36000" anchor="t">
+                      <a:noAutofit/>
+                    </a:bodyPr>
+                    <a:p>
+                      <a:pPr algn="just">
+                        <a:lnSpc>
+                          <a:spcPct val="150000"/>
+                        </a:lnSpc>
+                      </a:pPr>
+                      <a:r>
+                        <a:rPr b="0" i="1" lang="pt-BR" sz="2200" spc="-1" strike="noStrike">
+                          <a:solidFill>
+                            <a:srgbClr val="5b9bd5"/>
+                          </a:solidFill>
+                          <a:latin typeface="Arial"/>
+                        </a:rPr>
+                        <a:t>4. Informa data de finalização.</a:t>
+                      </a:r>
+                      <a:endParaRPr b="0" i="1" lang="pt-BR" sz="2200" spc="-1" strike="noStrike">
+                        <a:solidFill>
+                          <a:srgbClr val="5b9bd5"/>
+                        </a:solidFill>
+                        <a:latin typeface="Arial"/>
+                      </a:endParaRPr>
+                    </a:p>
+                  </a:txBody>
+                  <a:tcPr anchor="t" marL="36000" marR="36000">
+                    <a:lnL w="7200">
+                      <a:solidFill>
+                        <a:srgbClr val="000000"/>
+                      </a:solidFill>
+                      <a:prstDash val="solid"/>
+                    </a:lnL>
+                    <a:lnR w="7200">
+                      <a:solidFill>
+                        <a:srgbClr val="000000"/>
+                      </a:solidFill>
+                      <a:prstDash val="solid"/>
+                    </a:lnR>
+                    <a:lnT w="7200">
+                      <a:solidFill>
+                        <a:srgbClr val="000000"/>
+                      </a:solidFill>
+                      <a:prstDash val="solid"/>
+                    </a:lnT>
+                    <a:lnB w="7200">
+                      <a:solidFill>
+                        <a:srgbClr val="000000"/>
+                      </a:solidFill>
+                      <a:prstDash val="solid"/>
+                    </a:lnB>
+                    <a:noFill/>
+                  </a:tcPr>
+                </a:tc>
+                <a:tc>
+                  <a:txBody>
+                    <a:bodyPr lIns="36000" rIns="36000" tIns="36000" bIns="36000" anchor="t">
+                      <a:noAutofit/>
+                    </a:bodyPr>
+                    <a:p>
+                      <a:pPr algn="just">
+                        <a:lnSpc>
+                          <a:spcPct val="150000"/>
+                        </a:lnSpc>
+                      </a:pPr>
+                      <a:endParaRPr b="0" lang="pt-BR" sz="2200" spc="-1" strike="noStrike">
+                        <a:solidFill>
+                          <a:srgbClr val="5b9bd5"/>
+                        </a:solidFill>
+                        <a:latin typeface="Arial"/>
+                      </a:endParaRPr>
+                    </a:p>
+                  </a:txBody>
+                  <a:tcPr anchor="t" marL="36000" marR="36000">
+                    <a:lnL w="7200">
+                      <a:solidFill>
+                        <a:srgbClr val="000000"/>
+                      </a:solidFill>
+                      <a:prstDash val="solid"/>
+                    </a:lnL>
+                    <a:lnR w="7200">
+                      <a:solidFill>
+                        <a:srgbClr val="000000"/>
+                      </a:solidFill>
+                      <a:prstDash val="solid"/>
+                    </a:lnR>
+                    <a:lnT w="7200">
+                      <a:solidFill>
+                        <a:srgbClr val="000000"/>
+                      </a:solidFill>
+                      <a:prstDash val="solid"/>
+                    </a:lnT>
+                    <a:lnB w="7200">
+                      <a:solidFill>
+                        <a:srgbClr val="000000"/>
+                      </a:solidFill>
+                      <a:prstDash val="solid"/>
+                    </a:lnB>
+                    <a:noFill/>
+                  </a:tcPr>
+                </a:tc>
+              </a:tr>
+              <a:tr h="1207800">
+                <a:tc>
+                  <a:txBody>
+                    <a:bodyPr lIns="36000" rIns="36000" tIns="36000" bIns="36000" anchor="t">
+                      <a:noAutofit/>
+                    </a:bodyPr>
+                    <a:p>
+                      <a:pPr algn="just">
+                        <a:lnSpc>
+                          <a:spcPct val="150000"/>
+                        </a:lnSpc>
+                      </a:pPr>
+                      <a:r>
+                        <a:rPr b="0" i="1" lang="pt-BR" sz="2200" spc="-1" strike="noStrike">
+                          <a:solidFill>
+                            <a:srgbClr val="5b9bd5"/>
+                          </a:solidFill>
+                          <a:latin typeface="Arial"/>
+                        </a:rPr>
+                        <a:t>5. Insere imagem (opcional).</a:t>
+                      </a:r>
+                      <a:endParaRPr b="0" i="1" lang="pt-BR" sz="2200" spc="-1" strike="noStrike">
+                        <a:solidFill>
+                          <a:srgbClr val="5b9bd5"/>
+                        </a:solidFill>
+                        <a:latin typeface="Arial"/>
+                      </a:endParaRPr>
+                    </a:p>
+                  </a:txBody>
+                  <a:tcPr anchor="t" marL="36000" marR="36000">
+                    <a:lnL w="7200">
+                      <a:solidFill>
+                        <a:srgbClr val="000000"/>
+                      </a:solidFill>
+                      <a:prstDash val="solid"/>
+                    </a:lnL>
+                    <a:lnR w="7200">
+                      <a:solidFill>
+                        <a:srgbClr val="000000"/>
+                      </a:solidFill>
+                      <a:prstDash val="solid"/>
+                    </a:lnR>
+                    <a:lnT w="7200">
+                      <a:solidFill>
+                        <a:srgbClr val="000000"/>
+                      </a:solidFill>
+                      <a:prstDash val="solid"/>
+                    </a:lnT>
+                    <a:lnB w="7200">
+                      <a:solidFill>
+                        <a:srgbClr val="000000"/>
+                      </a:solidFill>
+                      <a:prstDash val="solid"/>
+                    </a:lnB>
+                    <a:noFill/>
+                  </a:tcPr>
+                </a:tc>
+                <a:tc>
+                  <a:txBody>
+                    <a:bodyPr lIns="36000" rIns="36000" tIns="36000" bIns="36000" anchor="t">
+                      <a:noAutofit/>
+                    </a:bodyPr>
+                    <a:p>
+                      <a:pPr algn="just">
+                        <a:lnSpc>
+                          <a:spcPct val="150000"/>
+                        </a:lnSpc>
+                      </a:pPr>
+                      <a:endParaRPr b="0" lang="pt-BR" sz="2200" spc="-1" strike="noStrike">
+                        <a:solidFill>
+                          <a:srgbClr val="5b9bd5"/>
+                        </a:solidFill>
+                        <a:latin typeface="Arial"/>
+                      </a:endParaRPr>
+                    </a:p>
+                  </a:txBody>
+                  <a:tcPr anchor="t" marL="36000" marR="36000">
+                    <a:lnL w="7200">
+                      <a:solidFill>
+                        <a:srgbClr val="000000"/>
+                      </a:solidFill>
+                      <a:prstDash val="solid"/>
+                    </a:lnL>
+                    <a:lnR w="7200">
+                      <a:solidFill>
+                        <a:srgbClr val="000000"/>
+                      </a:solidFill>
+                      <a:prstDash val="solid"/>
+                    </a:lnR>
+                    <a:lnT w="7200">
+                      <a:solidFill>
+                        <a:srgbClr val="000000"/>
+                      </a:solidFill>
+                      <a:prstDash val="solid"/>
+                    </a:lnT>
+                    <a:lnB w="7200">
+                      <a:solidFill>
+                        <a:srgbClr val="000000"/>
+                      </a:solidFill>
+                      <a:prstDash val="solid"/>
+                    </a:lnB>
+                    <a:noFill/>
+                  </a:tcPr>
+                </a:tc>
+              </a:tr>
+              <a:tr h="1207800">
+                <a:tc>
+                  <a:txBody>
+                    <a:bodyPr lIns="36000" rIns="36000" tIns="36000" bIns="36000" anchor="t">
+                      <a:noAutofit/>
+                    </a:bodyPr>
+                    <a:p>
+                      <a:pPr algn="just">
+                        <a:lnSpc>
+                          <a:spcPct val="150000"/>
+                        </a:lnSpc>
+                      </a:pPr>
+                      <a:r>
+                        <a:rPr b="0" i="1" lang="pt-BR" sz="2200" spc="-1" strike="noStrike">
+                          <a:solidFill>
+                            <a:srgbClr val="5b9bd5"/>
+                          </a:solidFill>
+                          <a:latin typeface="Arial"/>
+                        </a:rPr>
+                        <a:t>6. Insere endereço (opcional).</a:t>
+                      </a:r>
+                      <a:endParaRPr b="0" i="1" lang="pt-BR" sz="2200" spc="-1" strike="noStrike">
+                        <a:solidFill>
+                          <a:srgbClr val="5b9bd5"/>
+                        </a:solidFill>
+                        <a:latin typeface="Arial"/>
+                      </a:endParaRPr>
+                    </a:p>
+                  </a:txBody>
+                  <a:tcPr anchor="t" marL="36000" marR="36000">
+                    <a:lnL w="7200">
+                      <a:solidFill>
+                        <a:srgbClr val="000000"/>
+                      </a:solidFill>
+                      <a:prstDash val="solid"/>
+                    </a:lnL>
+                    <a:lnR w="7200">
+                      <a:solidFill>
+                        <a:srgbClr val="000000"/>
+                      </a:solidFill>
+                      <a:prstDash val="solid"/>
+                    </a:lnR>
+                    <a:lnT w="7200">
+                      <a:solidFill>
+                        <a:srgbClr val="000000"/>
+                      </a:solidFill>
+                      <a:prstDash val="solid"/>
+                    </a:lnT>
+                    <a:lnB w="7200">
+                      <a:solidFill>
+                        <a:srgbClr val="000000"/>
+                      </a:solidFill>
+                      <a:prstDash val="solid"/>
+                    </a:lnB>
+                    <a:noFill/>
+                  </a:tcPr>
+                </a:tc>
+                <a:tc>
+                  <a:txBody>
+                    <a:bodyPr lIns="36000" rIns="36000" tIns="36000" bIns="36000" anchor="t">
+                      <a:noAutofit/>
+                    </a:bodyPr>
+                    <a:p>
+                      <a:pPr algn="just">
+                        <a:lnSpc>
+                          <a:spcPct val="150000"/>
+                        </a:lnSpc>
+                      </a:pPr>
+                      <a:endParaRPr b="0" lang="pt-BR" sz="2200" spc="-1" strike="noStrike">
+                        <a:solidFill>
+                          <a:srgbClr val="5b9bd5"/>
+                        </a:solidFill>
+                        <a:latin typeface="Arial"/>
+                      </a:endParaRPr>
+                    </a:p>
+                  </a:txBody>
+                  <a:tcPr anchor="t" marL="36000" marR="36000">
+                    <a:lnL w="7200">
+                      <a:solidFill>
+                        <a:srgbClr val="000000"/>
+                      </a:solidFill>
+                      <a:prstDash val="solid"/>
+                    </a:lnL>
+                    <a:lnR w="7200">
+                      <a:solidFill>
+                        <a:srgbClr val="000000"/>
+                      </a:solidFill>
+                      <a:prstDash val="solid"/>
+                    </a:lnR>
+                    <a:lnT w="7200">
+                      <a:solidFill>
+                        <a:srgbClr val="000000"/>
+                      </a:solidFill>
+                      <a:prstDash val="solid"/>
+                    </a:lnT>
+                    <a:lnB w="7200">
+                      <a:solidFill>
+                        <a:srgbClr val="000000"/>
+                      </a:solidFill>
+                      <a:prstDash val="solid"/>
+                    </a:lnB>
+                    <a:noFill/>
+                  </a:tcPr>
+                </a:tc>
+              </a:tr>
+              <a:tr h="1207800">
+                <a:tc>
+                  <a:txBody>
+                    <a:bodyPr lIns="36000" rIns="36000" tIns="36000" bIns="36000" anchor="t">
+                      <a:noAutofit/>
+                    </a:bodyPr>
+                    <a:p>
+                      <a:pPr algn="just">
+                        <a:lnSpc>
+                          <a:spcPct val="150000"/>
+                        </a:lnSpc>
+                      </a:pPr>
+                      <a:endParaRPr b="0" i="1" lang="pt-BR" sz="2200" spc="-1" strike="noStrike">
+                        <a:solidFill>
+                          <a:srgbClr val="5b9bd5"/>
+                        </a:solidFill>
+                        <a:latin typeface="Arial"/>
+                      </a:endParaRPr>
+                    </a:p>
+                  </a:txBody>
+                  <a:tcPr anchor="t" marL="36000" marR="36000">
+                    <a:lnL w="7200">
+                      <a:solidFill>
+                        <a:srgbClr val="000000"/>
+                      </a:solidFill>
+                      <a:prstDash val="solid"/>
+                    </a:lnL>
+                    <a:lnR w="7200">
+                      <a:solidFill>
+                        <a:srgbClr val="000000"/>
+                      </a:solidFill>
+                      <a:prstDash val="solid"/>
+                    </a:lnR>
+                    <a:lnT w="7200">
+                      <a:solidFill>
+                        <a:srgbClr val="000000"/>
+                      </a:solidFill>
+                      <a:prstDash val="solid"/>
+                    </a:lnT>
+                    <a:lnB w="7200">
+                      <a:solidFill>
+                        <a:srgbClr val="000000"/>
+                      </a:solidFill>
+                      <a:prstDash val="solid"/>
+                    </a:lnB>
+                    <a:noFill/>
+                  </a:tcPr>
+                </a:tc>
+                <a:tc>
+                  <a:txBody>
+                    <a:bodyPr lIns="36000" rIns="36000" tIns="36000" bIns="36000" anchor="t">
+                      <a:noAutofit/>
+                    </a:bodyPr>
+                    <a:p>
+                      <a:pPr algn="just">
+                        <a:lnSpc>
+                          <a:spcPct val="150000"/>
+                        </a:lnSpc>
+                      </a:pPr>
+                      <a:r>
+                        <a:rPr b="0" i="1" lang="pt-BR" sz="2200" spc="-1" strike="noStrike">
+                          <a:solidFill>
+                            <a:srgbClr val="5b9bd5"/>
+                          </a:solidFill>
+                          <a:latin typeface="Arial"/>
+                        </a:rPr>
+                        <a:t>7. Sistema valida os campos preenchidos.</a:t>
+                      </a:r>
+                      <a:endParaRPr b="0" i="1" lang="pt-BR" sz="2200" spc="-1" strike="noStrike">
+                        <a:solidFill>
+                          <a:srgbClr val="5b9bd5"/>
+                        </a:solidFill>
+                        <a:latin typeface="Arial"/>
+                      </a:endParaRPr>
+                    </a:p>
+                  </a:txBody>
+                  <a:tcPr anchor="t" marL="36000" marR="36000">
+                    <a:lnL w="7200">
+                      <a:solidFill>
+                        <a:srgbClr val="000000"/>
+                      </a:solidFill>
+                      <a:prstDash val="solid"/>
+                    </a:lnL>
+                    <a:lnR w="7200">
+                      <a:solidFill>
+                        <a:srgbClr val="000000"/>
+                      </a:solidFill>
+                      <a:prstDash val="solid"/>
+                    </a:lnR>
+                    <a:lnT w="7200">
+                      <a:solidFill>
+                        <a:srgbClr val="000000"/>
+                      </a:solidFill>
+                      <a:prstDash val="solid"/>
+                    </a:lnT>
+                    <a:lnB w="7200">
+                      <a:solidFill>
+                        <a:srgbClr val="000000"/>
+                      </a:solidFill>
+                      <a:prstDash val="solid"/>
+                    </a:lnB>
+                    <a:noFill/>
+                  </a:tcPr>
+                </a:tc>
+              </a:tr>
+              <a:tr h="2130120">
+                <a:tc>
+                  <a:txBody>
+                    <a:bodyPr lIns="36000" rIns="36000" tIns="36000" bIns="36000" anchor="t">
+                      <a:noAutofit/>
+                    </a:bodyPr>
+                    <a:p>
+                      <a:pPr algn="just">
+                        <a:lnSpc>
+                          <a:spcPct val="150000"/>
+                        </a:lnSpc>
+                      </a:pPr>
+                      <a:endParaRPr b="0" i="1" lang="pt-BR" sz="2200" spc="-1" strike="noStrike">
+                        <a:solidFill>
+                          <a:srgbClr val="5b9bd5"/>
+                        </a:solidFill>
+                        <a:latin typeface="Arial"/>
+                      </a:endParaRPr>
+                    </a:p>
+                  </a:txBody>
+                  <a:tcPr anchor="t" marL="36000" marR="36000">
+                    <a:lnL w="7200">
+                      <a:solidFill>
+                        <a:srgbClr val="000000"/>
+                      </a:solidFill>
+                      <a:prstDash val="solid"/>
+                    </a:lnL>
+                    <a:lnR w="7200">
+                      <a:solidFill>
+                        <a:srgbClr val="000000"/>
+                      </a:solidFill>
+                      <a:prstDash val="solid"/>
+                    </a:lnR>
+                    <a:lnT w="7200">
+                      <a:solidFill>
+                        <a:srgbClr val="000000"/>
+                      </a:solidFill>
+                      <a:prstDash val="solid"/>
+                    </a:lnT>
+                    <a:lnB w="7200">
+                      <a:solidFill>
+                        <a:srgbClr val="000000"/>
+                      </a:solidFill>
+                      <a:prstDash val="solid"/>
+                    </a:lnB>
+                    <a:noFill/>
+                  </a:tcPr>
+                </a:tc>
+                <a:tc>
+                  <a:txBody>
+                    <a:bodyPr lIns="36000" rIns="36000" tIns="36000" bIns="36000" anchor="t">
+                      <a:noAutofit/>
+                    </a:bodyPr>
+                    <a:p>
+                      <a:pPr algn="just">
+                        <a:lnSpc>
+                          <a:spcPct val="150000"/>
+                        </a:lnSpc>
+                      </a:pPr>
+                      <a:r>
+                        <a:rPr b="0" i="1" lang="pt-BR" sz="2200" spc="-1" strike="noStrike">
+                          <a:solidFill>
+                            <a:srgbClr val="5b9bd5"/>
+                          </a:solidFill>
+                          <a:latin typeface="Arial"/>
+                        </a:rPr>
+                        <a:t>8. Sistema salva o horário de criação do evento e status planejando.</a:t>
+                      </a:r>
+                      <a:endParaRPr b="0" i="1" lang="pt-BR" sz="2200" spc="-1" strike="noStrike">
+                        <a:solidFill>
+                          <a:srgbClr val="5b9bd5"/>
+                        </a:solidFill>
+                        <a:latin typeface="Arial"/>
+                      </a:endParaRPr>
+                    </a:p>
+                  </a:txBody>
+                  <a:tcPr anchor="t" marL="36000" marR="36000">
+                    <a:lnL w="7200">
+                      <a:solidFill>
+                        <a:srgbClr val="000000"/>
+                      </a:solidFill>
+                      <a:prstDash val="solid"/>
+                    </a:lnL>
+                    <a:lnR w="7200">
+                      <a:solidFill>
+                        <a:srgbClr val="000000"/>
+                      </a:solidFill>
+                      <a:prstDash val="solid"/>
+                    </a:lnR>
+                    <a:lnT w="7200">
+                      <a:solidFill>
+                        <a:srgbClr val="000000"/>
+                      </a:solidFill>
+                      <a:prstDash val="solid"/>
+                    </a:lnT>
+                    <a:lnB w="7200">
+                      <a:solidFill>
+                        <a:srgbClr val="000000"/>
+                      </a:solidFill>
+                      <a:prstDash val="solid"/>
+                    </a:lnB>
+                    <a:noFill/>
+                  </a:tcPr>
+                </a:tc>
+              </a:tr>
+              <a:tr h="1207800">
+                <a:tc>
+                  <a:txBody>
+                    <a:bodyPr lIns="36000" rIns="36000" tIns="36000" bIns="36000" anchor="t">
+                      <a:noAutofit/>
+                    </a:bodyPr>
+                    <a:p>
+                      <a:pPr algn="just">
+                        <a:lnSpc>
+                          <a:spcPct val="150000"/>
+                        </a:lnSpc>
+                      </a:pPr>
+                      <a:endParaRPr b="0" i="1" lang="pt-BR" sz="2200" spc="-1" strike="noStrike">
+                        <a:solidFill>
+                          <a:srgbClr val="5b9bd5"/>
+                        </a:solidFill>
+                        <a:latin typeface="Arial"/>
+                      </a:endParaRPr>
+                    </a:p>
+                  </a:txBody>
+                  <a:tcPr anchor="t" marL="36000" marR="36000">
+                    <a:lnL w="7200">
+                      <a:solidFill>
+                        <a:srgbClr val="000000"/>
+                      </a:solidFill>
+                      <a:prstDash val="solid"/>
+                    </a:lnL>
+                    <a:lnR w="7200">
+                      <a:solidFill>
+                        <a:srgbClr val="000000"/>
+                      </a:solidFill>
+                      <a:prstDash val="solid"/>
+                    </a:lnR>
+                    <a:lnT w="7200">
+                      <a:solidFill>
+                        <a:srgbClr val="000000"/>
+                      </a:solidFill>
+                      <a:prstDash val="solid"/>
+                    </a:lnT>
+                    <a:lnB w="7200">
+                      <a:solidFill>
+                        <a:srgbClr val="000000"/>
+                      </a:solidFill>
+                      <a:prstDash val="solid"/>
+                    </a:lnB>
+                    <a:noFill/>
+                  </a:tcPr>
+                </a:tc>
+                <a:tc>
+                  <a:txBody>
+                    <a:bodyPr lIns="36000" rIns="36000" tIns="36000" bIns="36000" anchor="t">
+                      <a:noAutofit/>
+                    </a:bodyPr>
+                    <a:p>
+                      <a:pPr algn="just">
+                        <a:lnSpc>
+                          <a:spcPct val="150000"/>
+                        </a:lnSpc>
+                      </a:pPr>
+                      <a:r>
+                        <a:rPr b="0" i="1" lang="pt-BR" sz="2200" spc="-1" strike="noStrike">
+                          <a:solidFill>
+                            <a:srgbClr val="5b9bd5"/>
+                          </a:solidFill>
+                          <a:latin typeface="Arial"/>
+                        </a:rPr>
+                        <a:t>9. Sistema registra o evento.</a:t>
+                      </a:r>
+                      <a:endParaRPr b="0" i="1" lang="pt-BR" sz="2200" spc="-1" strike="noStrike">
+                        <a:solidFill>
+                          <a:srgbClr val="5b9bd5"/>
+                        </a:solidFill>
+                        <a:latin typeface="Arial"/>
+                      </a:endParaRPr>
+                    </a:p>
+                  </a:txBody>
+                  <a:tcPr anchor="t" marL="36000" marR="36000">
+                    <a:lnL w="7200">
+                      <a:solidFill>
+                        <a:srgbClr val="000000"/>
+                      </a:solidFill>
+                      <a:prstDash val="solid"/>
+                    </a:lnL>
+                    <a:lnR w="7200">
+                      <a:solidFill>
+                        <a:srgbClr val="000000"/>
+                      </a:solidFill>
+                      <a:prstDash val="solid"/>
+                    </a:lnR>
+                    <a:lnT w="7200">
+                      <a:solidFill>
+                        <a:srgbClr val="000000"/>
+                      </a:solidFill>
+                      <a:prstDash val="solid"/>
+                    </a:lnT>
+                    <a:lnB w="7200">
+                      <a:solidFill>
+                        <a:srgbClr val="000000"/>
+                      </a:solidFill>
+                      <a:prstDash val="solid"/>
+                    </a:lnB>
+                    <a:noFill/>
+                  </a:tcPr>
+                </a:tc>
+              </a:tr>
+              <a:tr h="1210320">
+                <a:tc>
+                  <a:txBody>
+                    <a:bodyPr lIns="36000" rIns="36000" tIns="36000" bIns="36000" anchor="t">
+                      <a:noAutofit/>
+                    </a:bodyPr>
+                    <a:p>
+                      <a:pPr algn="just">
+                        <a:lnSpc>
+                          <a:spcPct val="150000"/>
+                        </a:lnSpc>
+                      </a:pPr>
+                      <a:endParaRPr b="0" i="1" lang="pt-BR" sz="2200" spc="-1" strike="noStrike">
+                        <a:solidFill>
+                          <a:srgbClr val="5b9bd5"/>
+                        </a:solidFill>
+                        <a:latin typeface="Arial"/>
+                      </a:endParaRPr>
+                    </a:p>
+                  </a:txBody>
+                  <a:tcPr anchor="t" marL="36000" marR="36000">
+                    <a:lnL w="7200">
+                      <a:solidFill>
+                        <a:srgbClr val="000000"/>
+                      </a:solidFill>
+                      <a:prstDash val="solid"/>
+                    </a:lnL>
+                    <a:lnR w="7200">
+                      <a:solidFill>
+                        <a:srgbClr val="000000"/>
+                      </a:solidFill>
+                      <a:prstDash val="solid"/>
+                    </a:lnR>
+                    <a:lnT w="7200">
+                      <a:solidFill>
+                        <a:srgbClr val="000000"/>
+                      </a:solidFill>
+                      <a:prstDash val="solid"/>
+                    </a:lnT>
+                    <a:lnB w="7200">
+                      <a:solidFill>
+                        <a:srgbClr val="000000"/>
+                      </a:solidFill>
+                      <a:prstDash val="solid"/>
+                    </a:lnB>
+                    <a:noFill/>
+                  </a:tcPr>
+                </a:tc>
+                <a:tc>
+                  <a:txBody>
+                    <a:bodyPr lIns="36000" rIns="36000" tIns="36000" bIns="36000" anchor="t">
+                      <a:noAutofit/>
+                    </a:bodyPr>
+                    <a:p>
+                      <a:pPr algn="just">
+                        <a:lnSpc>
+                          <a:spcPct val="150000"/>
+                        </a:lnSpc>
+                      </a:pPr>
+                      <a:r>
+                        <a:rPr b="0" i="1" lang="pt-BR" sz="2200" spc="-1" strike="noStrike">
+                          <a:solidFill>
+                            <a:srgbClr val="5b9bd5"/>
+                          </a:solidFill>
+                          <a:latin typeface="Arial"/>
+                        </a:rPr>
+                        <a:t>10. Sistema exibe lista atualizada dos eventos.</a:t>
+                      </a:r>
+                      <a:endParaRPr b="0" i="1" lang="pt-BR" sz="2200" spc="-1" strike="noStrike">
+                        <a:solidFill>
+                          <a:srgbClr val="5b9bd5"/>
+                        </a:solidFill>
+                        <a:latin typeface="Arial"/>
+                      </a:endParaRPr>
+                    </a:p>
+                  </a:txBody>
+                  <a:tcPr anchor="t" marL="36000" marR="36000">
+                    <a:lnL w="7200">
+                      <a:solidFill>
+                        <a:srgbClr val="000000"/>
+                      </a:solidFill>
+                      <a:prstDash val="solid"/>
+                    </a:lnL>
+                    <a:lnR w="7200">
+                      <a:solidFill>
+                        <a:srgbClr val="000000"/>
+                      </a:solidFill>
+                      <a:prstDash val="solid"/>
+                    </a:lnR>
+                    <a:lnT w="7200">
+                      <a:solidFill>
+                        <a:srgbClr val="000000"/>
+                      </a:solidFill>
+                      <a:prstDash val="solid"/>
+                    </a:lnT>
+                    <a:lnB w="7200">
+                      <a:solidFill>
+                        <a:srgbClr val="000000"/>
+                      </a:solidFill>
+                      <a:prstDash val="solid"/>
+                    </a:lnB>
+                    <a:noFill/>
+                  </a:tcPr>
+                </a:tc>
+              </a:tr>
+            </a:tbl>
+          </a:graphicData>
+        </a:graphic>
+      </p:graphicFrame>
+    </p:spTree>
+  </p:cSld>
+  <mc:AlternateContent>
+    <mc:Choice Requires="p14">
+      <p:transition spd="slow" p14:dur="2000"/>
+    </mc:Choice>
+    <mc:Fallback>
+      <p:transition spd="slow"/>
+    </mc:Fallback>
+  </mc:AlternateContent>
+</p:sld>
+</file>
+
+<file path=ppt/slides/slide25.xml><?xml version="1.0" encoding="utf-8"?>
+<p:sld xmlns:a="http://schemas.openxmlformats.org/drawingml/2006/main" xmlns:p="http://schemas.openxmlformats.org/presentationml/2006/main" xmlns:r="http://schemas.openxmlformats.org/officeDocument/2006/relationships" xmlns:p14="http://schemas.microsoft.com/office/powerpoint/2010/main" xmlns:p15="http://schemas.microsoft.com/office/powerpoint/2012/main" xmlns:mc="http://schemas.openxmlformats.org/markup-compatibility/2006">
+  <p:cSld>
+    <p:spTree>
+      <p:nvGrpSpPr>
+        <p:cNvPr id="1" name=""/>
+        <p:cNvGrpSpPr/>
+        <p:nvPr/>
+      </p:nvGrpSpPr>
+      <p:grpSpPr>
+        <a:xfrm>
+          <a:off x="0" y="0"/>
+          <a:ext cx="0" cy="0"/>
+          <a:chOff x="0" y="0"/>
+          <a:chExt cx="0" cy="0"/>
+        </a:xfrm>
+      </p:grpSpPr>
+      <p:sp>
+        <p:nvSpPr>
+          <p:cNvPr id="94" name=""/>
+          <p:cNvSpPr/>
+          <p:nvPr/>
+        </p:nvSpPr>
+        <p:spPr>
+          <a:xfrm>
+            <a:off x="720000" y="3960000"/>
+            <a:ext cx="21777480" cy="1450440"/>
+          </a:xfrm>
+          <a:prstGeom prst="rect">
+            <a:avLst/>
+          </a:prstGeom>
+          <a:noFill/>
+          <a:ln w="0">
+            <a:noFill/>
+          </a:ln>
+        </p:spPr>
+        <p:style>
+          <a:lnRef idx="0"/>
+          <a:fillRef idx="0"/>
+          <a:effectRef idx="0"/>
+          <a:fontRef idx="minor"/>
+        </p:style>
+        <p:txBody>
+          <a:bodyPr lIns="90000" rIns="90000" tIns="45000" bIns="45000" anchor="t">
+            <a:noAutofit/>
+          </a:bodyPr>
+          <a:p>
+            <a:pPr>
+              <a:lnSpc>
+                <a:spcPct val="100000"/>
+              </a:lnSpc>
+            </a:pPr>
+            <a:r>
+              <a:rPr b="1" lang="pt-BR" sz="9600" spc="-1" strike="noStrike" baseline="33000">
+                <a:solidFill>
+                  <a:srgbClr val="000000"/>
+                </a:solidFill>
+                <a:latin typeface="Arial"/>
+                <a:ea typeface="Helvetica Neue"/>
+              </a:rPr>
+              <a:t>• </a:t>
+            </a:r>
+            <a:r>
+              <a:rPr b="1" lang="pt-BR" sz="9600" spc="-1" strike="noStrike" baseline="33000">
+                <a:solidFill>
+                  <a:srgbClr val="000000"/>
+                </a:solidFill>
+                <a:latin typeface="Arial"/>
+                <a:ea typeface="Helvetica Neue"/>
+              </a:rPr>
+              <a:t>Conclusão</a:t>
+            </a:r>
+            <a:endParaRPr b="0" lang="pt-BR" sz="9600" spc="-1" strike="noStrike">
+              <a:solidFill>
+                <a:srgbClr val="000000"/>
+              </a:solidFill>
+              <a:latin typeface="Arial"/>
+            </a:endParaRPr>
+          </a:p>
+        </p:txBody>
+      </p:sp>
+      <p:sp>
+        <p:nvSpPr>
+          <p:cNvPr id="95" name=""/>
+          <p:cNvSpPr/>
+          <p:nvPr/>
+        </p:nvSpPr>
+        <p:spPr>
+          <a:xfrm>
+            <a:off x="900000" y="5940000"/>
+            <a:ext cx="22137480" cy="5622480"/>
+          </a:xfrm>
+          <a:prstGeom prst="rect">
+            <a:avLst/>
+          </a:prstGeom>
+          <a:noFill/>
+          <a:ln w="0">
+            <a:noFill/>
+          </a:ln>
+        </p:spPr>
+        <p:style>
+          <a:lnRef idx="0"/>
+          <a:fillRef idx="0"/>
+          <a:effectRef idx="0"/>
+          <a:fontRef idx="minor"/>
+        </p:style>
+        <p:txBody>
+          <a:bodyPr lIns="0" rIns="0" tIns="0" bIns="0" anchor="t">
+            <a:noAutofit/>
+          </a:bodyPr>
+          <a:p>
+            <a:pPr>
+              <a:lnSpc>
+                <a:spcPct val="100000"/>
+              </a:lnSpc>
+            </a:pPr>
+            <a:endParaRPr b="0" lang="pt-BR" sz="1800" spc="-1" strike="noStrike">
+              <a:solidFill>
+                <a:srgbClr val="000000"/>
+              </a:solidFill>
+              <a:latin typeface="Arial"/>
+              <a:ea typeface="Helvetica Neue"/>
+            </a:endParaRPr>
+          </a:p>
+        </p:txBody>
+      </p:sp>
+    </p:spTree>
+  </p:cSld>
+  <mc:AlternateContent>
+    <mc:Choice Requires="p14">
+      <p:transition spd="slow" p14:dur="2000"/>
+    </mc:Choice>
+    <mc:Fallback>
+      <p:transition spd="slow"/>
+    </mc:Fallback>
+  </mc:AlternateContent>
+</p:sld>
+</file>
+
+<file path=ppt/slides/slide26.xml><?xml version="1.0" encoding="utf-8"?>
+<p:sld xmlns:a="http://schemas.openxmlformats.org/drawingml/2006/main" xmlns:p="http://schemas.openxmlformats.org/presentationml/2006/main" xmlns:r="http://schemas.openxmlformats.org/officeDocument/2006/relationships" xmlns:p14="http://schemas.microsoft.com/office/powerpoint/2010/main" xmlns:p15="http://schemas.microsoft.com/office/powerpoint/2012/main" xmlns:mc="http://schemas.openxmlformats.org/markup-compatibility/2006">
+  <p:cSld>
+    <p:spTree>
+      <p:nvGrpSpPr>
+        <p:cNvPr id="1" name=""/>
+        <p:cNvGrpSpPr/>
+        <p:nvPr/>
+      </p:nvGrpSpPr>
+      <p:grpSpPr>
+        <a:xfrm>
+          <a:off x="0" y="0"/>
+          <a:ext cx="0" cy="0"/>
+          <a:chOff x="0" y="0"/>
+          <a:chExt cx="0" cy="0"/>
+        </a:xfrm>
+      </p:grpSpPr>
+      <p:sp>
+        <p:nvSpPr>
+          <p:cNvPr id="96" name=""/>
+          <p:cNvSpPr/>
+          <p:nvPr/>
+        </p:nvSpPr>
+        <p:spPr>
+          <a:xfrm>
             <a:off x="900000" y="3420000"/>
-            <a:ext cx="22137840" cy="7197840"/>
+            <a:ext cx="22137480" cy="7197480"/>
           </a:xfrm>
           <a:prstGeom prst="rect">
             <a:avLst/>
@@ -5128,7 +7432,7 @@
         <p:spPr>
           <a:xfrm>
             <a:off x="720000" y="3960000"/>
-            <a:ext cx="21777840" cy="1450800"/>
+            <a:ext cx="21777480" cy="1450440"/>
           </a:xfrm>
           <a:prstGeom prst="rect">
             <a:avLst/>
@@ -5192,7 +7496,7 @@
         <p:spPr>
           <a:xfrm>
             <a:off x="900000" y="5940000"/>
-            <a:ext cx="22137840" cy="6837840"/>
+            <a:ext cx="22137480" cy="6837480"/>
           </a:xfrm>
           <a:prstGeom prst="rect">
             <a:avLst/>
@@ -5276,7 +7580,7 @@
         <p:spPr>
           <a:xfrm>
             <a:off x="720000" y="3960000"/>
-            <a:ext cx="21777840" cy="1450800"/>
+            <a:ext cx="21777480" cy="1450440"/>
           </a:xfrm>
           <a:prstGeom prst="rect">
             <a:avLst/>
@@ -5340,7 +7644,7 @@
         <p:spPr>
           <a:xfrm>
             <a:off x="900000" y="5940000"/>
-            <a:ext cx="22137840" cy="6837840"/>
+            <a:ext cx="22137480" cy="6837480"/>
           </a:xfrm>
           <a:prstGeom prst="rect">
             <a:avLst/>
@@ -5493,7 +7797,7 @@
         <p:spPr>
           <a:xfrm>
             <a:off x="720000" y="3960000"/>
-            <a:ext cx="21777840" cy="1450800"/>
+            <a:ext cx="21777480" cy="1450440"/>
           </a:xfrm>
           <a:prstGeom prst="rect">
             <a:avLst/>
@@ -5557,7 +7861,7 @@
         <p:spPr>
           <a:xfrm>
             <a:off x="900000" y="5940000"/>
-            <a:ext cx="22137840" cy="6837840"/>
+            <a:ext cx="22137480" cy="6837480"/>
           </a:xfrm>
           <a:prstGeom prst="rect">
             <a:avLst/>
@@ -5664,7 +7968,7 @@
         <p:spPr>
           <a:xfrm>
             <a:off x="720000" y="3960000"/>
-            <a:ext cx="21777840" cy="1450800"/>
+            <a:ext cx="21777480" cy="1450440"/>
           </a:xfrm>
           <a:prstGeom prst="rect">
             <a:avLst/>
@@ -5728,7 +8032,7 @@
         <p:spPr>
           <a:xfrm>
             <a:off x="900000" y="5940000"/>
-            <a:ext cx="22137840" cy="1873080"/>
+            <a:ext cx="22137480" cy="1872720"/>
           </a:xfrm>
           <a:prstGeom prst="rect">
             <a:avLst/>
@@ -5839,7 +8143,7 @@
         <p:spPr>
           <a:xfrm>
             <a:off x="309960" y="3240000"/>
-            <a:ext cx="23630040" cy="10260000"/>
+            <a:ext cx="23629680" cy="10259640"/>
           </a:xfrm>
           <a:prstGeom prst="rect">
             <a:avLst/>
@@ -5892,7 +8196,7 @@
         <p:spPr>
           <a:xfrm>
             <a:off x="900000" y="3240000"/>
-            <a:ext cx="22800240" cy="10080000"/>
+            <a:ext cx="22799880" cy="10079640"/>
           </a:xfrm>
           <a:prstGeom prst="rect">
             <a:avLst/>
@@ -5945,7 +8249,7 @@
         <p:spPr>
           <a:xfrm>
             <a:off x="360000" y="3240000"/>
-            <a:ext cx="23332320" cy="10122480"/>
+            <a:ext cx="23331960" cy="10122120"/>
           </a:xfrm>
           <a:prstGeom prst="rect">
             <a:avLst/>

</xml_diff>

<commit_message>
feat: adicao de classes no diagrama de classes e adicao de caso de uso na apresentacao
</commit_message>
<xml_diff>
--- a/docs/Eventify_PowerPoint.pptx
+++ b/docs/Eventify_PowerPoint.pptx
@@ -26,6 +26,11 @@
     <p:sldId id="274" r:id="rId21"/>
     <p:sldId id="275" r:id="rId22"/>
     <p:sldId id="276" r:id="rId23"/>
+    <p:sldId id="277" r:id="rId24"/>
+    <p:sldId id="278" r:id="rId25"/>
+    <p:sldId id="279" r:id="rId26"/>
+    <p:sldId id="280" r:id="rId27"/>
+    <p:sldId id="281" r:id="rId28"/>
   </p:sldIdLst>
   <p:sldSz cx="24384000" cy="13716000"/>
   <p:notesSz cx="7559675" cy="10691813"/>
@@ -63,7 +68,7 @@
         <p:txBody>
           <a:bodyPr/>
           <a:p>
-            <a:fld id="{C3AC0FE7-4EDD-471A-81D1-EF01E99BD5DC}" type="slidenum">
+            <a:fld id="{D119D90F-BA47-41DB-9ACB-9AC8F79142D6}" type="slidenum">
               <a:t>&lt;#&gt;</a:t>
             </a:fld>
           </a:p>
@@ -231,7 +236,7 @@
         <p:txBody>
           <a:bodyPr/>
           <a:p>
-            <a:fld id="{06315D59-4E87-4D9B-ACC4-45FB46B77C0F}" type="slidenum">
+            <a:fld id="{77AB2E7D-5B73-4143-87E5-DC9E5F0AECD5}" type="slidenum">
               <a:t>&lt;#&gt;</a:t>
             </a:fld>
           </a:p>
@@ -485,7 +490,7 @@
         <p:txBody>
           <a:bodyPr/>
           <a:p>
-            <a:fld id="{BD766025-6692-42F9-A19C-4256637095B1}" type="slidenum">
+            <a:fld id="{4FFCF0AE-728E-42A7-950B-70B2DA1634C0}" type="slidenum">
               <a:t>&lt;#&gt;</a:t>
             </a:fld>
           </a:p>
@@ -825,7 +830,7 @@
         <p:txBody>
           <a:bodyPr/>
           <a:p>
-            <a:fld id="{28DD721A-F8A7-4C97-B3DC-0782C371E6D7}" type="slidenum">
+            <a:fld id="{4E1153E9-4C59-4FD4-92EA-A2B8A68787A8}" type="slidenum">
               <a:t>&lt;#&gt;</a:t>
             </a:fld>
           </a:p>
@@ -947,7 +952,7 @@
         <p:txBody>
           <a:bodyPr/>
           <a:p>
-            <a:fld id="{885B093D-7A1C-4D1D-A86B-2AFA6FB35131}" type="slidenum">
+            <a:fld id="{EF604653-758B-485B-B32F-53C34494DC53}" type="slidenum">
               <a:t>&lt;#&gt;</a:t>
             </a:fld>
           </a:p>
@@ -1072,7 +1077,7 @@
         <p:txBody>
           <a:bodyPr/>
           <a:p>
-            <a:fld id="{963F7C21-F496-465E-9332-602943C328FE}" type="slidenum">
+            <a:fld id="{37C01F8D-09AE-4424-BA0F-71732CD78250}" type="slidenum">
               <a:t>&lt;#&gt;</a:t>
             </a:fld>
           </a:p>
@@ -1240,7 +1245,7 @@
         <p:txBody>
           <a:bodyPr/>
           <a:p>
-            <a:fld id="{592A1544-8AA3-48A4-8F00-B9C638D327FF}" type="slidenum">
+            <a:fld id="{EBFC3F28-97C5-4DD9-B85A-D811FA05D663}" type="slidenum">
               <a:t>&lt;#&gt;</a:t>
             </a:fld>
           </a:p>
@@ -1322,7 +1327,7 @@
         <p:txBody>
           <a:bodyPr/>
           <a:p>
-            <a:fld id="{A1E9A8F4-B9EC-4BFF-98CD-C14A07D8D6D3}" type="slidenum">
+            <a:fld id="{72DB1013-6156-4C7F-8376-BD62CD85B9EF}" type="slidenum">
               <a:t>&lt;#&gt;</a:t>
             </a:fld>
           </a:p>
@@ -1402,7 +1407,7 @@
         <p:txBody>
           <a:bodyPr/>
           <a:p>
-            <a:fld id="{895BDD3E-A034-4B22-AA9C-F586DA5E260F}" type="slidenum">
+            <a:fld id="{79ADD669-CFF3-4FB3-8B31-787114A3AF07}" type="slidenum">
               <a:t>&lt;#&gt;</a:t>
             </a:fld>
           </a:p>
@@ -1613,7 +1618,7 @@
         <p:txBody>
           <a:bodyPr/>
           <a:p>
-            <a:fld id="{1DCF4D4C-BFCA-459A-9C2D-F726F13B9B47}" type="slidenum">
+            <a:fld id="{70D4D739-2A4A-4D64-9D2D-43810C405DB4}" type="slidenum">
               <a:t>&lt;#&gt;</a:t>
             </a:fld>
           </a:p>
@@ -1824,7 +1829,7 @@
         <p:txBody>
           <a:bodyPr/>
           <a:p>
-            <a:fld id="{E65B536A-0724-405D-9996-AD8269DE0F6B}" type="slidenum">
+            <a:fld id="{5D7C8B52-98A6-41F3-A4D6-19337AF4702A}" type="slidenum">
               <a:t>&lt;#&gt;</a:t>
             </a:fld>
           </a:p>
@@ -2035,7 +2040,7 @@
         <p:txBody>
           <a:bodyPr/>
           <a:p>
-            <a:fld id="{330A0589-F85D-4CD9-ADA1-614754F7CE21}" type="slidenum">
+            <a:fld id="{40D11B61-BF6A-4A16-A543-7FF15B86DBCB}" type="slidenum">
               <a:t>&lt;#&gt;</a:t>
             </a:fld>
           </a:p>
@@ -2083,7 +2088,7 @@
         <p:spPr>
           <a:xfrm>
             <a:off x="-12600" y="-136080"/>
-            <a:ext cx="24865560" cy="13986000"/>
+            <a:ext cx="24864480" cy="13984920"/>
           </a:xfrm>
           <a:prstGeom prst="rect">
             <a:avLst/>
@@ -2830,7 +2835,7 @@
         <p:spPr>
           <a:xfrm>
             <a:off x="12029760" y="11507040"/>
-            <a:ext cx="313200" cy="297360"/>
+            <a:ext cx="312120" cy="296280"/>
           </a:xfrm>
           <a:prstGeom prst="rect">
             <a:avLst/>
@@ -2878,7 +2883,7 @@
                 <a:tab algn="l" pos="0"/>
               </a:tabLst>
             </a:pPr>
-            <a:fld id="{9C80E204-611C-485C-8697-FC9748CBD2F3}" type="slidenum">
+            <a:fld id="{2AC39B9A-7B21-4C16-B1BD-144DB18C1163}" type="slidenum">
               <a:rPr b="0" lang="pt-BR" sz="4600" spc="-1" strike="noStrike">
                 <a:solidFill>
                   <a:srgbClr val="000000"/>
@@ -2947,7 +2952,7 @@
         <p:spPr>
           <a:xfrm>
             <a:off x="0" y="0"/>
-            <a:ext cx="24382080" cy="13714200"/>
+            <a:ext cx="24381000" cy="13713120"/>
           </a:xfrm>
           <a:prstGeom prst="rect">
             <a:avLst/>
@@ -2969,8 +2974,8 @@
         </p:nvSpPr>
         <p:spPr>
           <a:xfrm>
-            <a:off x="1637640" y="10838160"/>
-            <a:ext cx="8803080" cy="1528920"/>
+            <a:off x="1637640" y="10440000"/>
+            <a:ext cx="8802000" cy="2339640"/>
           </a:xfrm>
           <a:prstGeom prst="rect">
             <a:avLst/>
@@ -2986,12 +2991,106 @@
           </a:bodyPr>
           <a:p>
             <a:pPr indent="0">
-              <a:spcBef>
-                <a:spcPts val="1417"/>
-              </a:spcBef>
+              <a:lnSpc>
+                <a:spcPct val="100000"/>
+              </a:lnSpc>
               <a:buNone/>
-            </a:pPr>
-            <a:endParaRPr b="0" lang="pt-BR" sz="1800" spc="-1" strike="noStrike">
+              <a:tabLst>
+                <a:tab algn="l" pos="0"/>
+              </a:tabLst>
+            </a:pPr>
+            <a:r>
+              <a:rPr b="1" lang="pt-BR" sz="3200" spc="-1" strike="noStrike">
+                <a:solidFill>
+                  <a:srgbClr val="000000"/>
+                </a:solidFill>
+                <a:latin typeface="Arial"/>
+                <a:ea typeface="Helvetica Neue"/>
+              </a:rPr>
+              <a:t>Grupo: </a:t>
+            </a:r>
+            <a:endParaRPr b="0" lang="pt-BR" sz="3200" spc="-1" strike="noStrike">
+              <a:solidFill>
+                <a:srgbClr val="000000"/>
+              </a:solidFill>
+              <a:latin typeface="Arial"/>
+            </a:endParaRPr>
+          </a:p>
+          <a:p>
+            <a:pPr indent="0">
+              <a:lnSpc>
+                <a:spcPct val="100000"/>
+              </a:lnSpc>
+              <a:buNone/>
+              <a:tabLst>
+                <a:tab algn="l" pos="0"/>
+              </a:tabLst>
+            </a:pPr>
+            <a:r>
+              <a:rPr b="0" lang="pt-BR" sz="3200" spc="-1" strike="noStrike">
+                <a:solidFill>
+                  <a:srgbClr val="000000"/>
+                </a:solidFill>
+                <a:latin typeface="Arial"/>
+                <a:ea typeface="Helvetica Neue"/>
+              </a:rPr>
+              <a:t>Alan Francisco </a:t>
+            </a:r>
+            <a:endParaRPr b="0" lang="pt-BR" sz="3200" spc="-1" strike="noStrike">
+              <a:solidFill>
+                <a:srgbClr val="000000"/>
+              </a:solidFill>
+              <a:latin typeface="Arial"/>
+            </a:endParaRPr>
+          </a:p>
+          <a:p>
+            <a:pPr indent="0">
+              <a:lnSpc>
+                <a:spcPct val="100000"/>
+              </a:lnSpc>
+              <a:buNone/>
+              <a:tabLst>
+                <a:tab algn="l" pos="0"/>
+              </a:tabLst>
+            </a:pPr>
+            <a:r>
+              <a:rPr b="0" lang="pt-BR" sz="3200" spc="-1" strike="noStrike">
+                <a:solidFill>
+                  <a:srgbClr val="000000"/>
+                </a:solidFill>
+                <a:latin typeface="Arial"/>
+                <a:ea typeface="Helvetica Neue"/>
+              </a:rPr>
+              <a:t>Carlos Eduardo de Almeida</a:t>
+            </a:r>
+            <a:endParaRPr b="0" lang="pt-BR" sz="3200" spc="-1" strike="noStrike">
+              <a:solidFill>
+                <a:srgbClr val="000000"/>
+              </a:solidFill>
+              <a:latin typeface="Arial"/>
+            </a:endParaRPr>
+          </a:p>
+          <a:p>
+            <a:pPr indent="0">
+              <a:lnSpc>
+                <a:spcPct val="100000"/>
+              </a:lnSpc>
+              <a:buNone/>
+              <a:tabLst>
+                <a:tab algn="l" pos="0"/>
+              </a:tabLst>
+            </a:pPr>
+            <a:r>
+              <a:rPr b="0" lang="pt-BR" sz="3200" spc="-1" strike="noStrike">
+                <a:solidFill>
+                  <a:srgbClr val="000000"/>
+                </a:solidFill>
+                <a:latin typeface="Arial"/>
+                <a:ea typeface="Helvetica Neue"/>
+              </a:rPr>
+              <a:t>Leandro Augusto</a:t>
+            </a:r>
+            <a:endParaRPr b="0" lang="pt-BR" sz="3200" spc="-1" strike="noStrike">
               <a:solidFill>
                 <a:srgbClr val="000000"/>
               </a:solidFill>
@@ -3032,14 +3131,14 @@
       </p:grpSpPr>
       <p:sp>
         <p:nvSpPr>
-          <p:cNvPr id="56" name=""/>
+          <p:cNvPr id="57" name=""/>
           <p:cNvSpPr/>
           <p:nvPr/>
         </p:nvSpPr>
         <p:spPr>
           <a:xfrm>
             <a:off x="720000" y="3960000"/>
-            <a:ext cx="21778560" cy="1451520"/>
+            <a:ext cx="21777480" cy="1450440"/>
           </a:xfrm>
           <a:prstGeom prst="rect">
             <a:avLst/>
@@ -3096,14 +3195,14 @@
       </p:sp>
       <p:sp>
         <p:nvSpPr>
-          <p:cNvPr id="57" name=""/>
+          <p:cNvPr id="58" name=""/>
           <p:cNvSpPr/>
           <p:nvPr/>
         </p:nvSpPr>
         <p:spPr>
           <a:xfrm>
             <a:off x="900000" y="5940000"/>
-            <a:ext cx="22138560" cy="5623560"/>
+            <a:ext cx="22137480" cy="5622480"/>
           </a:xfrm>
           <a:prstGeom prst="rect">
             <a:avLst/>
@@ -3295,14 +3394,14 @@
       </p:grpSpPr>
       <p:sp>
         <p:nvSpPr>
-          <p:cNvPr id="58" name=""/>
+          <p:cNvPr id="59" name=""/>
           <p:cNvSpPr/>
           <p:nvPr/>
         </p:nvSpPr>
         <p:spPr>
           <a:xfrm>
             <a:off x="720000" y="3960000"/>
-            <a:ext cx="21778560" cy="1451520"/>
+            <a:ext cx="21777480" cy="1450440"/>
           </a:xfrm>
           <a:prstGeom prst="rect">
             <a:avLst/>
@@ -3359,14 +3458,14 @@
       </p:sp>
       <p:sp>
         <p:nvSpPr>
-          <p:cNvPr id="59" name=""/>
+          <p:cNvPr id="60" name=""/>
           <p:cNvSpPr/>
           <p:nvPr/>
         </p:nvSpPr>
         <p:spPr>
           <a:xfrm>
             <a:off x="900000" y="5940000"/>
-            <a:ext cx="22138560" cy="5623560"/>
+            <a:ext cx="22137480" cy="5622480"/>
           </a:xfrm>
           <a:prstGeom prst="rect">
             <a:avLst/>
@@ -3434,14 +3533,14 @@
       </p:grpSpPr>
       <p:sp>
         <p:nvSpPr>
-          <p:cNvPr id="60" name=""/>
+          <p:cNvPr id="61" name=""/>
           <p:cNvSpPr/>
           <p:nvPr/>
         </p:nvSpPr>
         <p:spPr>
           <a:xfrm>
             <a:off x="720000" y="3960000"/>
-            <a:ext cx="21778560" cy="1451520"/>
+            <a:ext cx="21777480" cy="1450440"/>
           </a:xfrm>
           <a:prstGeom prst="rect">
             <a:avLst/>
@@ -3479,14 +3578,14 @@
       </p:sp>
       <p:sp>
         <p:nvSpPr>
-          <p:cNvPr id="61" name=""/>
+          <p:cNvPr id="62" name=""/>
           <p:cNvSpPr/>
           <p:nvPr/>
         </p:nvSpPr>
         <p:spPr>
           <a:xfrm>
             <a:off x="900000" y="5940000"/>
-            <a:ext cx="22138560" cy="5623560"/>
+            <a:ext cx="22137480" cy="5622480"/>
           </a:xfrm>
           <a:prstGeom prst="rect">
             <a:avLst/>
@@ -3524,7 +3623,7 @@
       </p:sp>
       <p:pic>
         <p:nvPicPr>
-          <p:cNvPr id="62" name="" descr=""/>
+          <p:cNvPr id="63" name="" descr=""/>
           <p:cNvPicPr/>
           <p:nvPr/>
         </p:nvPicPr>
@@ -3535,7 +3634,7 @@
         <p:spPr>
           <a:xfrm>
             <a:off x="6480" y="0"/>
-            <a:ext cx="24376680" cy="13715280"/>
+            <a:ext cx="24375600" cy="13714200"/>
           </a:xfrm>
           <a:prstGeom prst="rect">
             <a:avLst/>
@@ -3577,14 +3676,14 @@
       </p:grpSpPr>
       <p:sp>
         <p:nvSpPr>
-          <p:cNvPr id="63" name=""/>
+          <p:cNvPr id="64" name=""/>
           <p:cNvSpPr/>
           <p:nvPr/>
         </p:nvSpPr>
         <p:spPr>
           <a:xfrm>
             <a:off x="720000" y="3960000"/>
-            <a:ext cx="21778560" cy="1451520"/>
+            <a:ext cx="21777480" cy="1450440"/>
           </a:xfrm>
           <a:prstGeom prst="rect">
             <a:avLst/>
@@ -3641,14 +3740,14 @@
       </p:sp>
       <p:sp>
         <p:nvSpPr>
-          <p:cNvPr id="64" name=""/>
+          <p:cNvPr id="65" name=""/>
           <p:cNvSpPr/>
           <p:nvPr/>
         </p:nvSpPr>
         <p:spPr>
           <a:xfrm>
             <a:off x="900000" y="5940000"/>
-            <a:ext cx="22138560" cy="5623560"/>
+            <a:ext cx="22137480" cy="5622480"/>
           </a:xfrm>
           <a:prstGeom prst="rect">
             <a:avLst/>
@@ -3716,14 +3815,14 @@
       </p:grpSpPr>
       <p:sp>
         <p:nvSpPr>
-          <p:cNvPr id="65" name=""/>
+          <p:cNvPr id="66" name=""/>
           <p:cNvSpPr/>
           <p:nvPr/>
         </p:nvSpPr>
         <p:spPr>
           <a:xfrm>
             <a:off x="720000" y="3960000"/>
-            <a:ext cx="21778560" cy="1451520"/>
+            <a:ext cx="21777480" cy="1450440"/>
           </a:xfrm>
           <a:prstGeom prst="rect">
             <a:avLst/>
@@ -3761,14 +3860,14 @@
       </p:sp>
       <p:sp>
         <p:nvSpPr>
-          <p:cNvPr id="66" name=""/>
+          <p:cNvPr id="67" name=""/>
           <p:cNvSpPr/>
           <p:nvPr/>
         </p:nvSpPr>
         <p:spPr>
           <a:xfrm>
             <a:off x="900000" y="5940000"/>
-            <a:ext cx="22138560" cy="5623560"/>
+            <a:ext cx="22137480" cy="5622480"/>
           </a:xfrm>
           <a:prstGeom prst="rect">
             <a:avLst/>
@@ -3806,7 +3905,7 @@
       </p:sp>
       <p:pic>
         <p:nvPicPr>
-          <p:cNvPr id="67" name="" descr=""/>
+          <p:cNvPr id="68" name="" descr=""/>
           <p:cNvPicPr/>
           <p:nvPr/>
         </p:nvPicPr>
@@ -3817,7 +3916,7 @@
         <p:spPr>
           <a:xfrm>
             <a:off x="0" y="-23040"/>
-            <a:ext cx="24383160" cy="13760640"/>
+            <a:ext cx="24382080" cy="13759560"/>
           </a:xfrm>
           <a:prstGeom prst="rect">
             <a:avLst/>
@@ -3859,14 +3958,14 @@
       </p:grpSpPr>
       <p:sp>
         <p:nvSpPr>
-          <p:cNvPr id="68" name=""/>
+          <p:cNvPr id="69" name=""/>
           <p:cNvSpPr/>
           <p:nvPr/>
         </p:nvSpPr>
         <p:spPr>
           <a:xfrm>
             <a:off x="720000" y="3960000"/>
-            <a:ext cx="21778560" cy="1451520"/>
+            <a:ext cx="21777480" cy="1450440"/>
           </a:xfrm>
           <a:prstGeom prst="rect">
             <a:avLst/>
@@ -3923,14 +4022,14 @@
       </p:sp>
       <p:sp>
         <p:nvSpPr>
-          <p:cNvPr id="69" name=""/>
+          <p:cNvPr id="70" name=""/>
           <p:cNvSpPr/>
           <p:nvPr/>
         </p:nvSpPr>
         <p:spPr>
           <a:xfrm>
             <a:off x="900000" y="5940000"/>
-            <a:ext cx="22138560" cy="5623560"/>
+            <a:ext cx="22137480" cy="5622480"/>
           </a:xfrm>
           <a:prstGeom prst="rect">
             <a:avLst/>
@@ -3998,14 +4097,14 @@
       </p:grpSpPr>
       <p:sp>
         <p:nvSpPr>
-          <p:cNvPr id="70" name=""/>
+          <p:cNvPr id="71" name=""/>
           <p:cNvSpPr/>
           <p:nvPr/>
         </p:nvSpPr>
         <p:spPr>
           <a:xfrm>
             <a:off x="720000" y="3960000"/>
-            <a:ext cx="21778560" cy="1451520"/>
+            <a:ext cx="21777480" cy="1450440"/>
           </a:xfrm>
           <a:prstGeom prst="rect">
             <a:avLst/>
@@ -4043,14 +4142,14 @@
       </p:sp>
       <p:sp>
         <p:nvSpPr>
-          <p:cNvPr id="71" name=""/>
+          <p:cNvPr id="72" name=""/>
           <p:cNvSpPr/>
           <p:nvPr/>
         </p:nvSpPr>
         <p:spPr>
           <a:xfrm>
             <a:off x="900000" y="5940000"/>
-            <a:ext cx="22138560" cy="5623560"/>
+            <a:ext cx="22137480" cy="5622480"/>
           </a:xfrm>
           <a:prstGeom prst="rect">
             <a:avLst/>
@@ -4088,7 +4187,7 @@
       </p:sp>
       <p:pic>
         <p:nvPicPr>
-          <p:cNvPr id="72" name="" descr=""/>
+          <p:cNvPr id="73" name="" descr=""/>
           <p:cNvPicPr/>
           <p:nvPr/>
         </p:nvPicPr>
@@ -4099,7 +4198,7 @@
         <p:spPr>
           <a:xfrm>
             <a:off x="0" y="45000"/>
-            <a:ext cx="24383160" cy="13670280"/>
+            <a:ext cx="24382080" cy="13669200"/>
           </a:xfrm>
           <a:prstGeom prst="rect">
             <a:avLst/>
@@ -4141,14 +4240,14 @@
       </p:grpSpPr>
       <p:sp>
         <p:nvSpPr>
-          <p:cNvPr id="73" name=""/>
+          <p:cNvPr id="74" name=""/>
           <p:cNvSpPr/>
           <p:nvPr/>
         </p:nvSpPr>
         <p:spPr>
           <a:xfrm>
             <a:off x="720000" y="3960000"/>
-            <a:ext cx="21778560" cy="1451520"/>
+            <a:ext cx="21777480" cy="1450440"/>
           </a:xfrm>
           <a:prstGeom prst="rect">
             <a:avLst/>
@@ -4205,14 +4304,14 @@
       </p:sp>
       <p:sp>
         <p:nvSpPr>
-          <p:cNvPr id="74" name=""/>
+          <p:cNvPr id="75" name=""/>
           <p:cNvSpPr/>
           <p:nvPr/>
         </p:nvSpPr>
         <p:spPr>
           <a:xfrm>
             <a:off x="900000" y="5940000"/>
-            <a:ext cx="22138560" cy="5623560"/>
+            <a:ext cx="22137480" cy="5622480"/>
           </a:xfrm>
           <a:prstGeom prst="rect">
             <a:avLst/>
@@ -4280,14 +4379,14 @@
       </p:grpSpPr>
       <p:sp>
         <p:nvSpPr>
-          <p:cNvPr id="75" name=""/>
+          <p:cNvPr id="76" name=""/>
           <p:cNvSpPr/>
           <p:nvPr/>
         </p:nvSpPr>
         <p:spPr>
           <a:xfrm>
             <a:off x="720000" y="3960000"/>
-            <a:ext cx="21778560" cy="1451520"/>
+            <a:ext cx="21777480" cy="1450440"/>
           </a:xfrm>
           <a:prstGeom prst="rect">
             <a:avLst/>
@@ -4325,14 +4424,14 @@
       </p:sp>
       <p:sp>
         <p:nvSpPr>
-          <p:cNvPr id="76" name=""/>
+          <p:cNvPr id="77" name=""/>
           <p:cNvSpPr/>
           <p:nvPr/>
         </p:nvSpPr>
         <p:spPr>
           <a:xfrm>
             <a:off x="900000" y="5940000"/>
-            <a:ext cx="22138560" cy="5623560"/>
+            <a:ext cx="22137480" cy="5622480"/>
           </a:xfrm>
           <a:prstGeom prst="rect">
             <a:avLst/>
@@ -4370,7 +4469,7 @@
       </p:sp>
       <p:pic>
         <p:nvPicPr>
-          <p:cNvPr id="77" name="" descr=""/>
+          <p:cNvPr id="78" name="" descr=""/>
           <p:cNvPicPr/>
           <p:nvPr/>
         </p:nvPicPr>
@@ -4381,7 +4480,7 @@
         <p:spPr>
           <a:xfrm>
             <a:off x="0" y="0"/>
-            <a:ext cx="24392880" cy="13715640"/>
+            <a:ext cx="24391800" cy="13714560"/>
           </a:xfrm>
           <a:prstGeom prst="rect">
             <a:avLst/>
@@ -4423,14 +4522,14 @@
       </p:grpSpPr>
       <p:sp>
         <p:nvSpPr>
-          <p:cNvPr id="78" name=""/>
+          <p:cNvPr id="79" name=""/>
           <p:cNvSpPr/>
           <p:nvPr/>
         </p:nvSpPr>
         <p:spPr>
           <a:xfrm>
             <a:off x="720000" y="3960000"/>
-            <a:ext cx="21778560" cy="1451520"/>
+            <a:ext cx="21777480" cy="1450440"/>
           </a:xfrm>
           <a:prstGeom prst="rect">
             <a:avLst/>
@@ -4474,7 +4573,7 @@
                 <a:latin typeface="Arial"/>
                 <a:ea typeface="Helvetica Neue"/>
               </a:rPr>
-              <a:t>Diagrama de sequencia</a:t>
+              <a:t>Diagrama de sequência</a:t>
             </a:r>
             <a:endParaRPr b="0" lang="pt-BR" sz="9600" spc="-1" strike="noStrike">
               <a:solidFill>
@@ -4487,14 +4586,14 @@
       </p:sp>
       <p:sp>
         <p:nvSpPr>
-          <p:cNvPr id="79" name=""/>
+          <p:cNvPr id="80" name=""/>
           <p:cNvSpPr/>
           <p:nvPr/>
         </p:nvSpPr>
         <p:spPr>
           <a:xfrm>
             <a:off x="900000" y="5940000"/>
-            <a:ext cx="22138560" cy="5623560"/>
+            <a:ext cx="22137480" cy="5622480"/>
           </a:xfrm>
           <a:prstGeom prst="rect">
             <a:avLst/>
@@ -4569,7 +4668,7 @@
         <p:spPr>
           <a:xfrm>
             <a:off x="720000" y="3960000"/>
-            <a:ext cx="21778560" cy="4138560"/>
+            <a:ext cx="21777480" cy="4137480"/>
           </a:xfrm>
           <a:prstGeom prst="rect">
             <a:avLst/>
@@ -4610,6 +4709,51 @@
                 <a:srgbClr val="000000"/>
               </a:solidFill>
               <a:latin typeface="Arial"/>
+            </a:endParaRPr>
+          </a:p>
+        </p:txBody>
+      </p:sp>
+      <p:sp>
+        <p:nvSpPr>
+          <p:cNvPr id="45" name=""/>
+          <p:cNvSpPr/>
+          <p:nvPr/>
+        </p:nvSpPr>
+        <p:spPr>
+          <a:xfrm>
+            <a:off x="1513440" y="7740000"/>
+            <a:ext cx="21807000" cy="4139280"/>
+          </a:xfrm>
+          <a:prstGeom prst="rect">
+            <a:avLst/>
+          </a:prstGeom>
+          <a:noFill/>
+          <a:ln w="0">
+            <a:noFill/>
+          </a:ln>
+        </p:spPr>
+        <p:style>
+          <a:lnRef idx="0"/>
+          <a:fillRef idx="0"/>
+          <a:effectRef idx="0"/>
+          <a:fontRef idx="minor"/>
+        </p:style>
+        <p:txBody>
+          <a:bodyPr lIns="90000" rIns="90000" tIns="45000" bIns="45000" anchor="t">
+            <a:noAutofit/>
+          </a:bodyPr>
+          <a:p>
+            <a:pPr>
+              <a:lnSpc>
+                <a:spcPct val="100000"/>
+              </a:lnSpc>
+            </a:pPr>
+            <a:endParaRPr b="0" lang="pt-BR" sz="1800" spc="-1" strike="noStrike">
+              <a:solidFill>
+                <a:srgbClr val="000000"/>
+              </a:solidFill>
+              <a:latin typeface="Arial"/>
+              <a:ea typeface="Helvetica Neue"/>
             </a:endParaRPr>
           </a:p>
         </p:txBody>
@@ -4646,14 +4790,14 @@
       </p:grpSpPr>
       <p:sp>
         <p:nvSpPr>
-          <p:cNvPr id="80" name=""/>
+          <p:cNvPr id="81" name=""/>
           <p:cNvSpPr/>
           <p:nvPr/>
         </p:nvSpPr>
         <p:spPr>
           <a:xfrm>
             <a:off x="720000" y="3960000"/>
-            <a:ext cx="21778560" cy="1451520"/>
+            <a:ext cx="21777480" cy="1450440"/>
           </a:xfrm>
           <a:prstGeom prst="rect">
             <a:avLst/>
@@ -4679,26 +4823,45 @@
                 <a:spcPct val="100000"/>
               </a:lnSpc>
             </a:pPr>
-            <a:endParaRPr b="0" lang="pt-BR" sz="1800" spc="-1" strike="noStrike">
-              <a:solidFill>
-                <a:srgbClr val="000000"/>
-              </a:solidFill>
-              <a:latin typeface="Arial"/>
-              <a:ea typeface="Helvetica Neue"/>
-            </a:endParaRPr>
-          </a:p>
-        </p:txBody>
-      </p:sp>
-      <p:sp>
-        <p:nvSpPr>
-          <p:cNvPr id="81" name=""/>
+            <a:r>
+              <a:rPr b="1" lang="pt-BR" sz="9600" spc="-1" strike="noStrike" baseline="33000">
+                <a:solidFill>
+                  <a:srgbClr val="000000"/>
+                </a:solidFill>
+                <a:latin typeface="Arial"/>
+                <a:ea typeface="Helvetica Neue"/>
+              </a:rPr>
+              <a:t>• </a:t>
+            </a:r>
+            <a:r>
+              <a:rPr b="1" lang="pt-BR" sz="9600" spc="-1" strike="noStrike" baseline="33000">
+                <a:solidFill>
+                  <a:srgbClr val="000000"/>
+                </a:solidFill>
+                <a:latin typeface="Arial"/>
+                <a:ea typeface="Helvetica Neue"/>
+              </a:rPr>
+              <a:t>Diagrama de sequência</a:t>
+            </a:r>
+            <a:endParaRPr b="0" lang="pt-BR" sz="9600" spc="-1" strike="noStrike">
+              <a:solidFill>
+                <a:srgbClr val="000000"/>
+              </a:solidFill>
+              <a:latin typeface="Arial"/>
+            </a:endParaRPr>
+          </a:p>
+        </p:txBody>
+      </p:sp>
+      <p:sp>
+        <p:nvSpPr>
+          <p:cNvPr id="82" name=""/>
           <p:cNvSpPr/>
           <p:nvPr/>
         </p:nvSpPr>
         <p:spPr>
           <a:xfrm>
             <a:off x="900000" y="5940000"/>
-            <a:ext cx="22138560" cy="5623560"/>
+            <a:ext cx="22137480" cy="5622480"/>
           </a:xfrm>
           <a:prstGeom prst="rect">
             <a:avLst/>
@@ -4719,11 +4882,6 @@
             <a:noAutofit/>
           </a:bodyPr>
           <a:p>
-            <a:pPr>
-              <a:lnSpc>
-                <a:spcPct val="100000"/>
-              </a:lnSpc>
-            </a:pPr>
             <a:endParaRPr b="0" lang="pt-BR" sz="1800" spc="-1" strike="noStrike">
               <a:solidFill>
                 <a:srgbClr val="000000"/>
@@ -4734,29 +4892,6 @@
           </a:p>
         </p:txBody>
       </p:sp>
-      <p:pic>
-        <p:nvPicPr>
-          <p:cNvPr id="82" name="" descr=""/>
-          <p:cNvPicPr/>
-          <p:nvPr/>
-        </p:nvPicPr>
-        <p:blipFill>
-          <a:blip r:embed="rId1"/>
-          <a:stretch/>
-        </p:blipFill>
-        <p:spPr>
-          <a:xfrm>
-            <a:off x="0" y="0"/>
-            <a:ext cx="24383880" cy="13716000"/>
-          </a:xfrm>
-          <a:prstGeom prst="rect">
-            <a:avLst/>
-          </a:prstGeom>
-          <a:ln w="0">
-            <a:noFill/>
-          </a:ln>
-        </p:spPr>
-      </p:pic>
     </p:spTree>
   </p:cSld>
   <mc:AlternateContent>
@@ -4795,8 +4930,2425 @@
         </p:nvSpPr>
         <p:spPr>
           <a:xfrm>
+            <a:off x="720000" y="3960000"/>
+            <a:ext cx="21777480" cy="1450440"/>
+          </a:xfrm>
+          <a:prstGeom prst="rect">
+            <a:avLst/>
+          </a:prstGeom>
+          <a:noFill/>
+          <a:ln w="0">
+            <a:noFill/>
+          </a:ln>
+        </p:spPr>
+        <p:style>
+          <a:lnRef idx="0"/>
+          <a:fillRef idx="0"/>
+          <a:effectRef idx="0"/>
+          <a:fontRef idx="minor"/>
+        </p:style>
+        <p:txBody>
+          <a:bodyPr lIns="90000" rIns="90000" tIns="45000" bIns="45000" anchor="t">
+            <a:noAutofit/>
+          </a:bodyPr>
+          <a:p>
+            <a:pPr>
+              <a:lnSpc>
+                <a:spcPct val="100000"/>
+              </a:lnSpc>
+            </a:pPr>
+            <a:endParaRPr b="0" lang="pt-BR" sz="1800" spc="-1" strike="noStrike">
+              <a:solidFill>
+                <a:srgbClr val="000000"/>
+              </a:solidFill>
+              <a:latin typeface="Arial"/>
+              <a:ea typeface="Helvetica Neue"/>
+            </a:endParaRPr>
+          </a:p>
+        </p:txBody>
+      </p:sp>
+      <p:sp>
+        <p:nvSpPr>
+          <p:cNvPr id="84" name=""/>
+          <p:cNvSpPr/>
+          <p:nvPr/>
+        </p:nvSpPr>
+        <p:spPr>
+          <a:xfrm>
+            <a:off x="900000" y="5940000"/>
+            <a:ext cx="22137480" cy="5622480"/>
+          </a:xfrm>
+          <a:prstGeom prst="rect">
+            <a:avLst/>
+          </a:prstGeom>
+          <a:noFill/>
+          <a:ln w="0">
+            <a:noFill/>
+          </a:ln>
+        </p:spPr>
+        <p:style>
+          <a:lnRef idx="0"/>
+          <a:fillRef idx="0"/>
+          <a:effectRef idx="0"/>
+          <a:fontRef idx="minor"/>
+        </p:style>
+        <p:txBody>
+          <a:bodyPr lIns="0" rIns="0" tIns="0" bIns="0" anchor="t">
+            <a:noAutofit/>
+          </a:bodyPr>
+          <a:p>
+            <a:pPr>
+              <a:lnSpc>
+                <a:spcPct val="100000"/>
+              </a:lnSpc>
+            </a:pPr>
+            <a:endParaRPr b="0" lang="pt-BR" sz="1800" spc="-1" strike="noStrike">
+              <a:solidFill>
+                <a:srgbClr val="000000"/>
+              </a:solidFill>
+              <a:latin typeface="Arial"/>
+              <a:ea typeface="Helvetica Neue"/>
+            </a:endParaRPr>
+          </a:p>
+        </p:txBody>
+      </p:sp>
+      <p:pic>
+        <p:nvPicPr>
+          <p:cNvPr id="85" name="" descr=""/>
+          <p:cNvPicPr/>
+          <p:nvPr/>
+        </p:nvPicPr>
+        <p:blipFill>
+          <a:blip r:embed="rId1"/>
+          <a:stretch/>
+        </p:blipFill>
+        <p:spPr>
+          <a:xfrm>
+            <a:off x="0" y="71280"/>
+            <a:ext cx="24383520" cy="13644360"/>
+          </a:xfrm>
+          <a:prstGeom prst="rect">
+            <a:avLst/>
+          </a:prstGeom>
+          <a:ln w="0">
+            <a:noFill/>
+          </a:ln>
+        </p:spPr>
+      </p:pic>
+    </p:spTree>
+  </p:cSld>
+  <mc:AlternateContent>
+    <mc:Choice Requires="p14">
+      <p:transition spd="slow" p14:dur="2000"/>
+    </mc:Choice>
+    <mc:Fallback>
+      <p:transition spd="slow"/>
+    </mc:Fallback>
+  </mc:AlternateContent>
+</p:sld>
+</file>
+
+<file path=ppt/slides/slide22.xml><?xml version="1.0" encoding="utf-8"?>
+<p:sld xmlns:a="http://schemas.openxmlformats.org/drawingml/2006/main" xmlns:p="http://schemas.openxmlformats.org/presentationml/2006/main" xmlns:r="http://schemas.openxmlformats.org/officeDocument/2006/relationships" xmlns:p14="http://schemas.microsoft.com/office/powerpoint/2010/main" xmlns:p15="http://schemas.microsoft.com/office/powerpoint/2012/main" xmlns:mc="http://schemas.openxmlformats.org/markup-compatibility/2006">
+  <p:cSld>
+    <p:spTree>
+      <p:nvGrpSpPr>
+        <p:cNvPr id="1" name=""/>
+        <p:cNvGrpSpPr/>
+        <p:nvPr/>
+      </p:nvGrpSpPr>
+      <p:grpSpPr>
+        <a:xfrm>
+          <a:off x="0" y="0"/>
+          <a:ext cx="0" cy="0"/>
+          <a:chOff x="0" y="0"/>
+          <a:chExt cx="0" cy="0"/>
+        </a:xfrm>
+      </p:grpSpPr>
+      <p:sp>
+        <p:nvSpPr>
+          <p:cNvPr id="86" name=""/>
+          <p:cNvSpPr/>
+          <p:nvPr/>
+        </p:nvSpPr>
+        <p:spPr>
+          <a:xfrm>
+            <a:off x="720000" y="3960000"/>
+            <a:ext cx="21777480" cy="1450440"/>
+          </a:xfrm>
+          <a:prstGeom prst="rect">
+            <a:avLst/>
+          </a:prstGeom>
+          <a:noFill/>
+          <a:ln w="0">
+            <a:noFill/>
+          </a:ln>
+        </p:spPr>
+        <p:style>
+          <a:lnRef idx="0"/>
+          <a:fillRef idx="0"/>
+          <a:effectRef idx="0"/>
+          <a:fontRef idx="minor"/>
+        </p:style>
+        <p:txBody>
+          <a:bodyPr lIns="90000" rIns="90000" tIns="45000" bIns="45000" anchor="t">
+            <a:noAutofit/>
+          </a:bodyPr>
+          <a:p>
+            <a:pPr>
+              <a:lnSpc>
+                <a:spcPct val="100000"/>
+              </a:lnSpc>
+            </a:pPr>
+            <a:r>
+              <a:rPr b="1" lang="pt-BR" sz="9600" spc="-1" strike="noStrike" baseline="33000">
+                <a:solidFill>
+                  <a:srgbClr val="000000"/>
+                </a:solidFill>
+                <a:latin typeface="Arial"/>
+                <a:ea typeface="Helvetica Neue"/>
+              </a:rPr>
+              <a:t>• </a:t>
+            </a:r>
+            <a:r>
+              <a:rPr b="1" lang="pt-BR" sz="9600" spc="-1" strike="noStrike" baseline="33000">
+                <a:solidFill>
+                  <a:srgbClr val="000000"/>
+                </a:solidFill>
+                <a:latin typeface="Arial"/>
+                <a:ea typeface="Helvetica Neue"/>
+              </a:rPr>
+              <a:t>Caso de uso criar evento</a:t>
+            </a:r>
+            <a:endParaRPr b="0" lang="pt-BR" sz="9600" spc="-1" strike="noStrike">
+              <a:solidFill>
+                <a:srgbClr val="000000"/>
+              </a:solidFill>
+              <a:latin typeface="Arial"/>
+            </a:endParaRPr>
+          </a:p>
+        </p:txBody>
+      </p:sp>
+      <p:sp>
+        <p:nvSpPr>
+          <p:cNvPr id="87" name=""/>
+          <p:cNvSpPr/>
+          <p:nvPr/>
+        </p:nvSpPr>
+        <p:spPr>
+          <a:xfrm>
+            <a:off x="900000" y="5940000"/>
+            <a:ext cx="22137480" cy="5622480"/>
+          </a:xfrm>
+          <a:prstGeom prst="rect">
+            <a:avLst/>
+          </a:prstGeom>
+          <a:noFill/>
+          <a:ln w="0">
+            <a:noFill/>
+          </a:ln>
+        </p:spPr>
+        <p:style>
+          <a:lnRef idx="0"/>
+          <a:fillRef idx="0"/>
+          <a:effectRef idx="0"/>
+          <a:fontRef idx="minor"/>
+        </p:style>
+        <p:txBody>
+          <a:bodyPr lIns="0" rIns="0" tIns="0" bIns="0" anchor="t">
+            <a:noAutofit/>
+          </a:bodyPr>
+          <a:p>
+            <a:endParaRPr b="0" lang="pt-BR" sz="1800" spc="-1" strike="noStrike">
+              <a:solidFill>
+                <a:srgbClr val="000000"/>
+              </a:solidFill>
+              <a:latin typeface="Arial"/>
+              <a:ea typeface="Helvetica Neue"/>
+            </a:endParaRPr>
+          </a:p>
+        </p:txBody>
+      </p:sp>
+    </p:spTree>
+  </p:cSld>
+  <mc:AlternateContent>
+    <mc:Choice Requires="p14">
+      <p:transition spd="slow" p14:dur="2000"/>
+    </mc:Choice>
+    <mc:Fallback>
+      <p:transition spd="slow"/>
+    </mc:Fallback>
+  </mc:AlternateContent>
+</p:sld>
+</file>
+
+<file path=ppt/slides/slide23.xml><?xml version="1.0" encoding="utf-8"?>
+<p:sld xmlns:a="http://schemas.openxmlformats.org/drawingml/2006/main" xmlns:p="http://schemas.openxmlformats.org/presentationml/2006/main" xmlns:r="http://schemas.openxmlformats.org/officeDocument/2006/relationships" xmlns:p14="http://schemas.microsoft.com/office/powerpoint/2010/main" xmlns:p15="http://schemas.microsoft.com/office/powerpoint/2012/main" xmlns:mc="http://schemas.openxmlformats.org/markup-compatibility/2006">
+  <p:cSld>
+    <p:spTree>
+      <p:nvGrpSpPr>
+        <p:cNvPr id="1" name=""/>
+        <p:cNvGrpSpPr/>
+        <p:nvPr/>
+      </p:nvGrpSpPr>
+      <p:grpSpPr>
+        <a:xfrm>
+          <a:off x="0" y="0"/>
+          <a:ext cx="0" cy="0"/>
+          <a:chOff x="0" y="0"/>
+          <a:chExt cx="0" cy="0"/>
+        </a:xfrm>
+      </p:grpSpPr>
+      <p:sp>
+        <p:nvSpPr>
+          <p:cNvPr id="88" name=""/>
+          <p:cNvSpPr/>
+          <p:nvPr/>
+        </p:nvSpPr>
+        <p:spPr>
+          <a:xfrm>
+            <a:off x="720000" y="3960000"/>
+            <a:ext cx="21777480" cy="1450440"/>
+          </a:xfrm>
+          <a:prstGeom prst="rect">
+            <a:avLst/>
+          </a:prstGeom>
+          <a:noFill/>
+          <a:ln w="0">
+            <a:noFill/>
+          </a:ln>
+        </p:spPr>
+        <p:style>
+          <a:lnRef idx="0"/>
+          <a:fillRef idx="0"/>
+          <a:effectRef idx="0"/>
+          <a:fontRef idx="minor"/>
+        </p:style>
+        <p:txBody>
+          <a:bodyPr lIns="90000" rIns="90000" tIns="45000" bIns="45000" anchor="t">
+            <a:noAutofit/>
+          </a:bodyPr>
+          <a:p>
+            <a:pPr>
+              <a:lnSpc>
+                <a:spcPct val="100000"/>
+              </a:lnSpc>
+            </a:pPr>
+            <a:endParaRPr b="0" lang="pt-BR" sz="1800" spc="-1" strike="noStrike">
+              <a:solidFill>
+                <a:srgbClr val="000000"/>
+              </a:solidFill>
+              <a:latin typeface="Arial"/>
+            </a:endParaRPr>
+          </a:p>
+        </p:txBody>
+      </p:sp>
+      <p:sp>
+        <p:nvSpPr>
+          <p:cNvPr id="89" name=""/>
+          <p:cNvSpPr/>
+          <p:nvPr/>
+        </p:nvSpPr>
+        <p:spPr>
+          <a:xfrm>
+            <a:off x="900000" y="5940000"/>
+            <a:ext cx="22137480" cy="5622480"/>
+          </a:xfrm>
+          <a:prstGeom prst="rect">
+            <a:avLst/>
+          </a:prstGeom>
+          <a:noFill/>
+          <a:ln w="0">
+            <a:noFill/>
+          </a:ln>
+        </p:spPr>
+        <p:style>
+          <a:lnRef idx="0"/>
+          <a:fillRef idx="0"/>
+          <a:effectRef idx="0"/>
+          <a:fontRef idx="minor"/>
+        </p:style>
+        <p:txBody>
+          <a:bodyPr lIns="0" rIns="0" tIns="0" bIns="0" anchor="t">
+            <a:noAutofit/>
+          </a:bodyPr>
+          <a:p>
+            <a:endParaRPr b="0" lang="pt-BR" sz="1800" spc="-1" strike="noStrike">
+              <a:solidFill>
+                <a:srgbClr val="000000"/>
+              </a:solidFill>
+              <a:latin typeface="Arial"/>
+              <a:ea typeface="Helvetica Neue"/>
+            </a:endParaRPr>
+          </a:p>
+        </p:txBody>
+      </p:sp>
+      <p:graphicFrame>
+        <p:nvGraphicFramePr>
+          <p:cNvPr id="90" name=""/>
+          <p:cNvGraphicFramePr/>
+          <p:nvPr/>
+        </p:nvGraphicFramePr>
+        <p:xfrm>
+          <a:off x="7380000" y="2520000"/>
+          <a:ext cx="9720000" cy="10080000"/>
+        </p:xfrm>
+        <a:graphic>
+          <a:graphicData uri="http://schemas.openxmlformats.org/drawingml/2006/table">
+            <a:tbl>
+              <a:tblPr/>
+              <a:tblGrid>
+                <a:gridCol w="5352840"/>
+                <a:gridCol w="4367160"/>
+              </a:tblGrid>
+              <a:tr h="1249920">
+                <a:tc>
+                  <a:txBody>
+                    <a:bodyPr lIns="36000" rIns="36000" tIns="36000" bIns="36000" anchor="t">
+                      <a:noAutofit/>
+                    </a:bodyPr>
+                    <a:p>
+                      <a:pPr algn="just">
+                        <a:lnSpc>
+                          <a:spcPct val="150000"/>
+                        </a:lnSpc>
+                      </a:pPr>
+                      <a:r>
+                        <a:rPr b="0" lang="pt-BR" sz="2400" spc="-1" strike="noStrike">
+                          <a:solidFill>
+                            <a:srgbClr val="000000"/>
+                          </a:solidFill>
+                          <a:latin typeface="Arial"/>
+                        </a:rPr>
+                        <a:t>Nome do Caso de Uso</a:t>
+                      </a:r>
+                      <a:endParaRPr b="0" lang="pt-BR" sz="2400" spc="-1" strike="noStrike">
+                        <a:solidFill>
+                          <a:srgbClr val="000000"/>
+                        </a:solidFill>
+                        <a:latin typeface="Arial"/>
+                      </a:endParaRPr>
+                    </a:p>
+                  </a:txBody>
+                  <a:tcPr anchor="t" marL="36000" marR="36000">
+                    <a:lnL w="7200">
+                      <a:solidFill>
+                        <a:srgbClr val="000000"/>
+                      </a:solidFill>
+                      <a:prstDash val="solid"/>
+                    </a:lnL>
+                    <a:lnR w="7200">
+                      <a:solidFill>
+                        <a:srgbClr val="000000"/>
+                      </a:solidFill>
+                      <a:prstDash val="solid"/>
+                    </a:lnR>
+                    <a:lnT w="7200">
+                      <a:solidFill>
+                        <a:srgbClr val="000000"/>
+                      </a:solidFill>
+                      <a:prstDash val="solid"/>
+                    </a:lnT>
+                    <a:lnB w="7200">
+                      <a:solidFill>
+                        <a:srgbClr val="000000"/>
+                      </a:solidFill>
+                      <a:prstDash val="solid"/>
+                    </a:lnB>
+                    <a:noFill/>
+                  </a:tcPr>
+                </a:tc>
+                <a:tc>
+                  <a:txBody>
+                    <a:bodyPr lIns="36000" rIns="36000" tIns="36000" bIns="36000" anchor="t">
+                      <a:noAutofit/>
+                    </a:bodyPr>
+                    <a:p>
+                      <a:pPr algn="just">
+                        <a:lnSpc>
+                          <a:spcPct val="150000"/>
+                        </a:lnSpc>
+                      </a:pPr>
+                      <a:r>
+                        <a:rPr b="0" i="1" lang="pt-BR" sz="2400" spc="-1" strike="noStrike">
+                          <a:solidFill>
+                            <a:srgbClr val="5b9bd5"/>
+                          </a:solidFill>
+                          <a:latin typeface="Arial"/>
+                        </a:rPr>
+                        <a:t>Criar evento</a:t>
+                      </a:r>
+                      <a:endParaRPr b="0" i="1" lang="pt-BR" sz="2400" spc="-1" strike="noStrike">
+                        <a:solidFill>
+                          <a:srgbClr val="5b9bd5"/>
+                        </a:solidFill>
+                        <a:latin typeface="Arial"/>
+                      </a:endParaRPr>
+                    </a:p>
+                  </a:txBody>
+                  <a:tcPr anchor="t" marL="36000" marR="36000">
+                    <a:lnL w="7200">
+                      <a:solidFill>
+                        <a:srgbClr val="000000"/>
+                      </a:solidFill>
+                      <a:prstDash val="solid"/>
+                    </a:lnL>
+                    <a:lnR w="7200">
+                      <a:solidFill>
+                        <a:srgbClr val="000000"/>
+                      </a:solidFill>
+                      <a:prstDash val="solid"/>
+                    </a:lnR>
+                    <a:lnT w="7200">
+                      <a:solidFill>
+                        <a:srgbClr val="000000"/>
+                      </a:solidFill>
+                      <a:prstDash val="solid"/>
+                    </a:lnT>
+                    <a:lnB w="7200">
+                      <a:solidFill>
+                        <a:srgbClr val="000000"/>
+                      </a:solidFill>
+                      <a:prstDash val="solid"/>
+                    </a:lnB>
+                    <a:noFill/>
+                  </a:tcPr>
+                </a:tc>
+              </a:tr>
+              <a:tr h="1103400">
+                <a:tc>
+                  <a:txBody>
+                    <a:bodyPr lIns="36000" rIns="36000" tIns="36000" bIns="36000" anchor="t">
+                      <a:noAutofit/>
+                    </a:bodyPr>
+                    <a:p>
+                      <a:pPr algn="just">
+                        <a:lnSpc>
+                          <a:spcPct val="150000"/>
+                        </a:lnSpc>
+                      </a:pPr>
+                      <a:r>
+                        <a:rPr b="0" lang="pt-BR" sz="2400" spc="-1" strike="noStrike">
+                          <a:solidFill>
+                            <a:srgbClr val="000000"/>
+                          </a:solidFill>
+                          <a:latin typeface="Arial"/>
+                        </a:rPr>
+                        <a:t>Nome do Cenário</a:t>
+                      </a:r>
+                      <a:endParaRPr b="0" lang="pt-BR" sz="2400" spc="-1" strike="noStrike">
+                        <a:solidFill>
+                          <a:srgbClr val="000000"/>
+                        </a:solidFill>
+                        <a:latin typeface="Arial"/>
+                      </a:endParaRPr>
+                    </a:p>
+                  </a:txBody>
+                  <a:tcPr anchor="t" marL="36000" marR="36000">
+                    <a:lnL w="7200">
+                      <a:solidFill>
+                        <a:srgbClr val="000000"/>
+                      </a:solidFill>
+                      <a:prstDash val="solid"/>
+                    </a:lnL>
+                    <a:lnR w="7200">
+                      <a:solidFill>
+                        <a:srgbClr val="000000"/>
+                      </a:solidFill>
+                      <a:prstDash val="solid"/>
+                    </a:lnR>
+                    <a:lnT w="7200">
+                      <a:solidFill>
+                        <a:srgbClr val="000000"/>
+                      </a:solidFill>
+                      <a:prstDash val="solid"/>
+                    </a:lnT>
+                    <a:lnB w="7200">
+                      <a:solidFill>
+                        <a:srgbClr val="000000"/>
+                      </a:solidFill>
+                      <a:prstDash val="solid"/>
+                    </a:lnB>
+                    <a:noFill/>
+                  </a:tcPr>
+                </a:tc>
+                <a:tc>
+                  <a:txBody>
+                    <a:bodyPr lIns="36000" rIns="36000" tIns="36000" bIns="36000" anchor="t">
+                      <a:noAutofit/>
+                    </a:bodyPr>
+                    <a:p>
+                      <a:pPr algn="just">
+                        <a:lnSpc>
+                          <a:spcPct val="150000"/>
+                        </a:lnSpc>
+                      </a:pPr>
+                      <a:r>
+                        <a:rPr b="0" i="1" lang="pt-BR" sz="2400" spc="-1" strike="noStrike">
+                          <a:solidFill>
+                            <a:srgbClr val="5b9bd5"/>
+                          </a:solidFill>
+                          <a:latin typeface="Arial"/>
+                        </a:rPr>
+                        <a:t>Evento criado com sucesso</a:t>
+                      </a:r>
+                      <a:endParaRPr b="0" i="1" lang="pt-BR" sz="2400" spc="-1" strike="noStrike">
+                        <a:solidFill>
+                          <a:srgbClr val="5b9bd5"/>
+                        </a:solidFill>
+                        <a:latin typeface="Arial"/>
+                      </a:endParaRPr>
+                    </a:p>
+                  </a:txBody>
+                  <a:tcPr anchor="t" marL="36000" marR="36000">
+                    <a:lnL w="7200">
+                      <a:solidFill>
+                        <a:srgbClr val="000000"/>
+                      </a:solidFill>
+                      <a:prstDash val="solid"/>
+                    </a:lnL>
+                    <a:lnR w="7200">
+                      <a:solidFill>
+                        <a:srgbClr val="000000"/>
+                      </a:solidFill>
+                      <a:prstDash val="solid"/>
+                    </a:lnR>
+                    <a:lnT w="7200">
+                      <a:solidFill>
+                        <a:srgbClr val="000000"/>
+                      </a:solidFill>
+                      <a:prstDash val="solid"/>
+                    </a:lnT>
+                    <a:lnB w="7200">
+                      <a:solidFill>
+                        <a:srgbClr val="000000"/>
+                      </a:solidFill>
+                      <a:prstDash val="solid"/>
+                    </a:lnB>
+                    <a:noFill/>
+                  </a:tcPr>
+                </a:tc>
+              </a:tr>
+              <a:tr h="1103400">
+                <a:tc>
+                  <a:txBody>
+                    <a:bodyPr lIns="36000" rIns="36000" tIns="36000" bIns="36000" anchor="t">
+                      <a:noAutofit/>
+                    </a:bodyPr>
+                    <a:p>
+                      <a:pPr algn="just">
+                        <a:lnSpc>
+                          <a:spcPct val="150000"/>
+                        </a:lnSpc>
+                      </a:pPr>
+                      <a:r>
+                        <a:rPr b="0" lang="pt-BR" sz="2400" spc="-1" strike="noStrike">
+                          <a:solidFill>
+                            <a:srgbClr val="000000"/>
+                          </a:solidFill>
+                          <a:latin typeface="Arial"/>
+                        </a:rPr>
+                        <a:t>Atores Envolvidos</a:t>
+                      </a:r>
+                      <a:endParaRPr b="0" lang="pt-BR" sz="2400" spc="-1" strike="noStrike">
+                        <a:solidFill>
+                          <a:srgbClr val="000000"/>
+                        </a:solidFill>
+                        <a:latin typeface="Arial"/>
+                      </a:endParaRPr>
+                    </a:p>
+                  </a:txBody>
+                  <a:tcPr anchor="t" marL="36000" marR="36000">
+                    <a:lnL w="7200">
+                      <a:solidFill>
+                        <a:srgbClr val="000000"/>
+                      </a:solidFill>
+                      <a:prstDash val="solid"/>
+                    </a:lnL>
+                    <a:lnR w="7200">
+                      <a:solidFill>
+                        <a:srgbClr val="000000"/>
+                      </a:solidFill>
+                      <a:prstDash val="solid"/>
+                    </a:lnR>
+                    <a:lnT w="7200">
+                      <a:solidFill>
+                        <a:srgbClr val="000000"/>
+                      </a:solidFill>
+                      <a:prstDash val="solid"/>
+                    </a:lnT>
+                    <a:lnB w="7200">
+                      <a:solidFill>
+                        <a:srgbClr val="000000"/>
+                      </a:solidFill>
+                      <a:prstDash val="solid"/>
+                    </a:lnB>
+                    <a:noFill/>
+                  </a:tcPr>
+                </a:tc>
+                <a:tc>
+                  <a:txBody>
+                    <a:bodyPr lIns="36000" rIns="36000" tIns="36000" bIns="36000" anchor="t">
+                      <a:noAutofit/>
+                    </a:bodyPr>
+                    <a:p>
+                      <a:pPr algn="just">
+                        <a:lnSpc>
+                          <a:spcPct val="150000"/>
+                        </a:lnSpc>
+                      </a:pPr>
+                      <a:r>
+                        <a:rPr b="0" i="1" lang="pt-BR" sz="2400" spc="-1" strike="noStrike">
+                          <a:solidFill>
+                            <a:srgbClr val="5b9bd5"/>
+                          </a:solidFill>
+                          <a:latin typeface="Arial"/>
+                        </a:rPr>
+                        <a:t>Usuário</a:t>
+                      </a:r>
+                      <a:endParaRPr b="0" i="1" lang="pt-BR" sz="2400" spc="-1" strike="noStrike">
+                        <a:solidFill>
+                          <a:srgbClr val="5b9bd5"/>
+                        </a:solidFill>
+                        <a:latin typeface="Arial"/>
+                      </a:endParaRPr>
+                    </a:p>
+                  </a:txBody>
+                  <a:tcPr anchor="t" marL="36000" marR="36000">
+                    <a:lnL w="7200">
+                      <a:solidFill>
+                        <a:srgbClr val="000000"/>
+                      </a:solidFill>
+                      <a:prstDash val="solid"/>
+                    </a:lnL>
+                    <a:lnR w="7200">
+                      <a:solidFill>
+                        <a:srgbClr val="000000"/>
+                      </a:solidFill>
+                      <a:prstDash val="solid"/>
+                    </a:lnR>
+                    <a:lnT w="7200">
+                      <a:solidFill>
+                        <a:srgbClr val="000000"/>
+                      </a:solidFill>
+                      <a:prstDash val="solid"/>
+                    </a:lnT>
+                    <a:lnB w="7200">
+                      <a:solidFill>
+                        <a:srgbClr val="000000"/>
+                      </a:solidFill>
+                      <a:prstDash val="solid"/>
+                    </a:lnB>
+                    <a:noFill/>
+                  </a:tcPr>
+                </a:tc>
+              </a:tr>
+              <a:tr h="1103400">
+                <a:tc>
+                  <a:txBody>
+                    <a:bodyPr lIns="36000" rIns="36000" tIns="36000" bIns="36000" anchor="t">
+                      <a:noAutofit/>
+                    </a:bodyPr>
+                    <a:p>
+                      <a:pPr algn="just">
+                        <a:lnSpc>
+                          <a:spcPct val="150000"/>
+                        </a:lnSpc>
+                      </a:pPr>
+                      <a:r>
+                        <a:rPr b="0" lang="pt-BR" sz="2400" spc="-1" strike="noStrike">
+                          <a:solidFill>
+                            <a:srgbClr val="000000"/>
+                          </a:solidFill>
+                          <a:latin typeface="Arial"/>
+                        </a:rPr>
+                        <a:t>Pré-condição</a:t>
+                      </a:r>
+                      <a:endParaRPr b="0" lang="pt-BR" sz="2400" spc="-1" strike="noStrike">
+                        <a:solidFill>
+                          <a:srgbClr val="000000"/>
+                        </a:solidFill>
+                        <a:latin typeface="Arial"/>
+                      </a:endParaRPr>
+                    </a:p>
+                  </a:txBody>
+                  <a:tcPr anchor="t" marL="36000" marR="36000">
+                    <a:lnL w="7200">
+                      <a:solidFill>
+                        <a:srgbClr val="000000"/>
+                      </a:solidFill>
+                      <a:prstDash val="solid"/>
+                    </a:lnL>
+                    <a:lnR w="7200">
+                      <a:solidFill>
+                        <a:srgbClr val="000000"/>
+                      </a:solidFill>
+                      <a:prstDash val="solid"/>
+                    </a:lnR>
+                    <a:lnT w="7200">
+                      <a:solidFill>
+                        <a:srgbClr val="000000"/>
+                      </a:solidFill>
+                      <a:prstDash val="solid"/>
+                    </a:lnT>
+                    <a:lnB w="7200">
+                      <a:solidFill>
+                        <a:srgbClr val="000000"/>
+                      </a:solidFill>
+                      <a:prstDash val="solid"/>
+                    </a:lnB>
+                    <a:noFill/>
+                  </a:tcPr>
+                </a:tc>
+                <a:tc>
+                  <a:txBody>
+                    <a:bodyPr lIns="36000" rIns="36000" tIns="36000" bIns="36000" anchor="t">
+                      <a:noAutofit/>
+                    </a:bodyPr>
+                    <a:p>
+                      <a:pPr algn="just">
+                        <a:lnSpc>
+                          <a:spcPct val="150000"/>
+                        </a:lnSpc>
+                      </a:pPr>
+                      <a:r>
+                        <a:rPr b="0" i="1" lang="pt-BR" sz="2400" spc="-1" strike="noStrike">
+                          <a:solidFill>
+                            <a:srgbClr val="5b9bd5"/>
+                          </a:solidFill>
+                          <a:latin typeface="Arial"/>
+                        </a:rPr>
+                        <a:t>Usuário estar logado no sistema</a:t>
+                      </a:r>
+                      <a:endParaRPr b="0" i="1" lang="pt-BR" sz="2400" spc="-1" strike="noStrike">
+                        <a:solidFill>
+                          <a:srgbClr val="5b9bd5"/>
+                        </a:solidFill>
+                        <a:latin typeface="Arial"/>
+                      </a:endParaRPr>
+                    </a:p>
+                  </a:txBody>
+                  <a:tcPr anchor="t" marL="36000" marR="36000">
+                    <a:lnL w="7200">
+                      <a:solidFill>
+                        <a:srgbClr val="000000"/>
+                      </a:solidFill>
+                      <a:prstDash val="solid"/>
+                    </a:lnL>
+                    <a:lnR w="7200">
+                      <a:solidFill>
+                        <a:srgbClr val="000000"/>
+                      </a:solidFill>
+                      <a:prstDash val="solid"/>
+                    </a:lnR>
+                    <a:lnT w="7200">
+                      <a:solidFill>
+                        <a:srgbClr val="000000"/>
+                      </a:solidFill>
+                      <a:prstDash val="solid"/>
+                    </a:lnT>
+                    <a:lnB w="7200">
+                      <a:solidFill>
+                        <a:srgbClr val="000000"/>
+                      </a:solidFill>
+                      <a:prstDash val="solid"/>
+                    </a:lnB>
+                    <a:noFill/>
+                  </a:tcPr>
+                </a:tc>
+              </a:tr>
+              <a:tr h="1103400">
+                <a:tc>
+                  <a:txBody>
+                    <a:bodyPr lIns="36000" rIns="36000" tIns="36000" bIns="36000" anchor="t">
+                      <a:noAutofit/>
+                    </a:bodyPr>
+                    <a:p>
+                      <a:pPr algn="just">
+                        <a:lnSpc>
+                          <a:spcPct val="150000"/>
+                        </a:lnSpc>
+                      </a:pPr>
+                      <a:r>
+                        <a:rPr b="0" lang="pt-BR" sz="2400" spc="-1" strike="noStrike">
+                          <a:solidFill>
+                            <a:srgbClr val="000000"/>
+                          </a:solidFill>
+                          <a:latin typeface="Arial"/>
+                        </a:rPr>
+                        <a:t>Pós-condição</a:t>
+                      </a:r>
+                      <a:endParaRPr b="0" lang="pt-BR" sz="2400" spc="-1" strike="noStrike">
+                        <a:solidFill>
+                          <a:srgbClr val="000000"/>
+                        </a:solidFill>
+                        <a:latin typeface="Arial"/>
+                      </a:endParaRPr>
+                    </a:p>
+                  </a:txBody>
+                  <a:tcPr anchor="t" marL="36000" marR="36000">
+                    <a:lnL w="7200">
+                      <a:solidFill>
+                        <a:srgbClr val="000000"/>
+                      </a:solidFill>
+                      <a:prstDash val="solid"/>
+                    </a:lnL>
+                    <a:lnR w="7200">
+                      <a:solidFill>
+                        <a:srgbClr val="000000"/>
+                      </a:solidFill>
+                      <a:prstDash val="solid"/>
+                    </a:lnR>
+                    <a:lnT w="7200">
+                      <a:solidFill>
+                        <a:srgbClr val="000000"/>
+                      </a:solidFill>
+                      <a:prstDash val="solid"/>
+                    </a:lnT>
+                    <a:lnB w="7200">
+                      <a:solidFill>
+                        <a:srgbClr val="000000"/>
+                      </a:solidFill>
+                      <a:prstDash val="solid"/>
+                    </a:lnB>
+                    <a:noFill/>
+                  </a:tcPr>
+                </a:tc>
+                <a:tc>
+                  <a:txBody>
+                    <a:bodyPr lIns="36000" rIns="36000" tIns="36000" bIns="36000" anchor="t">
+                      <a:noAutofit/>
+                    </a:bodyPr>
+                    <a:p>
+                      <a:pPr algn="just">
+                        <a:lnSpc>
+                          <a:spcPct val="150000"/>
+                        </a:lnSpc>
+                      </a:pPr>
+                      <a:r>
+                        <a:rPr b="0" i="1" lang="pt-BR" sz="2400" spc="-1" strike="noStrike">
+                          <a:solidFill>
+                            <a:srgbClr val="5b9bd5"/>
+                          </a:solidFill>
+                          <a:latin typeface="Arial"/>
+                        </a:rPr>
+                        <a:t>Ter o evento criado em sua conta</a:t>
+                      </a:r>
+                      <a:endParaRPr b="0" i="1" lang="pt-BR" sz="2400" spc="-1" strike="noStrike">
+                        <a:solidFill>
+                          <a:srgbClr val="5b9bd5"/>
+                        </a:solidFill>
+                        <a:latin typeface="Arial"/>
+                      </a:endParaRPr>
+                    </a:p>
+                  </a:txBody>
+                  <a:tcPr anchor="t" marL="36000" marR="36000">
+                    <a:lnL w="7200">
+                      <a:solidFill>
+                        <a:srgbClr val="000000"/>
+                      </a:solidFill>
+                      <a:prstDash val="solid"/>
+                    </a:lnL>
+                    <a:lnR w="7200">
+                      <a:solidFill>
+                        <a:srgbClr val="000000"/>
+                      </a:solidFill>
+                      <a:prstDash val="solid"/>
+                    </a:lnR>
+                    <a:lnT w="7200">
+                      <a:solidFill>
+                        <a:srgbClr val="000000"/>
+                      </a:solidFill>
+                      <a:prstDash val="solid"/>
+                    </a:lnT>
+                    <a:lnB w="7200">
+                      <a:solidFill>
+                        <a:srgbClr val="000000"/>
+                      </a:solidFill>
+                      <a:prstDash val="solid"/>
+                    </a:lnB>
+                    <a:noFill/>
+                  </a:tcPr>
+                </a:tc>
+              </a:tr>
+              <a:tr h="1103400">
+                <a:tc>
+                  <a:txBody>
+                    <a:bodyPr lIns="36000" rIns="36000" tIns="36000" bIns="36000" anchor="t">
+                      <a:noAutofit/>
+                    </a:bodyPr>
+                    <a:p>
+                      <a:pPr algn="just">
+                        <a:lnSpc>
+                          <a:spcPct val="150000"/>
+                        </a:lnSpc>
+                      </a:pPr>
+                      <a:r>
+                        <a:rPr b="0" lang="pt-BR" sz="2400" spc="-1" strike="noStrike">
+                          <a:solidFill>
+                            <a:srgbClr val="000000"/>
+                          </a:solidFill>
+                          <a:latin typeface="Arial"/>
+                        </a:rPr>
+                        <a:t>Ator</a:t>
+                      </a:r>
+                      <a:endParaRPr b="0" lang="pt-BR" sz="2400" spc="-1" strike="noStrike">
+                        <a:solidFill>
+                          <a:srgbClr val="000000"/>
+                        </a:solidFill>
+                        <a:latin typeface="Arial"/>
+                      </a:endParaRPr>
+                    </a:p>
+                  </a:txBody>
+                  <a:tcPr anchor="t" marL="36000" marR="36000">
+                    <a:lnL w="7200">
+                      <a:solidFill>
+                        <a:srgbClr val="000000"/>
+                      </a:solidFill>
+                      <a:prstDash val="solid"/>
+                    </a:lnL>
+                    <a:lnR w="7200">
+                      <a:solidFill>
+                        <a:srgbClr val="000000"/>
+                      </a:solidFill>
+                      <a:prstDash val="solid"/>
+                    </a:lnR>
+                    <a:lnT w="7200">
+                      <a:solidFill>
+                        <a:srgbClr val="000000"/>
+                      </a:solidFill>
+                      <a:prstDash val="solid"/>
+                    </a:lnT>
+                    <a:lnB w="7200">
+                      <a:solidFill>
+                        <a:srgbClr val="000000"/>
+                      </a:solidFill>
+                      <a:prstDash val="solid"/>
+                    </a:lnB>
+                    <a:noFill/>
+                  </a:tcPr>
+                </a:tc>
+                <a:tc>
+                  <a:txBody>
+                    <a:bodyPr lIns="36000" rIns="36000" tIns="36000" bIns="36000" anchor="t">
+                      <a:noAutofit/>
+                    </a:bodyPr>
+                    <a:p>
+                      <a:pPr algn="just">
+                        <a:lnSpc>
+                          <a:spcPct val="150000"/>
+                        </a:lnSpc>
+                      </a:pPr>
+                      <a:r>
+                        <a:rPr b="0" lang="pt-BR" sz="2400" spc="-1" strike="noStrike">
+                          <a:solidFill>
+                            <a:srgbClr val="000000"/>
+                          </a:solidFill>
+                          <a:latin typeface="Arial"/>
+                        </a:rPr>
+                        <a:t>Sistema</a:t>
+                      </a:r>
+                      <a:endParaRPr b="0" lang="pt-BR" sz="2400" spc="-1" strike="noStrike">
+                        <a:solidFill>
+                          <a:srgbClr val="000000"/>
+                        </a:solidFill>
+                        <a:latin typeface="Arial"/>
+                      </a:endParaRPr>
+                    </a:p>
+                  </a:txBody>
+                  <a:tcPr anchor="t" marL="36000" marR="36000">
+                    <a:lnL w="7200">
+                      <a:solidFill>
+                        <a:srgbClr val="000000"/>
+                      </a:solidFill>
+                      <a:prstDash val="solid"/>
+                    </a:lnL>
+                    <a:lnR w="7200">
+                      <a:solidFill>
+                        <a:srgbClr val="000000"/>
+                      </a:solidFill>
+                      <a:prstDash val="solid"/>
+                    </a:lnR>
+                    <a:lnT w="7200">
+                      <a:solidFill>
+                        <a:srgbClr val="000000"/>
+                      </a:solidFill>
+                      <a:prstDash val="solid"/>
+                    </a:lnT>
+                    <a:lnB w="7200">
+                      <a:solidFill>
+                        <a:srgbClr val="000000"/>
+                      </a:solidFill>
+                      <a:prstDash val="solid"/>
+                    </a:lnB>
+                    <a:noFill/>
+                  </a:tcPr>
+                </a:tc>
+              </a:tr>
+              <a:tr h="1103400">
+                <a:tc>
+                  <a:txBody>
+                    <a:bodyPr lIns="36000" rIns="36000" tIns="36000" bIns="36000" anchor="t">
+                      <a:noAutofit/>
+                    </a:bodyPr>
+                    <a:p>
+                      <a:pPr algn="just">
+                        <a:lnSpc>
+                          <a:spcPct val="150000"/>
+                        </a:lnSpc>
+                      </a:pPr>
+                      <a:r>
+                        <a:rPr b="0" i="1" lang="pt-BR" sz="2400" spc="-1" strike="noStrike">
+                          <a:solidFill>
+                            <a:srgbClr val="5b9bd5"/>
+                          </a:solidFill>
+                          <a:latin typeface="Arial"/>
+                        </a:rPr>
+                        <a:t>1. Informa nome do evento.</a:t>
+                      </a:r>
+                      <a:endParaRPr b="0" i="1" lang="pt-BR" sz="2400" spc="-1" strike="noStrike">
+                        <a:solidFill>
+                          <a:srgbClr val="5b9bd5"/>
+                        </a:solidFill>
+                        <a:latin typeface="Arial"/>
+                      </a:endParaRPr>
+                    </a:p>
+                  </a:txBody>
+                  <a:tcPr anchor="t" marL="36000" marR="36000">
+                    <a:lnL w="7200">
+                      <a:solidFill>
+                        <a:srgbClr val="000000"/>
+                      </a:solidFill>
+                      <a:prstDash val="solid"/>
+                    </a:lnL>
+                    <a:lnR w="7200">
+                      <a:solidFill>
+                        <a:srgbClr val="000000"/>
+                      </a:solidFill>
+                      <a:prstDash val="solid"/>
+                    </a:lnR>
+                    <a:lnT w="7200">
+                      <a:solidFill>
+                        <a:srgbClr val="000000"/>
+                      </a:solidFill>
+                      <a:prstDash val="solid"/>
+                    </a:lnT>
+                    <a:lnB w="7200">
+                      <a:solidFill>
+                        <a:srgbClr val="000000"/>
+                      </a:solidFill>
+                      <a:prstDash val="solid"/>
+                    </a:lnB>
+                    <a:noFill/>
+                  </a:tcPr>
+                </a:tc>
+                <a:tc>
+                  <a:txBody>
+                    <a:bodyPr lIns="36000" rIns="36000" tIns="36000" bIns="36000" anchor="t">
+                      <a:noAutofit/>
+                    </a:bodyPr>
+                    <a:p>
+                      <a:pPr algn="just">
+                        <a:lnSpc>
+                          <a:spcPct val="150000"/>
+                        </a:lnSpc>
+                      </a:pPr>
+                      <a:endParaRPr b="0" lang="pt-BR" sz="2400" spc="-1" strike="noStrike">
+                        <a:solidFill>
+                          <a:srgbClr val="5b9bd5"/>
+                        </a:solidFill>
+                        <a:latin typeface="Arial"/>
+                      </a:endParaRPr>
+                    </a:p>
+                  </a:txBody>
+                  <a:tcPr anchor="t" marL="36000" marR="36000">
+                    <a:lnL w="7200">
+                      <a:solidFill>
+                        <a:srgbClr val="000000"/>
+                      </a:solidFill>
+                      <a:prstDash val="solid"/>
+                    </a:lnL>
+                    <a:lnR w="7200">
+                      <a:solidFill>
+                        <a:srgbClr val="000000"/>
+                      </a:solidFill>
+                      <a:prstDash val="solid"/>
+                    </a:lnR>
+                    <a:lnT w="7200">
+                      <a:solidFill>
+                        <a:srgbClr val="000000"/>
+                      </a:solidFill>
+                      <a:prstDash val="solid"/>
+                    </a:lnT>
+                    <a:lnB w="7200">
+                      <a:solidFill>
+                        <a:srgbClr val="000000"/>
+                      </a:solidFill>
+                      <a:prstDash val="solid"/>
+                    </a:lnB>
+                    <a:noFill/>
+                  </a:tcPr>
+                </a:tc>
+              </a:tr>
+              <a:tr h="1103400">
+                <a:tc>
+                  <a:txBody>
+                    <a:bodyPr lIns="36000" rIns="36000" tIns="36000" bIns="36000" anchor="t">
+                      <a:noAutofit/>
+                    </a:bodyPr>
+                    <a:p>
+                      <a:pPr algn="just">
+                        <a:lnSpc>
+                          <a:spcPct val="150000"/>
+                        </a:lnSpc>
+                      </a:pPr>
+                      <a:r>
+                        <a:rPr b="0" i="1" lang="pt-BR" sz="2400" spc="-1" strike="noStrike">
+                          <a:solidFill>
+                            <a:srgbClr val="5b9bd5"/>
+                          </a:solidFill>
+                          <a:latin typeface="Arial"/>
+                        </a:rPr>
+                        <a:t>2. Informa descrição do evento.</a:t>
+                      </a:r>
+                      <a:endParaRPr b="0" i="1" lang="pt-BR" sz="2400" spc="-1" strike="noStrike">
+                        <a:solidFill>
+                          <a:srgbClr val="5b9bd5"/>
+                        </a:solidFill>
+                        <a:latin typeface="Arial"/>
+                      </a:endParaRPr>
+                    </a:p>
+                  </a:txBody>
+                  <a:tcPr anchor="t" marL="36000" marR="36000">
+                    <a:lnL w="7200">
+                      <a:solidFill>
+                        <a:srgbClr val="000000"/>
+                      </a:solidFill>
+                      <a:prstDash val="solid"/>
+                    </a:lnL>
+                    <a:lnR w="7200">
+                      <a:solidFill>
+                        <a:srgbClr val="000000"/>
+                      </a:solidFill>
+                      <a:prstDash val="solid"/>
+                    </a:lnR>
+                    <a:lnT w="7200">
+                      <a:solidFill>
+                        <a:srgbClr val="000000"/>
+                      </a:solidFill>
+                      <a:prstDash val="solid"/>
+                    </a:lnT>
+                    <a:lnB w="7200">
+                      <a:solidFill>
+                        <a:srgbClr val="000000"/>
+                      </a:solidFill>
+                      <a:prstDash val="solid"/>
+                    </a:lnB>
+                    <a:noFill/>
+                  </a:tcPr>
+                </a:tc>
+                <a:tc>
+                  <a:txBody>
+                    <a:bodyPr lIns="36000" rIns="36000" tIns="36000" bIns="36000" anchor="t">
+                      <a:noAutofit/>
+                    </a:bodyPr>
+                    <a:p>
+                      <a:pPr algn="just">
+                        <a:lnSpc>
+                          <a:spcPct val="150000"/>
+                        </a:lnSpc>
+                      </a:pPr>
+                      <a:endParaRPr b="0" lang="pt-BR" sz="2400" spc="-1" strike="noStrike">
+                        <a:solidFill>
+                          <a:srgbClr val="5b9bd5"/>
+                        </a:solidFill>
+                        <a:latin typeface="Arial"/>
+                      </a:endParaRPr>
+                    </a:p>
+                  </a:txBody>
+                  <a:tcPr anchor="t" marL="36000" marR="36000">
+                    <a:lnL w="7200">
+                      <a:solidFill>
+                        <a:srgbClr val="000000"/>
+                      </a:solidFill>
+                      <a:prstDash val="solid"/>
+                    </a:lnL>
+                    <a:lnR w="7200">
+                      <a:solidFill>
+                        <a:srgbClr val="000000"/>
+                      </a:solidFill>
+                      <a:prstDash val="solid"/>
+                    </a:lnR>
+                    <a:lnT w="7200">
+                      <a:solidFill>
+                        <a:srgbClr val="000000"/>
+                      </a:solidFill>
+                      <a:prstDash val="solid"/>
+                    </a:lnT>
+                    <a:lnB w="7200">
+                      <a:solidFill>
+                        <a:srgbClr val="000000"/>
+                      </a:solidFill>
+                      <a:prstDash val="solid"/>
+                    </a:lnB>
+                    <a:noFill/>
+                  </a:tcPr>
+                </a:tc>
+              </a:tr>
+              <a:tr h="1106280">
+                <a:tc>
+                  <a:txBody>
+                    <a:bodyPr lIns="36000" rIns="36000" tIns="36000" bIns="36000" anchor="t">
+                      <a:noAutofit/>
+                    </a:bodyPr>
+                    <a:p>
+                      <a:pPr algn="just">
+                        <a:lnSpc>
+                          <a:spcPct val="150000"/>
+                        </a:lnSpc>
+                      </a:pPr>
+                      <a:r>
+                        <a:rPr b="0" i="1" lang="pt-BR" sz="2400" spc="-1" strike="noStrike">
+                          <a:solidFill>
+                            <a:srgbClr val="5b9bd5"/>
+                          </a:solidFill>
+                          <a:latin typeface="Arial"/>
+                        </a:rPr>
+                        <a:t>3. Informa data de início.</a:t>
+                      </a:r>
+                      <a:endParaRPr b="0" i="1" lang="pt-BR" sz="2400" spc="-1" strike="noStrike">
+                        <a:solidFill>
+                          <a:srgbClr val="5b9bd5"/>
+                        </a:solidFill>
+                        <a:latin typeface="Arial"/>
+                      </a:endParaRPr>
+                    </a:p>
+                  </a:txBody>
+                  <a:tcPr anchor="t" marL="36000" marR="36000">
+                    <a:lnL w="7200">
+                      <a:solidFill>
+                        <a:srgbClr val="000000"/>
+                      </a:solidFill>
+                      <a:prstDash val="solid"/>
+                    </a:lnL>
+                    <a:lnR w="7200">
+                      <a:solidFill>
+                        <a:srgbClr val="000000"/>
+                      </a:solidFill>
+                      <a:prstDash val="solid"/>
+                    </a:lnR>
+                    <a:lnT w="7200">
+                      <a:solidFill>
+                        <a:srgbClr val="000000"/>
+                      </a:solidFill>
+                      <a:prstDash val="solid"/>
+                    </a:lnT>
+                    <a:lnB w="7200">
+                      <a:solidFill>
+                        <a:srgbClr val="000000"/>
+                      </a:solidFill>
+                      <a:prstDash val="solid"/>
+                    </a:lnB>
+                    <a:noFill/>
+                  </a:tcPr>
+                </a:tc>
+                <a:tc>
+                  <a:txBody>
+                    <a:bodyPr lIns="36000" rIns="36000" tIns="36000" bIns="36000" anchor="t">
+                      <a:noAutofit/>
+                    </a:bodyPr>
+                    <a:p>
+                      <a:pPr algn="just">
+                        <a:lnSpc>
+                          <a:spcPct val="150000"/>
+                        </a:lnSpc>
+                      </a:pPr>
+                      <a:endParaRPr b="0" lang="pt-BR" sz="2400" spc="-1" strike="noStrike">
+                        <a:solidFill>
+                          <a:srgbClr val="5b9bd5"/>
+                        </a:solidFill>
+                        <a:latin typeface="Arial"/>
+                      </a:endParaRPr>
+                    </a:p>
+                  </a:txBody>
+                  <a:tcPr anchor="t" marL="36000" marR="36000">
+                    <a:lnL w="7200">
+                      <a:solidFill>
+                        <a:srgbClr val="000000"/>
+                      </a:solidFill>
+                      <a:prstDash val="solid"/>
+                    </a:lnL>
+                    <a:lnR w="7200">
+                      <a:solidFill>
+                        <a:srgbClr val="000000"/>
+                      </a:solidFill>
+                      <a:prstDash val="solid"/>
+                    </a:lnR>
+                    <a:lnT w="7200">
+                      <a:solidFill>
+                        <a:srgbClr val="000000"/>
+                      </a:solidFill>
+                      <a:prstDash val="solid"/>
+                    </a:lnT>
+                    <a:lnB w="7200">
+                      <a:solidFill>
+                        <a:srgbClr val="000000"/>
+                      </a:solidFill>
+                      <a:prstDash val="solid"/>
+                    </a:lnB>
+                    <a:noFill/>
+                  </a:tcPr>
+                </a:tc>
+              </a:tr>
+            </a:tbl>
+          </a:graphicData>
+        </a:graphic>
+      </p:graphicFrame>
+    </p:spTree>
+  </p:cSld>
+  <mc:AlternateContent>
+    <mc:Choice Requires="p14">
+      <p:transition spd="slow" p14:dur="2000"/>
+    </mc:Choice>
+    <mc:Fallback>
+      <p:transition spd="slow"/>
+    </mc:Fallback>
+  </mc:AlternateContent>
+</p:sld>
+</file>
+
+<file path=ppt/slides/slide24.xml><?xml version="1.0" encoding="utf-8"?>
+<p:sld xmlns:a="http://schemas.openxmlformats.org/drawingml/2006/main" xmlns:p="http://schemas.openxmlformats.org/presentationml/2006/main" xmlns:r="http://schemas.openxmlformats.org/officeDocument/2006/relationships" xmlns:p14="http://schemas.microsoft.com/office/powerpoint/2010/main" xmlns:p15="http://schemas.microsoft.com/office/powerpoint/2012/main" xmlns:mc="http://schemas.openxmlformats.org/markup-compatibility/2006">
+  <p:cSld>
+    <p:spTree>
+      <p:nvGrpSpPr>
+        <p:cNvPr id="1" name=""/>
+        <p:cNvGrpSpPr/>
+        <p:nvPr/>
+      </p:nvGrpSpPr>
+      <p:grpSpPr>
+        <a:xfrm>
+          <a:off x="0" y="0"/>
+          <a:ext cx="0" cy="0"/>
+          <a:chOff x="0" y="0"/>
+          <a:chExt cx="0" cy="0"/>
+        </a:xfrm>
+      </p:grpSpPr>
+      <p:sp>
+        <p:nvSpPr>
+          <p:cNvPr id="91" name=""/>
+          <p:cNvSpPr/>
+          <p:nvPr/>
+        </p:nvSpPr>
+        <p:spPr>
+          <a:xfrm>
+            <a:off x="720000" y="3960000"/>
+            <a:ext cx="21777480" cy="1450440"/>
+          </a:xfrm>
+          <a:prstGeom prst="rect">
+            <a:avLst/>
+          </a:prstGeom>
+          <a:noFill/>
+          <a:ln w="0">
+            <a:noFill/>
+          </a:ln>
+        </p:spPr>
+        <p:style>
+          <a:lnRef idx="0"/>
+          <a:fillRef idx="0"/>
+          <a:effectRef idx="0"/>
+          <a:fontRef idx="minor"/>
+        </p:style>
+        <p:txBody>
+          <a:bodyPr lIns="90000" rIns="90000" tIns="45000" bIns="45000" anchor="t">
+            <a:noAutofit/>
+          </a:bodyPr>
+          <a:p>
+            <a:endParaRPr b="0" lang="pt-BR" sz="1800" spc="-1" strike="noStrike">
+              <a:solidFill>
+                <a:srgbClr val="000000"/>
+              </a:solidFill>
+              <a:latin typeface="Arial"/>
+            </a:endParaRPr>
+          </a:p>
+        </p:txBody>
+      </p:sp>
+      <p:sp>
+        <p:nvSpPr>
+          <p:cNvPr id="92" name=""/>
+          <p:cNvSpPr/>
+          <p:nvPr/>
+        </p:nvSpPr>
+        <p:spPr>
+          <a:xfrm>
+            <a:off x="900000" y="5940000"/>
+            <a:ext cx="22137480" cy="5622480"/>
+          </a:xfrm>
+          <a:prstGeom prst="rect">
+            <a:avLst/>
+          </a:prstGeom>
+          <a:noFill/>
+          <a:ln w="0">
+            <a:noFill/>
+          </a:ln>
+        </p:spPr>
+        <p:style>
+          <a:lnRef idx="0"/>
+          <a:fillRef idx="0"/>
+          <a:effectRef idx="0"/>
+          <a:fontRef idx="minor"/>
+        </p:style>
+        <p:txBody>
+          <a:bodyPr lIns="0" rIns="0" tIns="0" bIns="0" anchor="t">
+            <a:noAutofit/>
+          </a:bodyPr>
+          <a:p>
+            <a:endParaRPr b="0" lang="pt-BR" sz="1800" spc="-1" strike="noStrike">
+              <a:solidFill>
+                <a:srgbClr val="000000"/>
+              </a:solidFill>
+              <a:latin typeface="Arial"/>
+              <a:ea typeface="Helvetica Neue"/>
+            </a:endParaRPr>
+          </a:p>
+        </p:txBody>
+      </p:sp>
+      <p:graphicFrame>
+        <p:nvGraphicFramePr>
+          <p:cNvPr id="93" name=""/>
+          <p:cNvGraphicFramePr/>
+          <p:nvPr/>
+        </p:nvGraphicFramePr>
+        <p:xfrm>
+          <a:off x="7543800" y="2776680"/>
+          <a:ext cx="9540000" cy="9540000"/>
+        </p:xfrm>
+        <a:graphic>
+          <a:graphicData uri="http://schemas.openxmlformats.org/drawingml/2006/table">
+            <a:tbl>
+              <a:tblPr/>
+              <a:tblGrid>
+                <a:gridCol w="5253840"/>
+                <a:gridCol w="4286160"/>
+              </a:tblGrid>
+              <a:tr h="1368360">
+                <a:tc>
+                  <a:txBody>
+                    <a:bodyPr lIns="36000" rIns="36000" tIns="36000" bIns="36000" anchor="t">
+                      <a:noAutofit/>
+                    </a:bodyPr>
+                    <a:p>
+                      <a:pPr algn="just">
+                        <a:lnSpc>
+                          <a:spcPct val="150000"/>
+                        </a:lnSpc>
+                      </a:pPr>
+                      <a:r>
+                        <a:rPr b="0" i="1" lang="pt-BR" sz="2200" spc="-1" strike="noStrike">
+                          <a:solidFill>
+                            <a:srgbClr val="5b9bd5"/>
+                          </a:solidFill>
+                          <a:latin typeface="Arial"/>
+                        </a:rPr>
+                        <a:t>4. Informa data de finalização.</a:t>
+                      </a:r>
+                      <a:endParaRPr b="0" i="1" lang="pt-BR" sz="2200" spc="-1" strike="noStrike">
+                        <a:solidFill>
+                          <a:srgbClr val="5b9bd5"/>
+                        </a:solidFill>
+                        <a:latin typeface="Arial"/>
+                      </a:endParaRPr>
+                    </a:p>
+                  </a:txBody>
+                  <a:tcPr anchor="t" marL="36000" marR="36000">
+                    <a:lnL w="7200">
+                      <a:solidFill>
+                        <a:srgbClr val="000000"/>
+                      </a:solidFill>
+                      <a:prstDash val="solid"/>
+                    </a:lnL>
+                    <a:lnR w="7200">
+                      <a:solidFill>
+                        <a:srgbClr val="000000"/>
+                      </a:solidFill>
+                      <a:prstDash val="solid"/>
+                    </a:lnR>
+                    <a:lnT w="7200">
+                      <a:solidFill>
+                        <a:srgbClr val="000000"/>
+                      </a:solidFill>
+                      <a:prstDash val="solid"/>
+                    </a:lnT>
+                    <a:lnB w="7200">
+                      <a:solidFill>
+                        <a:srgbClr val="000000"/>
+                      </a:solidFill>
+                      <a:prstDash val="solid"/>
+                    </a:lnB>
+                    <a:noFill/>
+                  </a:tcPr>
+                </a:tc>
+                <a:tc>
+                  <a:txBody>
+                    <a:bodyPr lIns="36000" rIns="36000" tIns="36000" bIns="36000" anchor="t">
+                      <a:noAutofit/>
+                    </a:bodyPr>
+                    <a:p>
+                      <a:pPr algn="just">
+                        <a:lnSpc>
+                          <a:spcPct val="150000"/>
+                        </a:lnSpc>
+                      </a:pPr>
+                      <a:endParaRPr b="0" lang="pt-BR" sz="2200" spc="-1" strike="noStrike">
+                        <a:solidFill>
+                          <a:srgbClr val="5b9bd5"/>
+                        </a:solidFill>
+                        <a:latin typeface="Arial"/>
+                      </a:endParaRPr>
+                    </a:p>
+                  </a:txBody>
+                  <a:tcPr anchor="t" marL="36000" marR="36000">
+                    <a:lnL w="7200">
+                      <a:solidFill>
+                        <a:srgbClr val="000000"/>
+                      </a:solidFill>
+                      <a:prstDash val="solid"/>
+                    </a:lnL>
+                    <a:lnR w="7200">
+                      <a:solidFill>
+                        <a:srgbClr val="000000"/>
+                      </a:solidFill>
+                      <a:prstDash val="solid"/>
+                    </a:lnR>
+                    <a:lnT w="7200">
+                      <a:solidFill>
+                        <a:srgbClr val="000000"/>
+                      </a:solidFill>
+                      <a:prstDash val="solid"/>
+                    </a:lnT>
+                    <a:lnB w="7200">
+                      <a:solidFill>
+                        <a:srgbClr val="000000"/>
+                      </a:solidFill>
+                      <a:prstDash val="solid"/>
+                    </a:lnB>
+                    <a:noFill/>
+                  </a:tcPr>
+                </a:tc>
+              </a:tr>
+              <a:tr h="1207800">
+                <a:tc>
+                  <a:txBody>
+                    <a:bodyPr lIns="36000" rIns="36000" tIns="36000" bIns="36000" anchor="t">
+                      <a:noAutofit/>
+                    </a:bodyPr>
+                    <a:p>
+                      <a:pPr algn="just">
+                        <a:lnSpc>
+                          <a:spcPct val="150000"/>
+                        </a:lnSpc>
+                      </a:pPr>
+                      <a:r>
+                        <a:rPr b="0" i="1" lang="pt-BR" sz="2200" spc="-1" strike="noStrike">
+                          <a:solidFill>
+                            <a:srgbClr val="5b9bd5"/>
+                          </a:solidFill>
+                          <a:latin typeface="Arial"/>
+                        </a:rPr>
+                        <a:t>5. Insere imagem (opcional).</a:t>
+                      </a:r>
+                      <a:endParaRPr b="0" i="1" lang="pt-BR" sz="2200" spc="-1" strike="noStrike">
+                        <a:solidFill>
+                          <a:srgbClr val="5b9bd5"/>
+                        </a:solidFill>
+                        <a:latin typeface="Arial"/>
+                      </a:endParaRPr>
+                    </a:p>
+                  </a:txBody>
+                  <a:tcPr anchor="t" marL="36000" marR="36000">
+                    <a:lnL w="7200">
+                      <a:solidFill>
+                        <a:srgbClr val="000000"/>
+                      </a:solidFill>
+                      <a:prstDash val="solid"/>
+                    </a:lnL>
+                    <a:lnR w="7200">
+                      <a:solidFill>
+                        <a:srgbClr val="000000"/>
+                      </a:solidFill>
+                      <a:prstDash val="solid"/>
+                    </a:lnR>
+                    <a:lnT w="7200">
+                      <a:solidFill>
+                        <a:srgbClr val="000000"/>
+                      </a:solidFill>
+                      <a:prstDash val="solid"/>
+                    </a:lnT>
+                    <a:lnB w="7200">
+                      <a:solidFill>
+                        <a:srgbClr val="000000"/>
+                      </a:solidFill>
+                      <a:prstDash val="solid"/>
+                    </a:lnB>
+                    <a:noFill/>
+                  </a:tcPr>
+                </a:tc>
+                <a:tc>
+                  <a:txBody>
+                    <a:bodyPr lIns="36000" rIns="36000" tIns="36000" bIns="36000" anchor="t">
+                      <a:noAutofit/>
+                    </a:bodyPr>
+                    <a:p>
+                      <a:pPr algn="just">
+                        <a:lnSpc>
+                          <a:spcPct val="150000"/>
+                        </a:lnSpc>
+                      </a:pPr>
+                      <a:endParaRPr b="0" lang="pt-BR" sz="2200" spc="-1" strike="noStrike">
+                        <a:solidFill>
+                          <a:srgbClr val="5b9bd5"/>
+                        </a:solidFill>
+                        <a:latin typeface="Arial"/>
+                      </a:endParaRPr>
+                    </a:p>
+                  </a:txBody>
+                  <a:tcPr anchor="t" marL="36000" marR="36000">
+                    <a:lnL w="7200">
+                      <a:solidFill>
+                        <a:srgbClr val="000000"/>
+                      </a:solidFill>
+                      <a:prstDash val="solid"/>
+                    </a:lnL>
+                    <a:lnR w="7200">
+                      <a:solidFill>
+                        <a:srgbClr val="000000"/>
+                      </a:solidFill>
+                      <a:prstDash val="solid"/>
+                    </a:lnR>
+                    <a:lnT w="7200">
+                      <a:solidFill>
+                        <a:srgbClr val="000000"/>
+                      </a:solidFill>
+                      <a:prstDash val="solid"/>
+                    </a:lnT>
+                    <a:lnB w="7200">
+                      <a:solidFill>
+                        <a:srgbClr val="000000"/>
+                      </a:solidFill>
+                      <a:prstDash val="solid"/>
+                    </a:lnB>
+                    <a:noFill/>
+                  </a:tcPr>
+                </a:tc>
+              </a:tr>
+              <a:tr h="1207800">
+                <a:tc>
+                  <a:txBody>
+                    <a:bodyPr lIns="36000" rIns="36000" tIns="36000" bIns="36000" anchor="t">
+                      <a:noAutofit/>
+                    </a:bodyPr>
+                    <a:p>
+                      <a:pPr algn="just">
+                        <a:lnSpc>
+                          <a:spcPct val="150000"/>
+                        </a:lnSpc>
+                      </a:pPr>
+                      <a:r>
+                        <a:rPr b="0" i="1" lang="pt-BR" sz="2200" spc="-1" strike="noStrike">
+                          <a:solidFill>
+                            <a:srgbClr val="5b9bd5"/>
+                          </a:solidFill>
+                          <a:latin typeface="Arial"/>
+                        </a:rPr>
+                        <a:t>6. Insere endereço (opcional).</a:t>
+                      </a:r>
+                      <a:endParaRPr b="0" i="1" lang="pt-BR" sz="2200" spc="-1" strike="noStrike">
+                        <a:solidFill>
+                          <a:srgbClr val="5b9bd5"/>
+                        </a:solidFill>
+                        <a:latin typeface="Arial"/>
+                      </a:endParaRPr>
+                    </a:p>
+                  </a:txBody>
+                  <a:tcPr anchor="t" marL="36000" marR="36000">
+                    <a:lnL w="7200">
+                      <a:solidFill>
+                        <a:srgbClr val="000000"/>
+                      </a:solidFill>
+                      <a:prstDash val="solid"/>
+                    </a:lnL>
+                    <a:lnR w="7200">
+                      <a:solidFill>
+                        <a:srgbClr val="000000"/>
+                      </a:solidFill>
+                      <a:prstDash val="solid"/>
+                    </a:lnR>
+                    <a:lnT w="7200">
+                      <a:solidFill>
+                        <a:srgbClr val="000000"/>
+                      </a:solidFill>
+                      <a:prstDash val="solid"/>
+                    </a:lnT>
+                    <a:lnB w="7200">
+                      <a:solidFill>
+                        <a:srgbClr val="000000"/>
+                      </a:solidFill>
+                      <a:prstDash val="solid"/>
+                    </a:lnB>
+                    <a:noFill/>
+                  </a:tcPr>
+                </a:tc>
+                <a:tc>
+                  <a:txBody>
+                    <a:bodyPr lIns="36000" rIns="36000" tIns="36000" bIns="36000" anchor="t">
+                      <a:noAutofit/>
+                    </a:bodyPr>
+                    <a:p>
+                      <a:pPr algn="just">
+                        <a:lnSpc>
+                          <a:spcPct val="150000"/>
+                        </a:lnSpc>
+                      </a:pPr>
+                      <a:endParaRPr b="0" lang="pt-BR" sz="2200" spc="-1" strike="noStrike">
+                        <a:solidFill>
+                          <a:srgbClr val="5b9bd5"/>
+                        </a:solidFill>
+                        <a:latin typeface="Arial"/>
+                      </a:endParaRPr>
+                    </a:p>
+                  </a:txBody>
+                  <a:tcPr anchor="t" marL="36000" marR="36000">
+                    <a:lnL w="7200">
+                      <a:solidFill>
+                        <a:srgbClr val="000000"/>
+                      </a:solidFill>
+                      <a:prstDash val="solid"/>
+                    </a:lnL>
+                    <a:lnR w="7200">
+                      <a:solidFill>
+                        <a:srgbClr val="000000"/>
+                      </a:solidFill>
+                      <a:prstDash val="solid"/>
+                    </a:lnR>
+                    <a:lnT w="7200">
+                      <a:solidFill>
+                        <a:srgbClr val="000000"/>
+                      </a:solidFill>
+                      <a:prstDash val="solid"/>
+                    </a:lnT>
+                    <a:lnB w="7200">
+                      <a:solidFill>
+                        <a:srgbClr val="000000"/>
+                      </a:solidFill>
+                      <a:prstDash val="solid"/>
+                    </a:lnB>
+                    <a:noFill/>
+                  </a:tcPr>
+                </a:tc>
+              </a:tr>
+              <a:tr h="1207800">
+                <a:tc>
+                  <a:txBody>
+                    <a:bodyPr lIns="36000" rIns="36000" tIns="36000" bIns="36000" anchor="t">
+                      <a:noAutofit/>
+                    </a:bodyPr>
+                    <a:p>
+                      <a:pPr algn="just">
+                        <a:lnSpc>
+                          <a:spcPct val="150000"/>
+                        </a:lnSpc>
+                      </a:pPr>
+                      <a:endParaRPr b="0" i="1" lang="pt-BR" sz="2200" spc="-1" strike="noStrike">
+                        <a:solidFill>
+                          <a:srgbClr val="5b9bd5"/>
+                        </a:solidFill>
+                        <a:latin typeface="Arial"/>
+                      </a:endParaRPr>
+                    </a:p>
+                  </a:txBody>
+                  <a:tcPr anchor="t" marL="36000" marR="36000">
+                    <a:lnL w="7200">
+                      <a:solidFill>
+                        <a:srgbClr val="000000"/>
+                      </a:solidFill>
+                      <a:prstDash val="solid"/>
+                    </a:lnL>
+                    <a:lnR w="7200">
+                      <a:solidFill>
+                        <a:srgbClr val="000000"/>
+                      </a:solidFill>
+                      <a:prstDash val="solid"/>
+                    </a:lnR>
+                    <a:lnT w="7200">
+                      <a:solidFill>
+                        <a:srgbClr val="000000"/>
+                      </a:solidFill>
+                      <a:prstDash val="solid"/>
+                    </a:lnT>
+                    <a:lnB w="7200">
+                      <a:solidFill>
+                        <a:srgbClr val="000000"/>
+                      </a:solidFill>
+                      <a:prstDash val="solid"/>
+                    </a:lnB>
+                    <a:noFill/>
+                  </a:tcPr>
+                </a:tc>
+                <a:tc>
+                  <a:txBody>
+                    <a:bodyPr lIns="36000" rIns="36000" tIns="36000" bIns="36000" anchor="t">
+                      <a:noAutofit/>
+                    </a:bodyPr>
+                    <a:p>
+                      <a:pPr algn="just">
+                        <a:lnSpc>
+                          <a:spcPct val="150000"/>
+                        </a:lnSpc>
+                      </a:pPr>
+                      <a:r>
+                        <a:rPr b="0" i="1" lang="pt-BR" sz="2200" spc="-1" strike="noStrike">
+                          <a:solidFill>
+                            <a:srgbClr val="5b9bd5"/>
+                          </a:solidFill>
+                          <a:latin typeface="Arial"/>
+                        </a:rPr>
+                        <a:t>7. Sistema valida os campos preenchidos.</a:t>
+                      </a:r>
+                      <a:endParaRPr b="0" i="1" lang="pt-BR" sz="2200" spc="-1" strike="noStrike">
+                        <a:solidFill>
+                          <a:srgbClr val="5b9bd5"/>
+                        </a:solidFill>
+                        <a:latin typeface="Arial"/>
+                      </a:endParaRPr>
+                    </a:p>
+                  </a:txBody>
+                  <a:tcPr anchor="t" marL="36000" marR="36000">
+                    <a:lnL w="7200">
+                      <a:solidFill>
+                        <a:srgbClr val="000000"/>
+                      </a:solidFill>
+                      <a:prstDash val="solid"/>
+                    </a:lnL>
+                    <a:lnR w="7200">
+                      <a:solidFill>
+                        <a:srgbClr val="000000"/>
+                      </a:solidFill>
+                      <a:prstDash val="solid"/>
+                    </a:lnR>
+                    <a:lnT w="7200">
+                      <a:solidFill>
+                        <a:srgbClr val="000000"/>
+                      </a:solidFill>
+                      <a:prstDash val="solid"/>
+                    </a:lnT>
+                    <a:lnB w="7200">
+                      <a:solidFill>
+                        <a:srgbClr val="000000"/>
+                      </a:solidFill>
+                      <a:prstDash val="solid"/>
+                    </a:lnB>
+                    <a:noFill/>
+                  </a:tcPr>
+                </a:tc>
+              </a:tr>
+              <a:tr h="2130120">
+                <a:tc>
+                  <a:txBody>
+                    <a:bodyPr lIns="36000" rIns="36000" tIns="36000" bIns="36000" anchor="t">
+                      <a:noAutofit/>
+                    </a:bodyPr>
+                    <a:p>
+                      <a:pPr algn="just">
+                        <a:lnSpc>
+                          <a:spcPct val="150000"/>
+                        </a:lnSpc>
+                      </a:pPr>
+                      <a:endParaRPr b="0" i="1" lang="pt-BR" sz="2200" spc="-1" strike="noStrike">
+                        <a:solidFill>
+                          <a:srgbClr val="5b9bd5"/>
+                        </a:solidFill>
+                        <a:latin typeface="Arial"/>
+                      </a:endParaRPr>
+                    </a:p>
+                  </a:txBody>
+                  <a:tcPr anchor="t" marL="36000" marR="36000">
+                    <a:lnL w="7200">
+                      <a:solidFill>
+                        <a:srgbClr val="000000"/>
+                      </a:solidFill>
+                      <a:prstDash val="solid"/>
+                    </a:lnL>
+                    <a:lnR w="7200">
+                      <a:solidFill>
+                        <a:srgbClr val="000000"/>
+                      </a:solidFill>
+                      <a:prstDash val="solid"/>
+                    </a:lnR>
+                    <a:lnT w="7200">
+                      <a:solidFill>
+                        <a:srgbClr val="000000"/>
+                      </a:solidFill>
+                      <a:prstDash val="solid"/>
+                    </a:lnT>
+                    <a:lnB w="7200">
+                      <a:solidFill>
+                        <a:srgbClr val="000000"/>
+                      </a:solidFill>
+                      <a:prstDash val="solid"/>
+                    </a:lnB>
+                    <a:noFill/>
+                  </a:tcPr>
+                </a:tc>
+                <a:tc>
+                  <a:txBody>
+                    <a:bodyPr lIns="36000" rIns="36000" tIns="36000" bIns="36000" anchor="t">
+                      <a:noAutofit/>
+                    </a:bodyPr>
+                    <a:p>
+                      <a:pPr algn="just">
+                        <a:lnSpc>
+                          <a:spcPct val="150000"/>
+                        </a:lnSpc>
+                      </a:pPr>
+                      <a:r>
+                        <a:rPr b="0" i="1" lang="pt-BR" sz="2200" spc="-1" strike="noStrike">
+                          <a:solidFill>
+                            <a:srgbClr val="5b9bd5"/>
+                          </a:solidFill>
+                          <a:latin typeface="Arial"/>
+                        </a:rPr>
+                        <a:t>8. Sistema salva o horário de criação do evento e status planejando.</a:t>
+                      </a:r>
+                      <a:endParaRPr b="0" i="1" lang="pt-BR" sz="2200" spc="-1" strike="noStrike">
+                        <a:solidFill>
+                          <a:srgbClr val="5b9bd5"/>
+                        </a:solidFill>
+                        <a:latin typeface="Arial"/>
+                      </a:endParaRPr>
+                    </a:p>
+                  </a:txBody>
+                  <a:tcPr anchor="t" marL="36000" marR="36000">
+                    <a:lnL w="7200">
+                      <a:solidFill>
+                        <a:srgbClr val="000000"/>
+                      </a:solidFill>
+                      <a:prstDash val="solid"/>
+                    </a:lnL>
+                    <a:lnR w="7200">
+                      <a:solidFill>
+                        <a:srgbClr val="000000"/>
+                      </a:solidFill>
+                      <a:prstDash val="solid"/>
+                    </a:lnR>
+                    <a:lnT w="7200">
+                      <a:solidFill>
+                        <a:srgbClr val="000000"/>
+                      </a:solidFill>
+                      <a:prstDash val="solid"/>
+                    </a:lnT>
+                    <a:lnB w="7200">
+                      <a:solidFill>
+                        <a:srgbClr val="000000"/>
+                      </a:solidFill>
+                      <a:prstDash val="solid"/>
+                    </a:lnB>
+                    <a:noFill/>
+                  </a:tcPr>
+                </a:tc>
+              </a:tr>
+              <a:tr h="1207800">
+                <a:tc>
+                  <a:txBody>
+                    <a:bodyPr lIns="36000" rIns="36000" tIns="36000" bIns="36000" anchor="t">
+                      <a:noAutofit/>
+                    </a:bodyPr>
+                    <a:p>
+                      <a:pPr algn="just">
+                        <a:lnSpc>
+                          <a:spcPct val="150000"/>
+                        </a:lnSpc>
+                      </a:pPr>
+                      <a:endParaRPr b="0" i="1" lang="pt-BR" sz="2200" spc="-1" strike="noStrike">
+                        <a:solidFill>
+                          <a:srgbClr val="5b9bd5"/>
+                        </a:solidFill>
+                        <a:latin typeface="Arial"/>
+                      </a:endParaRPr>
+                    </a:p>
+                  </a:txBody>
+                  <a:tcPr anchor="t" marL="36000" marR="36000">
+                    <a:lnL w="7200">
+                      <a:solidFill>
+                        <a:srgbClr val="000000"/>
+                      </a:solidFill>
+                      <a:prstDash val="solid"/>
+                    </a:lnL>
+                    <a:lnR w="7200">
+                      <a:solidFill>
+                        <a:srgbClr val="000000"/>
+                      </a:solidFill>
+                      <a:prstDash val="solid"/>
+                    </a:lnR>
+                    <a:lnT w="7200">
+                      <a:solidFill>
+                        <a:srgbClr val="000000"/>
+                      </a:solidFill>
+                      <a:prstDash val="solid"/>
+                    </a:lnT>
+                    <a:lnB w="7200">
+                      <a:solidFill>
+                        <a:srgbClr val="000000"/>
+                      </a:solidFill>
+                      <a:prstDash val="solid"/>
+                    </a:lnB>
+                    <a:noFill/>
+                  </a:tcPr>
+                </a:tc>
+                <a:tc>
+                  <a:txBody>
+                    <a:bodyPr lIns="36000" rIns="36000" tIns="36000" bIns="36000" anchor="t">
+                      <a:noAutofit/>
+                    </a:bodyPr>
+                    <a:p>
+                      <a:pPr algn="just">
+                        <a:lnSpc>
+                          <a:spcPct val="150000"/>
+                        </a:lnSpc>
+                      </a:pPr>
+                      <a:r>
+                        <a:rPr b="0" i="1" lang="pt-BR" sz="2200" spc="-1" strike="noStrike">
+                          <a:solidFill>
+                            <a:srgbClr val="5b9bd5"/>
+                          </a:solidFill>
+                          <a:latin typeface="Arial"/>
+                        </a:rPr>
+                        <a:t>9. Sistema registra o evento.</a:t>
+                      </a:r>
+                      <a:endParaRPr b="0" i="1" lang="pt-BR" sz="2200" spc="-1" strike="noStrike">
+                        <a:solidFill>
+                          <a:srgbClr val="5b9bd5"/>
+                        </a:solidFill>
+                        <a:latin typeface="Arial"/>
+                      </a:endParaRPr>
+                    </a:p>
+                  </a:txBody>
+                  <a:tcPr anchor="t" marL="36000" marR="36000">
+                    <a:lnL w="7200">
+                      <a:solidFill>
+                        <a:srgbClr val="000000"/>
+                      </a:solidFill>
+                      <a:prstDash val="solid"/>
+                    </a:lnL>
+                    <a:lnR w="7200">
+                      <a:solidFill>
+                        <a:srgbClr val="000000"/>
+                      </a:solidFill>
+                      <a:prstDash val="solid"/>
+                    </a:lnR>
+                    <a:lnT w="7200">
+                      <a:solidFill>
+                        <a:srgbClr val="000000"/>
+                      </a:solidFill>
+                      <a:prstDash val="solid"/>
+                    </a:lnT>
+                    <a:lnB w="7200">
+                      <a:solidFill>
+                        <a:srgbClr val="000000"/>
+                      </a:solidFill>
+                      <a:prstDash val="solid"/>
+                    </a:lnB>
+                    <a:noFill/>
+                  </a:tcPr>
+                </a:tc>
+              </a:tr>
+              <a:tr h="1210320">
+                <a:tc>
+                  <a:txBody>
+                    <a:bodyPr lIns="36000" rIns="36000" tIns="36000" bIns="36000" anchor="t">
+                      <a:noAutofit/>
+                    </a:bodyPr>
+                    <a:p>
+                      <a:pPr algn="just">
+                        <a:lnSpc>
+                          <a:spcPct val="150000"/>
+                        </a:lnSpc>
+                      </a:pPr>
+                      <a:endParaRPr b="0" i="1" lang="pt-BR" sz="2200" spc="-1" strike="noStrike">
+                        <a:solidFill>
+                          <a:srgbClr val="5b9bd5"/>
+                        </a:solidFill>
+                        <a:latin typeface="Arial"/>
+                      </a:endParaRPr>
+                    </a:p>
+                  </a:txBody>
+                  <a:tcPr anchor="t" marL="36000" marR="36000">
+                    <a:lnL w="7200">
+                      <a:solidFill>
+                        <a:srgbClr val="000000"/>
+                      </a:solidFill>
+                      <a:prstDash val="solid"/>
+                    </a:lnL>
+                    <a:lnR w="7200">
+                      <a:solidFill>
+                        <a:srgbClr val="000000"/>
+                      </a:solidFill>
+                      <a:prstDash val="solid"/>
+                    </a:lnR>
+                    <a:lnT w="7200">
+                      <a:solidFill>
+                        <a:srgbClr val="000000"/>
+                      </a:solidFill>
+                      <a:prstDash val="solid"/>
+                    </a:lnT>
+                    <a:lnB w="7200">
+                      <a:solidFill>
+                        <a:srgbClr val="000000"/>
+                      </a:solidFill>
+                      <a:prstDash val="solid"/>
+                    </a:lnB>
+                    <a:noFill/>
+                  </a:tcPr>
+                </a:tc>
+                <a:tc>
+                  <a:txBody>
+                    <a:bodyPr lIns="36000" rIns="36000" tIns="36000" bIns="36000" anchor="t">
+                      <a:noAutofit/>
+                    </a:bodyPr>
+                    <a:p>
+                      <a:pPr algn="just">
+                        <a:lnSpc>
+                          <a:spcPct val="150000"/>
+                        </a:lnSpc>
+                      </a:pPr>
+                      <a:r>
+                        <a:rPr b="0" i="1" lang="pt-BR" sz="2200" spc="-1" strike="noStrike">
+                          <a:solidFill>
+                            <a:srgbClr val="5b9bd5"/>
+                          </a:solidFill>
+                          <a:latin typeface="Arial"/>
+                        </a:rPr>
+                        <a:t>10. Sistema exibe lista atualizada dos eventos.</a:t>
+                      </a:r>
+                      <a:endParaRPr b="0" i="1" lang="pt-BR" sz="2200" spc="-1" strike="noStrike">
+                        <a:solidFill>
+                          <a:srgbClr val="5b9bd5"/>
+                        </a:solidFill>
+                        <a:latin typeface="Arial"/>
+                      </a:endParaRPr>
+                    </a:p>
+                  </a:txBody>
+                  <a:tcPr anchor="t" marL="36000" marR="36000">
+                    <a:lnL w="7200">
+                      <a:solidFill>
+                        <a:srgbClr val="000000"/>
+                      </a:solidFill>
+                      <a:prstDash val="solid"/>
+                    </a:lnL>
+                    <a:lnR w="7200">
+                      <a:solidFill>
+                        <a:srgbClr val="000000"/>
+                      </a:solidFill>
+                      <a:prstDash val="solid"/>
+                    </a:lnR>
+                    <a:lnT w="7200">
+                      <a:solidFill>
+                        <a:srgbClr val="000000"/>
+                      </a:solidFill>
+                      <a:prstDash val="solid"/>
+                    </a:lnT>
+                    <a:lnB w="7200">
+                      <a:solidFill>
+                        <a:srgbClr val="000000"/>
+                      </a:solidFill>
+                      <a:prstDash val="solid"/>
+                    </a:lnB>
+                    <a:noFill/>
+                  </a:tcPr>
+                </a:tc>
+              </a:tr>
+            </a:tbl>
+          </a:graphicData>
+        </a:graphic>
+      </p:graphicFrame>
+    </p:spTree>
+  </p:cSld>
+  <mc:AlternateContent>
+    <mc:Choice Requires="p14">
+      <p:transition spd="slow" p14:dur="2000"/>
+    </mc:Choice>
+    <mc:Fallback>
+      <p:transition spd="slow"/>
+    </mc:Fallback>
+  </mc:AlternateContent>
+</p:sld>
+</file>
+
+<file path=ppt/slides/slide25.xml><?xml version="1.0" encoding="utf-8"?>
+<p:sld xmlns:a="http://schemas.openxmlformats.org/drawingml/2006/main" xmlns:p="http://schemas.openxmlformats.org/presentationml/2006/main" xmlns:r="http://schemas.openxmlformats.org/officeDocument/2006/relationships" xmlns:p14="http://schemas.microsoft.com/office/powerpoint/2010/main" xmlns:p15="http://schemas.microsoft.com/office/powerpoint/2012/main" xmlns:mc="http://schemas.openxmlformats.org/markup-compatibility/2006">
+  <p:cSld>
+    <p:spTree>
+      <p:nvGrpSpPr>
+        <p:cNvPr id="1" name=""/>
+        <p:cNvGrpSpPr/>
+        <p:nvPr/>
+      </p:nvGrpSpPr>
+      <p:grpSpPr>
+        <a:xfrm>
+          <a:off x="0" y="0"/>
+          <a:ext cx="0" cy="0"/>
+          <a:chOff x="0" y="0"/>
+          <a:chExt cx="0" cy="0"/>
+        </a:xfrm>
+      </p:grpSpPr>
+      <p:sp>
+        <p:nvSpPr>
+          <p:cNvPr id="94" name=""/>
+          <p:cNvSpPr/>
+          <p:nvPr/>
+        </p:nvSpPr>
+        <p:spPr>
+          <a:xfrm>
+            <a:off x="720000" y="3960000"/>
+            <a:ext cx="21777480" cy="1450440"/>
+          </a:xfrm>
+          <a:prstGeom prst="rect">
+            <a:avLst/>
+          </a:prstGeom>
+          <a:noFill/>
+          <a:ln w="0">
+            <a:noFill/>
+          </a:ln>
+        </p:spPr>
+        <p:style>
+          <a:lnRef idx="0"/>
+          <a:fillRef idx="0"/>
+          <a:effectRef idx="0"/>
+          <a:fontRef idx="minor"/>
+        </p:style>
+        <p:txBody>
+          <a:bodyPr lIns="90000" rIns="90000" tIns="45000" bIns="45000" anchor="t">
+            <a:noAutofit/>
+          </a:bodyPr>
+          <a:p>
+            <a:pPr>
+              <a:lnSpc>
+                <a:spcPct val="100000"/>
+              </a:lnSpc>
+            </a:pPr>
+            <a:r>
+              <a:rPr b="1" lang="pt-BR" sz="9600" spc="-1" strike="noStrike" baseline="33000">
+                <a:solidFill>
+                  <a:srgbClr val="000000"/>
+                </a:solidFill>
+                <a:latin typeface="Arial"/>
+                <a:ea typeface="Helvetica Neue"/>
+              </a:rPr>
+              <a:t>• </a:t>
+            </a:r>
+            <a:r>
+              <a:rPr b="1" lang="pt-BR" sz="9600" spc="-1" strike="noStrike" baseline="33000">
+                <a:solidFill>
+                  <a:srgbClr val="000000"/>
+                </a:solidFill>
+                <a:latin typeface="Arial"/>
+                <a:ea typeface="Helvetica Neue"/>
+              </a:rPr>
+              <a:t>Conclusão</a:t>
+            </a:r>
+            <a:endParaRPr b="0" lang="pt-BR" sz="9600" spc="-1" strike="noStrike">
+              <a:solidFill>
+                <a:srgbClr val="000000"/>
+              </a:solidFill>
+              <a:latin typeface="Arial"/>
+            </a:endParaRPr>
+          </a:p>
+        </p:txBody>
+      </p:sp>
+      <p:sp>
+        <p:nvSpPr>
+          <p:cNvPr id="95" name=""/>
+          <p:cNvSpPr/>
+          <p:nvPr/>
+        </p:nvSpPr>
+        <p:spPr>
+          <a:xfrm>
+            <a:off x="900000" y="5940000"/>
+            <a:ext cx="22137480" cy="5622480"/>
+          </a:xfrm>
+          <a:prstGeom prst="rect">
+            <a:avLst/>
+          </a:prstGeom>
+          <a:noFill/>
+          <a:ln w="0">
+            <a:noFill/>
+          </a:ln>
+        </p:spPr>
+        <p:style>
+          <a:lnRef idx="0"/>
+          <a:fillRef idx="0"/>
+          <a:effectRef idx="0"/>
+          <a:fontRef idx="minor"/>
+        </p:style>
+        <p:txBody>
+          <a:bodyPr lIns="0" rIns="0" tIns="0" bIns="0" anchor="t">
+            <a:noAutofit/>
+          </a:bodyPr>
+          <a:p>
+            <a:pPr>
+              <a:lnSpc>
+                <a:spcPct val="100000"/>
+              </a:lnSpc>
+            </a:pPr>
+            <a:endParaRPr b="0" lang="pt-BR" sz="1800" spc="-1" strike="noStrike">
+              <a:solidFill>
+                <a:srgbClr val="000000"/>
+              </a:solidFill>
+              <a:latin typeface="Arial"/>
+              <a:ea typeface="Helvetica Neue"/>
+            </a:endParaRPr>
+          </a:p>
+        </p:txBody>
+      </p:sp>
+    </p:spTree>
+  </p:cSld>
+  <mc:AlternateContent>
+    <mc:Choice Requires="p14">
+      <p:transition spd="slow" p14:dur="2000"/>
+    </mc:Choice>
+    <mc:Fallback>
+      <p:transition spd="slow"/>
+    </mc:Fallback>
+  </mc:AlternateContent>
+</p:sld>
+</file>
+
+<file path=ppt/slides/slide26.xml><?xml version="1.0" encoding="utf-8"?>
+<p:sld xmlns:a="http://schemas.openxmlformats.org/drawingml/2006/main" xmlns:p="http://schemas.openxmlformats.org/presentationml/2006/main" xmlns:r="http://schemas.openxmlformats.org/officeDocument/2006/relationships" xmlns:p14="http://schemas.microsoft.com/office/powerpoint/2010/main" xmlns:p15="http://schemas.microsoft.com/office/powerpoint/2012/main" xmlns:mc="http://schemas.openxmlformats.org/markup-compatibility/2006">
+  <p:cSld>
+    <p:spTree>
+      <p:nvGrpSpPr>
+        <p:cNvPr id="1" name=""/>
+        <p:cNvGrpSpPr/>
+        <p:nvPr/>
+      </p:nvGrpSpPr>
+      <p:grpSpPr>
+        <a:xfrm>
+          <a:off x="0" y="0"/>
+          <a:ext cx="0" cy="0"/>
+          <a:chOff x="0" y="0"/>
+          <a:chExt cx="0" cy="0"/>
+        </a:xfrm>
+      </p:grpSpPr>
+      <p:sp>
+        <p:nvSpPr>
+          <p:cNvPr id="96" name=""/>
+          <p:cNvSpPr/>
+          <p:nvPr/>
+        </p:nvSpPr>
+        <p:spPr>
+          <a:xfrm>
             <a:off x="900000" y="3420000"/>
-            <a:ext cx="22138560" cy="7198560"/>
+            <a:ext cx="22137480" cy="7197480"/>
           </a:xfrm>
           <a:prstGeom prst="rect">
             <a:avLst/>
@@ -4873,14 +7425,14 @@
       </p:grpSpPr>
       <p:sp>
         <p:nvSpPr>
-          <p:cNvPr id="45" name=""/>
+          <p:cNvPr id="46" name=""/>
           <p:cNvSpPr/>
           <p:nvPr/>
         </p:nvSpPr>
         <p:spPr>
           <a:xfrm>
             <a:off x="720000" y="3960000"/>
-            <a:ext cx="21778560" cy="1451520"/>
+            <a:ext cx="21777480" cy="1450440"/>
           </a:xfrm>
           <a:prstGeom prst="rect">
             <a:avLst/>
@@ -4937,14 +7489,14 @@
       </p:sp>
       <p:sp>
         <p:nvSpPr>
-          <p:cNvPr id="46" name=""/>
+          <p:cNvPr id="47" name=""/>
           <p:cNvSpPr/>
           <p:nvPr/>
         </p:nvSpPr>
         <p:spPr>
           <a:xfrm>
             <a:off x="900000" y="5940000"/>
-            <a:ext cx="22138560" cy="6838560"/>
+            <a:ext cx="22137480" cy="6837480"/>
           </a:xfrm>
           <a:prstGeom prst="rect">
             <a:avLst/>
@@ -5021,14 +7573,14 @@
       </p:grpSpPr>
       <p:sp>
         <p:nvSpPr>
-          <p:cNvPr id="47" name=""/>
+          <p:cNvPr id="48" name=""/>
           <p:cNvSpPr/>
           <p:nvPr/>
         </p:nvSpPr>
         <p:spPr>
           <a:xfrm>
             <a:off x="720000" y="3960000"/>
-            <a:ext cx="21778560" cy="1451520"/>
+            <a:ext cx="21777480" cy="1450440"/>
           </a:xfrm>
           <a:prstGeom prst="rect">
             <a:avLst/>
@@ -5085,14 +7637,14 @@
       </p:sp>
       <p:sp>
         <p:nvSpPr>
-          <p:cNvPr id="48" name=""/>
+          <p:cNvPr id="49" name=""/>
           <p:cNvSpPr/>
           <p:nvPr/>
         </p:nvSpPr>
         <p:spPr>
           <a:xfrm>
             <a:off x="900000" y="5940000"/>
-            <a:ext cx="22138560" cy="6838560"/>
+            <a:ext cx="22137480" cy="6837480"/>
           </a:xfrm>
           <a:prstGeom prst="rect">
             <a:avLst/>
@@ -5238,14 +7790,14 @@
       </p:grpSpPr>
       <p:sp>
         <p:nvSpPr>
-          <p:cNvPr id="49" name=""/>
+          <p:cNvPr id="50" name=""/>
           <p:cNvSpPr/>
           <p:nvPr/>
         </p:nvSpPr>
         <p:spPr>
           <a:xfrm>
             <a:off x="720000" y="3960000"/>
-            <a:ext cx="21778560" cy="1451520"/>
+            <a:ext cx="21777480" cy="1450440"/>
           </a:xfrm>
           <a:prstGeom prst="rect">
             <a:avLst/>
@@ -5302,14 +7854,14 @@
       </p:sp>
       <p:sp>
         <p:nvSpPr>
-          <p:cNvPr id="50" name=""/>
+          <p:cNvPr id="51" name=""/>
           <p:cNvSpPr/>
           <p:nvPr/>
         </p:nvSpPr>
         <p:spPr>
           <a:xfrm>
             <a:off x="900000" y="5940000"/>
-            <a:ext cx="22138560" cy="6838560"/>
+            <a:ext cx="22137480" cy="6837480"/>
           </a:xfrm>
           <a:prstGeom prst="rect">
             <a:avLst/>
@@ -5409,14 +7961,14 @@
       </p:grpSpPr>
       <p:sp>
         <p:nvSpPr>
-          <p:cNvPr id="51" name=""/>
+          <p:cNvPr id="52" name=""/>
           <p:cNvSpPr/>
           <p:nvPr/>
         </p:nvSpPr>
         <p:spPr>
           <a:xfrm>
             <a:off x="720000" y="3960000"/>
-            <a:ext cx="21778560" cy="1451520"/>
+            <a:ext cx="21777480" cy="1450440"/>
           </a:xfrm>
           <a:prstGeom prst="rect">
             <a:avLst/>
@@ -5473,14 +8025,14 @@
       </p:sp>
       <p:sp>
         <p:nvSpPr>
-          <p:cNvPr id="52" name=""/>
+          <p:cNvPr id="53" name=""/>
           <p:cNvSpPr/>
           <p:nvPr/>
         </p:nvSpPr>
         <p:spPr>
           <a:xfrm>
             <a:off x="900000" y="5940000"/>
-            <a:ext cx="22138560" cy="1873800"/>
+            <a:ext cx="22137480" cy="1872720"/>
           </a:xfrm>
           <a:prstGeom prst="rect">
             <a:avLst/>
@@ -5580,7 +8132,7 @@
       </p:grpSpPr>
       <p:pic>
         <p:nvPicPr>
-          <p:cNvPr id="53" name="" descr=""/>
+          <p:cNvPr id="54" name="" descr=""/>
           <p:cNvPicPr/>
           <p:nvPr/>
         </p:nvPicPr>
@@ -5590,8 +8142,8 @@
         </p:blipFill>
         <p:spPr>
           <a:xfrm>
-            <a:off x="180000" y="3240000"/>
-            <a:ext cx="22678560" cy="9245160"/>
+            <a:off x="309960" y="3240000"/>
+            <a:ext cx="23629680" cy="10259640"/>
           </a:xfrm>
           <a:prstGeom prst="rect">
             <a:avLst/>
@@ -5633,7 +8185,7 @@
       </p:grpSpPr>
       <p:pic>
         <p:nvPicPr>
-          <p:cNvPr id="54" name="" descr=""/>
+          <p:cNvPr id="55" name="" descr=""/>
           <p:cNvPicPr/>
           <p:nvPr/>
         </p:nvPicPr>
@@ -5643,8 +8195,8 @@
         </p:blipFill>
         <p:spPr>
           <a:xfrm>
-            <a:off x="540000" y="3402720"/>
-            <a:ext cx="22498560" cy="9558720"/>
+            <a:off x="900000" y="3240000"/>
+            <a:ext cx="22799880" cy="10079640"/>
           </a:xfrm>
           <a:prstGeom prst="rect">
             <a:avLst/>
@@ -5686,7 +8238,7 @@
       </p:grpSpPr>
       <p:pic>
         <p:nvPicPr>
-          <p:cNvPr id="55" name="" descr=""/>
+          <p:cNvPr id="56" name="" descr=""/>
           <p:cNvPicPr/>
           <p:nvPr/>
         </p:nvPicPr>
@@ -5696,8 +8248,8 @@
         </p:blipFill>
         <p:spPr>
           <a:xfrm>
-            <a:off x="540000" y="3420000"/>
-            <a:ext cx="22498560" cy="9178560"/>
+            <a:off x="360000" y="3240000"/>
+            <a:ext cx="23331960" cy="10122120"/>
           </a:xfrm>
           <a:prstGeom prst="rect">
             <a:avLst/>

</xml_diff>